<commit_message>
Update the asynchronous operations lecture.
</commit_message>
<xml_diff>
--- a/Lectures/Asynchronous Operations/Asynchronous Operations.pptx
+++ b/Lectures/Asynchronous Operations/Asynchronous Operations.pptx
@@ -5,14 +5,22 @@
     <p:sldMasterId id="2147483660" r:id="rId1"/>
   </p:sldMasterIdLst>
   <p:notesMasterIdLst>
-    <p:notesMasterId r:id="rId7"/>
+    <p:notesMasterId r:id="rId15"/>
   </p:notesMasterIdLst>
   <p:sldIdLst>
     <p:sldId id="256" r:id="rId2"/>
-    <p:sldId id="257" r:id="rId3"/>
-    <p:sldId id="258" r:id="rId4"/>
-    <p:sldId id="259" r:id="rId5"/>
-    <p:sldId id="260" r:id="rId6"/>
+    <p:sldId id="267" r:id="rId3"/>
+    <p:sldId id="257" r:id="rId4"/>
+    <p:sldId id="258" r:id="rId5"/>
+    <p:sldId id="259" r:id="rId6"/>
+    <p:sldId id="260" r:id="rId7"/>
+    <p:sldId id="261" r:id="rId8"/>
+    <p:sldId id="262" r:id="rId9"/>
+    <p:sldId id="263" r:id="rId10"/>
+    <p:sldId id="264" r:id="rId11"/>
+    <p:sldId id="265" r:id="rId12"/>
+    <p:sldId id="266" r:id="rId13"/>
+    <p:sldId id="268" r:id="rId14"/>
   </p:sldIdLst>
   <p:sldSz cx="9144000" cy="6858000" type="screen4x3"/>
   <p:notesSz cx="6858000" cy="9144000"/>
@@ -196,7 +204,7 @@
           <a:p>
             <a:fld id="{DBE0ECA1-3FBF-48AE-AD2A-4439AE745E19}" type="datetimeFigureOut">
               <a:rPr lang="en-US" smtClean="0"/>
-              <a:t>11/13/2013</a:t>
+              <a:t>11/15/2013</a:t>
             </a:fld>
             <a:endParaRPr lang="en-US"/>
           </a:p>
@@ -657,7 +665,7 @@
           <a:p>
             <a:fld id="{9769DED8-28D4-45B9-A00F-7CFE9335FEA6}" type="datetime1">
               <a:rPr lang="en-US" smtClean="0"/>
-              <a:t>11/13/2013</a:t>
+              <a:t>11/15/2013</a:t>
             </a:fld>
             <a:endParaRPr lang="en-US"/>
           </a:p>
@@ -922,7 +930,7 @@
           <a:p>
             <a:fld id="{2DB3D439-1F88-44B4-B5F7-F9BCD4064257}" type="datetime1">
               <a:rPr lang="en-US" smtClean="0"/>
-              <a:t>11/13/2013</a:t>
+              <a:t>11/15/2013</a:t>
             </a:fld>
             <a:endParaRPr lang="en-US"/>
           </a:p>
@@ -1097,7 +1105,7 @@
           <a:p>
             <a:fld id="{99C5638F-6F55-4055-935C-67841BE78C36}" type="datetime1">
               <a:rPr lang="en-US" smtClean="0"/>
-              <a:t>11/13/2013</a:t>
+              <a:t>11/15/2013</a:t>
             </a:fld>
             <a:endParaRPr lang="en-US"/>
           </a:p>
@@ -1262,7 +1270,7 @@
           <a:p>
             <a:fld id="{E6987D90-0C92-4B22-A29D-FED15412CED2}" type="datetime1">
               <a:rPr lang="en-US" smtClean="0"/>
-              <a:t>11/13/2013</a:t>
+              <a:t>11/15/2013</a:t>
             </a:fld>
             <a:endParaRPr lang="en-US"/>
           </a:p>
@@ -1511,7 +1519,7 @@
           <a:p>
             <a:fld id="{DDB67BC4-9554-49E0-BCB3-D1EF965BA0B8}" type="datetime1">
               <a:rPr lang="en-US" smtClean="0"/>
-              <a:t>11/13/2013</a:t>
+              <a:t>11/15/2013</a:t>
             </a:fld>
             <a:endParaRPr lang="en-US"/>
           </a:p>
@@ -1794,7 +1802,7 @@
           <a:p>
             <a:fld id="{EC24D770-803D-4E01-921C-9C100DD8230C}" type="datetime1">
               <a:rPr lang="en-US" smtClean="0"/>
-              <a:t>11/13/2013</a:t>
+              <a:t>11/15/2013</a:t>
             </a:fld>
             <a:endParaRPr lang="en-US"/>
           </a:p>
@@ -2233,7 +2241,7 @@
           <a:p>
             <a:fld id="{356AD44B-78A4-4209-8070-7DCBE2DC4992}" type="datetime1">
               <a:rPr lang="en-US" smtClean="0"/>
-              <a:t>11/13/2013</a:t>
+              <a:t>11/15/2013</a:t>
             </a:fld>
             <a:endParaRPr lang="en-US"/>
           </a:p>
@@ -2346,7 +2354,7 @@
           <a:p>
             <a:fld id="{A993C59A-7CA2-467F-B7F1-9096881A01B8}" type="datetime1">
               <a:rPr lang="en-US" smtClean="0"/>
-              <a:t>11/13/2013</a:t>
+              <a:t>11/15/2013</a:t>
             </a:fld>
             <a:endParaRPr lang="en-US"/>
           </a:p>
@@ -2436,7 +2444,7 @@
           <a:p>
             <a:fld id="{2B6B58D0-2488-434A-8ED1-692E09B85CC5}" type="datetime1">
               <a:rPr lang="en-US" smtClean="0"/>
-              <a:t>11/13/2013</a:t>
+              <a:t>11/15/2013</a:t>
             </a:fld>
             <a:endParaRPr lang="en-US"/>
           </a:p>
@@ -2678,7 +2686,7 @@
           <a:p>
             <a:fld id="{FDB0AFC2-7D64-4F61-A7B7-9932D3305DDA}" type="datetime1">
               <a:rPr lang="en-US" smtClean="0"/>
-              <a:t>11/13/2013</a:t>
+              <a:t>11/15/2013</a:t>
             </a:fld>
             <a:endParaRPr lang="en-US"/>
           </a:p>
@@ -2972,7 +2980,7 @@
           <a:p>
             <a:fld id="{4983D17A-D7B2-4ECE-8A2C-93679B9D177B}" type="datetime1">
               <a:rPr lang="en-US" smtClean="0"/>
-              <a:t>11/13/2013</a:t>
+              <a:t>11/15/2013</a:t>
             </a:fld>
             <a:endParaRPr lang="en-US"/>
           </a:p>
@@ -3266,7 +3274,7 @@
           <a:p>
             <a:fld id="{2A5275F7-419E-4C23-8A3D-2EE5742B2EC9}" type="datetime1">
               <a:rPr lang="en-US" smtClean="0"/>
-              <a:t>11/13/2013</a:t>
+              <a:t>11/15/2013</a:t>
             </a:fld>
             <a:endParaRPr lang="en-US"/>
           </a:p>
@@ -3769,11 +3777,7 @@
           <a:p>
             <a:r>
               <a:rPr lang="en-US" sz="4800" dirty="0" smtClean="0"/>
-              <a:t>Asynchronous </a:t>
-            </a:r>
-            <a:r>
-              <a:rPr lang="en-US" sz="4800" dirty="0" smtClean="0"/>
-              <a:t>Operations</a:t>
+              <a:t>Asynchronous Operations</a:t>
             </a:r>
             <a:endParaRPr lang="en-US" sz="4800" dirty="0"/>
           </a:p>
@@ -3796,7 +3800,7 @@
           <a:p>
             <a:r>
               <a:rPr lang="en-US" dirty="0" smtClean="0"/>
-              <a:t>Template</a:t>
+              <a:t>Useful multithreading</a:t>
             </a:r>
             <a:endParaRPr lang="en-US" dirty="0"/>
           </a:p>
@@ -3848,6 +3852,943 @@
 </p:sld>
 </file>
 
+<file path=ppt/slides/slide10.xml><?xml version="1.0" encoding="utf-8"?>
+<p:sld xmlns:a="http://schemas.openxmlformats.org/drawingml/2006/main" xmlns:r="http://schemas.openxmlformats.org/officeDocument/2006/relationships" xmlns:p="http://schemas.openxmlformats.org/presentationml/2006/main">
+  <p:cSld>
+    <p:spTree>
+      <p:nvGrpSpPr>
+        <p:cNvPr id="1" name=""/>
+        <p:cNvGrpSpPr/>
+        <p:nvPr/>
+      </p:nvGrpSpPr>
+      <p:grpSpPr>
+        <a:xfrm>
+          <a:off x="0" y="0"/>
+          <a:ext cx="0" cy="0"/>
+          <a:chOff x="0" y="0"/>
+          <a:chExt cx="0" cy="0"/>
+        </a:xfrm>
+      </p:grpSpPr>
+      <p:sp>
+        <p:nvSpPr>
+          <p:cNvPr id="2" name="Title 1"/>
+          <p:cNvSpPr>
+            <a:spLocks noGrp="1"/>
+          </p:cNvSpPr>
+          <p:nvPr>
+            <p:ph type="title"/>
+          </p:nvPr>
+        </p:nvSpPr>
+        <p:spPr/>
+        <p:txBody>
+          <a:bodyPr/>
+          <a:lstStyle/>
+          <a:p>
+            <a:r>
+              <a:rPr lang="en-US" dirty="0" smtClean="0"/>
+              <a:t>Additional Methods</a:t>
+            </a:r>
+            <a:endParaRPr lang="en-US" dirty="0"/>
+          </a:p>
+        </p:txBody>
+      </p:sp>
+      <p:sp>
+        <p:nvSpPr>
+          <p:cNvPr id="3" name="Content Placeholder 2"/>
+          <p:cNvSpPr>
+            <a:spLocks noGrp="1"/>
+          </p:cNvSpPr>
+          <p:nvPr>
+            <p:ph idx="1"/>
+          </p:nvPr>
+        </p:nvSpPr>
+        <p:spPr/>
+        <p:txBody>
+          <a:bodyPr/>
+          <a:lstStyle/>
+          <a:p>
+            <a:r>
+              <a:rPr lang="en-US" dirty="0" smtClean="0"/>
+              <a:t>For additional flexibility </a:t>
+            </a:r>
+            <a:r>
+              <a:rPr lang="en-US" dirty="0" err="1" smtClean="0">
+                <a:latin typeface="Courier New" panose="02070309020205020404" pitchFamily="49" charset="0"/>
+                <a:cs typeface="Courier New" panose="02070309020205020404" pitchFamily="49" charset="0"/>
+              </a:rPr>
+              <a:t>std</a:t>
+            </a:r>
+            <a:r>
+              <a:rPr lang="en-US" dirty="0" smtClean="0">
+                <a:latin typeface="Courier New" panose="02070309020205020404" pitchFamily="49" charset="0"/>
+                <a:cs typeface="Courier New" panose="02070309020205020404" pitchFamily="49" charset="0"/>
+              </a:rPr>
+              <a:t>::</a:t>
+            </a:r>
+            <a:r>
+              <a:rPr lang="en-US" dirty="0" err="1" smtClean="0">
+                <a:latin typeface="Courier New" panose="02070309020205020404" pitchFamily="49" charset="0"/>
+                <a:cs typeface="Courier New" panose="02070309020205020404" pitchFamily="49" charset="0"/>
+              </a:rPr>
+              <a:t>condition_variable</a:t>
+            </a:r>
+            <a:r>
+              <a:rPr lang="en-US" dirty="0" smtClean="0">
+                <a:latin typeface="Courier New" panose="02070309020205020404" pitchFamily="49" charset="0"/>
+                <a:cs typeface="Courier New" panose="02070309020205020404" pitchFamily="49" charset="0"/>
+              </a:rPr>
+              <a:t> </a:t>
+            </a:r>
+            <a:r>
+              <a:rPr lang="en-US" dirty="0" smtClean="0"/>
+              <a:t>exposes more wait methods</a:t>
+            </a:r>
+          </a:p>
+          <a:p>
+            <a:pPr marL="800100" lvl="1" indent="-342900"/>
+            <a:r>
+              <a:rPr lang="en-US" dirty="0" err="1" smtClean="0">
+                <a:latin typeface="Courier New" panose="02070309020205020404" pitchFamily="49" charset="0"/>
+                <a:cs typeface="Courier New" panose="02070309020205020404" pitchFamily="49" charset="0"/>
+              </a:rPr>
+              <a:t>wait_for</a:t>
+            </a:r>
+            <a:r>
+              <a:rPr lang="en-US" dirty="0"/>
+              <a:t> </a:t>
+            </a:r>
+            <a:r>
+              <a:rPr lang="en-US" dirty="0" smtClean="0"/>
+              <a:t>– exit the wait after a given time</a:t>
+            </a:r>
+          </a:p>
+          <a:p>
+            <a:pPr marL="800100" lvl="1" indent="-342900"/>
+            <a:r>
+              <a:rPr lang="en-US" dirty="0" err="1" smtClean="0">
+                <a:latin typeface="Courier New" panose="02070309020205020404" pitchFamily="49" charset="0"/>
+                <a:cs typeface="Courier New" panose="02070309020205020404" pitchFamily="49" charset="0"/>
+              </a:rPr>
+              <a:t>wait_until</a:t>
+            </a:r>
+            <a:r>
+              <a:rPr lang="en-US" dirty="0" smtClean="0"/>
+              <a:t> – exit the wait at a given time</a:t>
+            </a:r>
+          </a:p>
+          <a:p>
+            <a:pPr marL="342900" indent="-342900"/>
+            <a:endParaRPr lang="en-US" dirty="0" smtClean="0"/>
+          </a:p>
+          <a:p>
+            <a:pPr marL="342900" indent="-342900"/>
+            <a:r>
+              <a:rPr lang="en-US" dirty="0" smtClean="0"/>
+              <a:t>The </a:t>
+            </a:r>
+            <a:r>
+              <a:rPr lang="en-US" dirty="0" err="1" smtClean="0">
+                <a:latin typeface="Courier New" panose="02070309020205020404" pitchFamily="49" charset="0"/>
+                <a:cs typeface="Courier New" panose="02070309020205020404" pitchFamily="49" charset="0"/>
+              </a:rPr>
+              <a:t>std</a:t>
+            </a:r>
+            <a:r>
+              <a:rPr lang="en-US" dirty="0" smtClean="0">
+                <a:latin typeface="Courier New" panose="02070309020205020404" pitchFamily="49" charset="0"/>
+                <a:cs typeface="Courier New" panose="02070309020205020404" pitchFamily="49" charset="0"/>
+              </a:rPr>
+              <a:t>::</a:t>
+            </a:r>
+            <a:r>
+              <a:rPr lang="en-US" dirty="0" err="1" smtClean="0">
+                <a:latin typeface="Courier New" panose="02070309020205020404" pitchFamily="49" charset="0"/>
+                <a:cs typeface="Courier New" panose="02070309020205020404" pitchFamily="49" charset="0"/>
+              </a:rPr>
+              <a:t>condition_variable</a:t>
+            </a:r>
+            <a:r>
+              <a:rPr lang="en-US" dirty="0" smtClean="0"/>
+              <a:t> type also has a method to notify more than one waiting thread</a:t>
+            </a:r>
+          </a:p>
+          <a:p>
+            <a:pPr marL="800100" lvl="1" indent="-342900"/>
+            <a:r>
+              <a:rPr lang="en-US" dirty="0" err="1" smtClean="0">
+                <a:latin typeface="Courier New" panose="02070309020205020404" pitchFamily="49" charset="0"/>
+                <a:cs typeface="Courier New" panose="02070309020205020404" pitchFamily="49" charset="0"/>
+              </a:rPr>
+              <a:t>notify_one</a:t>
+            </a:r>
+            <a:r>
+              <a:rPr lang="en-US" dirty="0" smtClean="0"/>
+              <a:t> is like a gate that always one thread to continue</a:t>
+            </a:r>
+          </a:p>
+          <a:p>
+            <a:pPr marL="800100" lvl="1" indent="-342900"/>
+            <a:r>
+              <a:rPr lang="en-US" dirty="0" err="1" smtClean="0">
+                <a:latin typeface="Courier New" panose="02070309020205020404" pitchFamily="49" charset="0"/>
+                <a:cs typeface="Courier New" panose="02070309020205020404" pitchFamily="49" charset="0"/>
+              </a:rPr>
+              <a:t>notify_all</a:t>
+            </a:r>
+            <a:r>
+              <a:rPr lang="en-US" dirty="0" smtClean="0"/>
+              <a:t> allows all threads to continue</a:t>
+            </a:r>
+            <a:endParaRPr lang="en-US" dirty="0"/>
+          </a:p>
+        </p:txBody>
+      </p:sp>
+      <p:sp>
+        <p:nvSpPr>
+          <p:cNvPr id="4" name="Slide Number Placeholder 3"/>
+          <p:cNvSpPr>
+            <a:spLocks noGrp="1"/>
+          </p:cNvSpPr>
+          <p:nvPr>
+            <p:ph type="sldNum" sz="quarter" idx="12"/>
+          </p:nvPr>
+        </p:nvSpPr>
+        <p:spPr/>
+        <p:txBody>
+          <a:bodyPr/>
+          <a:lstStyle/>
+          <a:p>
+            <a:fld id="{6DA12B36-9664-4CB0-8B2E-F4A2F44AE97E}" type="slidenum">
+              <a:rPr lang="en-US" smtClean="0"/>
+              <a:t>10</a:t>
+            </a:fld>
+            <a:endParaRPr lang="en-US"/>
+          </a:p>
+        </p:txBody>
+      </p:sp>
+    </p:spTree>
+    <p:extLst>
+      <p:ext uri="{BB962C8B-B14F-4D97-AF65-F5344CB8AC3E}">
+        <p14:creationId xmlns:p14="http://schemas.microsoft.com/office/powerpoint/2010/main" val="1896579322"/>
+      </p:ext>
+    </p:extLst>
+  </p:cSld>
+  <p:clrMapOvr>
+    <a:masterClrMapping/>
+  </p:clrMapOvr>
+</p:sld>
+</file>
+
+<file path=ppt/slides/slide11.xml><?xml version="1.0" encoding="utf-8"?>
+<p:sld xmlns:a="http://schemas.openxmlformats.org/drawingml/2006/main" xmlns:r="http://schemas.openxmlformats.org/officeDocument/2006/relationships" xmlns:p="http://schemas.openxmlformats.org/presentationml/2006/main">
+  <p:cSld>
+    <p:spTree>
+      <p:nvGrpSpPr>
+        <p:cNvPr id="1" name=""/>
+        <p:cNvGrpSpPr/>
+        <p:nvPr/>
+      </p:nvGrpSpPr>
+      <p:grpSpPr>
+        <a:xfrm>
+          <a:off x="0" y="0"/>
+          <a:ext cx="0" cy="0"/>
+          <a:chOff x="0" y="0"/>
+          <a:chExt cx="0" cy="0"/>
+        </a:xfrm>
+      </p:grpSpPr>
+      <p:sp>
+        <p:nvSpPr>
+          <p:cNvPr id="2" name="Title 1"/>
+          <p:cNvSpPr>
+            <a:spLocks noGrp="1"/>
+          </p:cNvSpPr>
+          <p:nvPr>
+            <p:ph type="title"/>
+          </p:nvPr>
+        </p:nvSpPr>
+        <p:spPr/>
+        <p:txBody>
+          <a:bodyPr/>
+          <a:lstStyle/>
+          <a:p>
+            <a:r>
+              <a:rPr lang="en-US" dirty="0" smtClean="0"/>
+              <a:t>Condition variable guidelines</a:t>
+            </a:r>
+            <a:endParaRPr lang="en-US" dirty="0"/>
+          </a:p>
+        </p:txBody>
+      </p:sp>
+      <p:sp>
+        <p:nvSpPr>
+          <p:cNvPr id="3" name="Content Placeholder 2"/>
+          <p:cNvSpPr>
+            <a:spLocks noGrp="1"/>
+          </p:cNvSpPr>
+          <p:nvPr>
+            <p:ph idx="1"/>
+          </p:nvPr>
+        </p:nvSpPr>
+        <p:spPr/>
+        <p:txBody>
+          <a:bodyPr/>
+          <a:lstStyle/>
+          <a:p>
+            <a:r>
+              <a:rPr lang="en-US" dirty="0" smtClean="0"/>
+              <a:t>When using condition variables, keep things simple</a:t>
+            </a:r>
+          </a:p>
+          <a:p>
+            <a:r>
+              <a:rPr lang="en-US" dirty="0" smtClean="0">
+                <a:solidFill>
+                  <a:schemeClr val="accent3"/>
+                </a:solidFill>
+              </a:rPr>
+              <a:t>Guidelines</a:t>
+            </a:r>
+          </a:p>
+          <a:p>
+            <a:pPr marL="800100" lvl="1" indent="-342900"/>
+            <a:r>
+              <a:rPr lang="en-US" dirty="0" smtClean="0">
+                <a:solidFill>
+                  <a:schemeClr val="accent3"/>
+                </a:solidFill>
+              </a:rPr>
+              <a:t>Prefer to use </a:t>
+            </a:r>
+            <a:r>
+              <a:rPr lang="en-US" dirty="0" smtClean="0">
+                <a:solidFill>
+                  <a:schemeClr val="accent3"/>
+                </a:solidFill>
+                <a:latin typeface="Courier New" panose="02070309020205020404" pitchFamily="49" charset="0"/>
+                <a:cs typeface="Courier New" panose="02070309020205020404" pitchFamily="49" charset="0"/>
+              </a:rPr>
+              <a:t>wait</a:t>
+            </a:r>
+            <a:r>
+              <a:rPr lang="en-US" dirty="0" smtClean="0">
+                <a:solidFill>
+                  <a:schemeClr val="accent3"/>
+                </a:solidFill>
+              </a:rPr>
+              <a:t> without a wake condition.</a:t>
+            </a:r>
+          </a:p>
+          <a:p>
+            <a:pPr marL="800100" lvl="1" indent="-342900"/>
+            <a:r>
+              <a:rPr lang="en-US" dirty="0" smtClean="0">
+                <a:solidFill>
+                  <a:schemeClr val="accent3"/>
+                </a:solidFill>
+              </a:rPr>
+              <a:t>Do not lock a mutex while calling </a:t>
+            </a:r>
+            <a:r>
+              <a:rPr lang="en-US" dirty="0" err="1" smtClean="0">
+                <a:solidFill>
+                  <a:schemeClr val="accent3"/>
+                </a:solidFill>
+                <a:latin typeface="Courier New" panose="02070309020205020404" pitchFamily="49" charset="0"/>
+                <a:cs typeface="Courier New" panose="02070309020205020404" pitchFamily="49" charset="0"/>
+              </a:rPr>
+              <a:t>notify_one</a:t>
+            </a:r>
+            <a:r>
+              <a:rPr lang="en-US" dirty="0" smtClean="0">
+                <a:solidFill>
+                  <a:schemeClr val="accent3"/>
+                </a:solidFill>
+              </a:rPr>
+              <a:t> or </a:t>
+            </a:r>
+            <a:r>
+              <a:rPr lang="en-US" dirty="0" err="1" smtClean="0">
+                <a:solidFill>
+                  <a:schemeClr val="accent3"/>
+                </a:solidFill>
+                <a:latin typeface="Courier New" panose="02070309020205020404" pitchFamily="49" charset="0"/>
+                <a:cs typeface="Courier New" panose="02070309020205020404" pitchFamily="49" charset="0"/>
+              </a:rPr>
+              <a:t>notify_all</a:t>
+            </a:r>
+            <a:endParaRPr lang="en-US" dirty="0">
+              <a:solidFill>
+                <a:schemeClr val="accent3"/>
+              </a:solidFill>
+              <a:latin typeface="Courier New" panose="02070309020205020404" pitchFamily="49" charset="0"/>
+              <a:cs typeface="Courier New" panose="02070309020205020404" pitchFamily="49" charset="0"/>
+            </a:endParaRPr>
+          </a:p>
+        </p:txBody>
+      </p:sp>
+      <p:sp>
+        <p:nvSpPr>
+          <p:cNvPr id="4" name="Slide Number Placeholder 3"/>
+          <p:cNvSpPr>
+            <a:spLocks noGrp="1"/>
+          </p:cNvSpPr>
+          <p:nvPr>
+            <p:ph type="sldNum" sz="quarter" idx="12"/>
+          </p:nvPr>
+        </p:nvSpPr>
+        <p:spPr/>
+        <p:txBody>
+          <a:bodyPr/>
+          <a:lstStyle/>
+          <a:p>
+            <a:fld id="{6DA12B36-9664-4CB0-8B2E-F4A2F44AE97E}" type="slidenum">
+              <a:rPr lang="en-US" smtClean="0"/>
+              <a:t>11</a:t>
+            </a:fld>
+            <a:endParaRPr lang="en-US"/>
+          </a:p>
+        </p:txBody>
+      </p:sp>
+    </p:spTree>
+    <p:extLst>
+      <p:ext uri="{BB962C8B-B14F-4D97-AF65-F5344CB8AC3E}">
+        <p14:creationId xmlns:p14="http://schemas.microsoft.com/office/powerpoint/2010/main" val="4212973832"/>
+      </p:ext>
+    </p:extLst>
+  </p:cSld>
+  <p:clrMapOvr>
+    <a:masterClrMapping/>
+  </p:clrMapOvr>
+</p:sld>
+</file>
+
+<file path=ppt/slides/slide12.xml><?xml version="1.0" encoding="utf-8"?>
+<p:sld xmlns:a="http://schemas.openxmlformats.org/drawingml/2006/main" xmlns:r="http://schemas.openxmlformats.org/officeDocument/2006/relationships" xmlns:p="http://schemas.openxmlformats.org/presentationml/2006/main">
+  <p:cSld>
+    <p:spTree>
+      <p:nvGrpSpPr>
+        <p:cNvPr id="1" name=""/>
+        <p:cNvGrpSpPr/>
+        <p:nvPr/>
+      </p:nvGrpSpPr>
+      <p:grpSpPr>
+        <a:xfrm>
+          <a:off x="0" y="0"/>
+          <a:ext cx="0" cy="0"/>
+          <a:chOff x="0" y="0"/>
+          <a:chExt cx="0" cy="0"/>
+        </a:xfrm>
+      </p:grpSpPr>
+      <p:sp>
+        <p:nvSpPr>
+          <p:cNvPr id="2" name="Title 1"/>
+          <p:cNvSpPr>
+            <a:spLocks noGrp="1"/>
+          </p:cNvSpPr>
+          <p:nvPr>
+            <p:ph type="title"/>
+          </p:nvPr>
+        </p:nvSpPr>
+        <p:spPr/>
+        <p:txBody>
+          <a:bodyPr/>
+          <a:lstStyle/>
+          <a:p>
+            <a:r>
+              <a:rPr lang="en-US" dirty="0" smtClean="0"/>
+              <a:t>Use case: avoiding detach</a:t>
+            </a:r>
+            <a:endParaRPr lang="en-US" dirty="0"/>
+          </a:p>
+        </p:txBody>
+      </p:sp>
+      <p:sp>
+        <p:nvSpPr>
+          <p:cNvPr id="3" name="Content Placeholder 2"/>
+          <p:cNvSpPr>
+            <a:spLocks noGrp="1"/>
+          </p:cNvSpPr>
+          <p:nvPr>
+            <p:ph idx="1"/>
+          </p:nvPr>
+        </p:nvSpPr>
+        <p:spPr/>
+        <p:txBody>
+          <a:bodyPr/>
+          <a:lstStyle/>
+          <a:p>
+            <a:r>
+              <a:rPr lang="en-US" dirty="0" smtClean="0"/>
+              <a:t>To exit a process which has spawned a thread</a:t>
+            </a:r>
+          </a:p>
+          <a:p>
+            <a:pPr marL="800100" lvl="1" indent="-342900"/>
+            <a:r>
+              <a:rPr lang="en-US" dirty="0" smtClean="0"/>
+              <a:t>Call </a:t>
+            </a:r>
+            <a:r>
+              <a:rPr lang="en-US" dirty="0" smtClean="0">
+                <a:latin typeface="Courier New" panose="02070309020205020404" pitchFamily="49" charset="0"/>
+                <a:cs typeface="Courier New" panose="02070309020205020404" pitchFamily="49" charset="0"/>
+              </a:rPr>
+              <a:t>detach</a:t>
+            </a:r>
+            <a:r>
+              <a:rPr lang="en-US" dirty="0" smtClean="0"/>
+              <a:t> on the thread</a:t>
+            </a:r>
+          </a:p>
+          <a:p>
+            <a:pPr marL="800100" lvl="1" indent="-342900"/>
+            <a:r>
+              <a:rPr lang="en-US" dirty="0" smtClean="0"/>
+              <a:t>Call </a:t>
+            </a:r>
+            <a:r>
+              <a:rPr lang="en-US" dirty="0" smtClean="0">
+                <a:latin typeface="Courier New" panose="02070309020205020404" pitchFamily="49" charset="0"/>
+                <a:cs typeface="Courier New" panose="02070309020205020404" pitchFamily="49" charset="0"/>
+              </a:rPr>
+              <a:t>join</a:t>
+            </a:r>
+            <a:r>
+              <a:rPr lang="en-US" dirty="0" smtClean="0"/>
+              <a:t> on the thread</a:t>
+            </a:r>
+          </a:p>
+          <a:p>
+            <a:pPr marL="342900" indent="-342900"/>
+            <a:endParaRPr lang="en-US" dirty="0"/>
+          </a:p>
+          <a:p>
+            <a:pPr marL="342900" indent="-342900"/>
+            <a:r>
+              <a:rPr lang="en-US" dirty="0" smtClean="0"/>
+              <a:t>For a thread doing to some work, </a:t>
+            </a:r>
+            <a:r>
+              <a:rPr lang="en-US" dirty="0" smtClean="0">
+                <a:latin typeface="Courier New" panose="02070309020205020404" pitchFamily="49" charset="0"/>
+                <a:cs typeface="Courier New" panose="02070309020205020404" pitchFamily="49" charset="0"/>
+              </a:rPr>
+              <a:t>detach</a:t>
+            </a:r>
+            <a:r>
+              <a:rPr lang="en-US" dirty="0" smtClean="0"/>
+              <a:t> can be problematic.</a:t>
+            </a:r>
+          </a:p>
+          <a:p>
+            <a:pPr marL="342900" indent="-342900"/>
+            <a:r>
+              <a:rPr lang="en-US" dirty="0" smtClean="0">
+                <a:solidFill>
+                  <a:schemeClr val="accent3"/>
+                </a:solidFill>
+              </a:rPr>
+              <a:t>Guideline</a:t>
+            </a:r>
+          </a:p>
+          <a:p>
+            <a:pPr marL="800100" lvl="1" indent="-342900"/>
+            <a:r>
+              <a:rPr lang="en-US" dirty="0" smtClean="0">
+                <a:solidFill>
+                  <a:schemeClr val="accent3"/>
+                </a:solidFill>
+              </a:rPr>
+              <a:t>Prefer to exit a thread by signaling a condition variable</a:t>
+            </a:r>
+          </a:p>
+          <a:p>
+            <a:pPr marL="342900" indent="-342900"/>
+            <a:endParaRPr lang="en-US" dirty="0">
+              <a:solidFill>
+                <a:schemeClr val="accent3"/>
+              </a:solidFill>
+            </a:endParaRPr>
+          </a:p>
+          <a:p>
+            <a:pPr marL="342900" indent="-342900"/>
+            <a:r>
+              <a:rPr lang="en-US" dirty="0" smtClean="0"/>
+              <a:t>Let’s see an example.</a:t>
+            </a:r>
+            <a:endParaRPr lang="en-US" dirty="0"/>
+          </a:p>
+        </p:txBody>
+      </p:sp>
+      <p:sp>
+        <p:nvSpPr>
+          <p:cNvPr id="4" name="Slide Number Placeholder 3"/>
+          <p:cNvSpPr>
+            <a:spLocks noGrp="1"/>
+          </p:cNvSpPr>
+          <p:nvPr>
+            <p:ph type="sldNum" sz="quarter" idx="12"/>
+          </p:nvPr>
+        </p:nvSpPr>
+        <p:spPr/>
+        <p:txBody>
+          <a:bodyPr/>
+          <a:lstStyle/>
+          <a:p>
+            <a:fld id="{6DA12B36-9664-4CB0-8B2E-F4A2F44AE97E}" type="slidenum">
+              <a:rPr lang="en-US" smtClean="0"/>
+              <a:t>12</a:t>
+            </a:fld>
+            <a:endParaRPr lang="en-US"/>
+          </a:p>
+        </p:txBody>
+      </p:sp>
+    </p:spTree>
+    <p:extLst>
+      <p:ext uri="{BB962C8B-B14F-4D97-AF65-F5344CB8AC3E}">
+        <p14:creationId xmlns:p14="http://schemas.microsoft.com/office/powerpoint/2010/main" val="4227852441"/>
+      </p:ext>
+    </p:extLst>
+  </p:cSld>
+  <p:clrMapOvr>
+    <a:masterClrMapping/>
+  </p:clrMapOvr>
+</p:sld>
+</file>
+
+<file path=ppt/slides/slide13.xml><?xml version="1.0" encoding="utf-8"?>
+<p:sld xmlns:a="http://schemas.openxmlformats.org/drawingml/2006/main" xmlns:r="http://schemas.openxmlformats.org/officeDocument/2006/relationships" xmlns:p="http://schemas.openxmlformats.org/presentationml/2006/main">
+  <p:cSld>
+    <p:spTree>
+      <p:nvGrpSpPr>
+        <p:cNvPr id="1" name=""/>
+        <p:cNvGrpSpPr/>
+        <p:nvPr/>
+      </p:nvGrpSpPr>
+      <p:grpSpPr>
+        <a:xfrm>
+          <a:off x="0" y="0"/>
+          <a:ext cx="0" cy="0"/>
+          <a:chOff x="0" y="0"/>
+          <a:chExt cx="0" cy="0"/>
+        </a:xfrm>
+      </p:grpSpPr>
+      <p:sp>
+        <p:nvSpPr>
+          <p:cNvPr id="2" name="Title 1"/>
+          <p:cNvSpPr>
+            <a:spLocks noGrp="1"/>
+          </p:cNvSpPr>
+          <p:nvPr>
+            <p:ph type="title"/>
+          </p:nvPr>
+        </p:nvSpPr>
+        <p:spPr/>
+        <p:txBody>
+          <a:bodyPr/>
+          <a:lstStyle/>
+          <a:p>
+            <a:r>
+              <a:rPr lang="en-US" dirty="0" smtClean="0"/>
+              <a:t>Give gauss a job to do</a:t>
+            </a:r>
+            <a:endParaRPr lang="en-US" dirty="0"/>
+          </a:p>
+        </p:txBody>
+      </p:sp>
+      <p:sp>
+        <p:nvSpPr>
+          <p:cNvPr id="3" name="Content Placeholder 2"/>
+          <p:cNvSpPr>
+            <a:spLocks noGrp="1"/>
+          </p:cNvSpPr>
+          <p:nvPr>
+            <p:ph idx="1"/>
+          </p:nvPr>
+        </p:nvSpPr>
+        <p:spPr/>
+        <p:txBody>
+          <a:bodyPr/>
+          <a:lstStyle/>
+          <a:p>
+            <a:r>
+              <a:rPr lang="en-US" dirty="0" smtClean="0"/>
+              <a:t>Suppose instead we want to give the </a:t>
+            </a:r>
+            <a:r>
+              <a:rPr lang="en-US" dirty="0" smtClean="0">
+                <a:latin typeface="Courier New" panose="02070309020205020404" pitchFamily="49" charset="0"/>
+                <a:cs typeface="Courier New" panose="02070309020205020404" pitchFamily="49" charset="0"/>
+              </a:rPr>
+              <a:t>gauss</a:t>
+            </a:r>
+            <a:r>
+              <a:rPr lang="en-US" dirty="0" smtClean="0"/>
+              <a:t> method a fix number of values to sum, and let it run.</a:t>
+            </a:r>
+          </a:p>
+          <a:p>
+            <a:pPr marL="800100" lvl="1" indent="-342900"/>
+            <a:r>
+              <a:rPr lang="en-US" dirty="0" smtClean="0"/>
+              <a:t>We can avoid the overhead and complexity of </a:t>
+            </a:r>
+            <a:r>
+              <a:rPr lang="en-US" dirty="0" err="1" smtClean="0">
+                <a:latin typeface="Courier New" panose="02070309020205020404" pitchFamily="49" charset="0"/>
+                <a:cs typeface="Courier New" panose="02070309020205020404" pitchFamily="49" charset="0"/>
+              </a:rPr>
+              <a:t>std</a:t>
+            </a:r>
+            <a:r>
+              <a:rPr lang="en-US" dirty="0" smtClean="0">
+                <a:latin typeface="Courier New" panose="02070309020205020404" pitchFamily="49" charset="0"/>
+                <a:cs typeface="Courier New" panose="02070309020205020404" pitchFamily="49" charset="0"/>
+              </a:rPr>
+              <a:t>::</a:t>
+            </a:r>
+            <a:r>
+              <a:rPr lang="en-US" dirty="0" err="1" smtClean="0">
+                <a:latin typeface="Courier New" panose="02070309020205020404" pitchFamily="49" charset="0"/>
+                <a:cs typeface="Courier New" panose="02070309020205020404" pitchFamily="49" charset="0"/>
+              </a:rPr>
+              <a:t>condition_variable</a:t>
+            </a:r>
+            <a:endParaRPr lang="en-US" dirty="0" smtClean="0">
+              <a:latin typeface="Courier New" panose="02070309020205020404" pitchFamily="49" charset="0"/>
+              <a:cs typeface="Courier New" panose="02070309020205020404" pitchFamily="49" charset="0"/>
+            </a:endParaRPr>
+          </a:p>
+          <a:p>
+            <a:pPr marL="800100" lvl="1" indent="-342900"/>
+            <a:r>
+              <a:rPr lang="en-US" dirty="0" smtClean="0">
+                <a:cs typeface="Courier New" panose="02070309020205020404" pitchFamily="49" charset="0"/>
+              </a:rPr>
+              <a:t>We still want to do other work while </a:t>
+            </a:r>
+            <a:r>
+              <a:rPr lang="en-US" dirty="0" smtClean="0">
+                <a:latin typeface="Courier New" panose="02070309020205020404" pitchFamily="49" charset="0"/>
+                <a:cs typeface="Courier New" panose="02070309020205020404" pitchFamily="49" charset="0"/>
+              </a:rPr>
+              <a:t>gauss</a:t>
+            </a:r>
+            <a:r>
+              <a:rPr lang="en-US" dirty="0" smtClean="0">
+                <a:cs typeface="Courier New" panose="02070309020205020404" pitchFamily="49" charset="0"/>
+              </a:rPr>
+              <a:t> is working, and get its result when we need it.</a:t>
+            </a:r>
+          </a:p>
+          <a:p>
+            <a:pPr marL="342900" indent="-342900"/>
+            <a:r>
+              <a:rPr lang="en-US" dirty="0" smtClean="0">
+                <a:cs typeface="Courier New" panose="02070309020205020404" pitchFamily="49" charset="0"/>
+              </a:rPr>
+              <a:t>C++ provides an abstraction named </a:t>
+            </a:r>
+            <a:r>
+              <a:rPr lang="en-US" dirty="0" err="1" smtClean="0">
+                <a:latin typeface="Courier New" panose="02070309020205020404" pitchFamily="49" charset="0"/>
+                <a:cs typeface="Courier New" panose="02070309020205020404" pitchFamily="49" charset="0"/>
+              </a:rPr>
+              <a:t>std</a:t>
+            </a:r>
+            <a:r>
+              <a:rPr lang="en-US" dirty="0" smtClean="0">
+                <a:latin typeface="Courier New" panose="02070309020205020404" pitchFamily="49" charset="0"/>
+                <a:cs typeface="Courier New" panose="02070309020205020404" pitchFamily="49" charset="0"/>
+              </a:rPr>
+              <a:t>::</a:t>
+            </a:r>
+            <a:r>
+              <a:rPr lang="en-US" dirty="0" err="1" smtClean="0">
+                <a:latin typeface="Courier New" panose="02070309020205020404" pitchFamily="49" charset="0"/>
+                <a:cs typeface="Courier New" panose="02070309020205020404" pitchFamily="49" charset="0"/>
+              </a:rPr>
+              <a:t>asnyc</a:t>
+            </a:r>
+            <a:r>
+              <a:rPr lang="en-US" dirty="0" smtClean="0">
+                <a:cs typeface="Courier New" panose="02070309020205020404" pitchFamily="49" charset="0"/>
+              </a:rPr>
+              <a:t> to execute an </a:t>
+            </a:r>
+            <a:r>
+              <a:rPr lang="en-US" i="1" dirty="0" smtClean="0">
+                <a:cs typeface="Courier New" panose="02070309020205020404" pitchFamily="49" charset="0"/>
+              </a:rPr>
+              <a:t>asynchronous task</a:t>
+            </a:r>
+            <a:r>
+              <a:rPr lang="en-US" dirty="0" smtClean="0">
+                <a:cs typeface="Courier New" panose="02070309020205020404" pitchFamily="49" charset="0"/>
+              </a:rPr>
+              <a:t>.</a:t>
+            </a:r>
+          </a:p>
+          <a:p>
+            <a:pPr marL="800100" lvl="1" indent="-342900"/>
+            <a:r>
+              <a:rPr lang="en-US" dirty="0" err="1">
+                <a:latin typeface="Courier New" panose="02070309020205020404" pitchFamily="49" charset="0"/>
+                <a:cs typeface="Courier New" panose="02070309020205020404" pitchFamily="49" charset="0"/>
+              </a:rPr>
+              <a:t>s</a:t>
+            </a:r>
+            <a:r>
+              <a:rPr lang="en-US" dirty="0" err="1" smtClean="0">
+                <a:latin typeface="Courier New" panose="02070309020205020404" pitchFamily="49" charset="0"/>
+                <a:cs typeface="Courier New" panose="02070309020205020404" pitchFamily="49" charset="0"/>
+              </a:rPr>
+              <a:t>td</a:t>
+            </a:r>
+            <a:r>
+              <a:rPr lang="en-US" dirty="0" smtClean="0">
+                <a:latin typeface="Courier New" panose="02070309020205020404" pitchFamily="49" charset="0"/>
+                <a:cs typeface="Courier New" panose="02070309020205020404" pitchFamily="49" charset="0"/>
+              </a:rPr>
+              <a:t>::</a:t>
+            </a:r>
+            <a:r>
+              <a:rPr lang="en-US" dirty="0" err="1" smtClean="0">
+                <a:latin typeface="Courier New" panose="02070309020205020404" pitchFamily="49" charset="0"/>
+                <a:cs typeface="Courier New" panose="02070309020205020404" pitchFamily="49" charset="0"/>
+              </a:rPr>
+              <a:t>async</a:t>
+            </a:r>
+            <a:r>
+              <a:rPr lang="en-US" dirty="0" smtClean="0">
+                <a:cs typeface="Courier New" panose="02070309020205020404" pitchFamily="49" charset="0"/>
+              </a:rPr>
+              <a:t> excepts a callable object list the </a:t>
+            </a:r>
+            <a:r>
+              <a:rPr lang="en-US" dirty="0" err="1" smtClean="0">
+                <a:latin typeface="Courier New" panose="02070309020205020404" pitchFamily="49" charset="0"/>
+                <a:cs typeface="Courier New" panose="02070309020205020404" pitchFamily="49" charset="0"/>
+              </a:rPr>
+              <a:t>std</a:t>
+            </a:r>
+            <a:r>
+              <a:rPr lang="en-US" dirty="0" smtClean="0">
+                <a:latin typeface="Courier New" panose="02070309020205020404" pitchFamily="49" charset="0"/>
+                <a:cs typeface="Courier New" panose="02070309020205020404" pitchFamily="49" charset="0"/>
+              </a:rPr>
+              <a:t>::thread</a:t>
+            </a:r>
+            <a:r>
+              <a:rPr lang="en-US" dirty="0" smtClean="0">
+                <a:cs typeface="Courier New" panose="02070309020205020404" pitchFamily="49" charset="0"/>
+              </a:rPr>
+              <a:t> constructor</a:t>
+            </a:r>
+          </a:p>
+          <a:p>
+            <a:pPr marL="800100" lvl="1" indent="-342900"/>
+            <a:r>
+              <a:rPr lang="en-US" dirty="0" err="1" smtClean="0">
+                <a:latin typeface="Courier New" panose="02070309020205020404" pitchFamily="49" charset="0"/>
+                <a:cs typeface="Courier New" panose="02070309020205020404" pitchFamily="49" charset="0"/>
+              </a:rPr>
+              <a:t>std</a:t>
+            </a:r>
+            <a:r>
+              <a:rPr lang="en-US" dirty="0" smtClean="0">
+                <a:latin typeface="Courier New" panose="02070309020205020404" pitchFamily="49" charset="0"/>
+                <a:cs typeface="Courier New" panose="02070309020205020404" pitchFamily="49" charset="0"/>
+              </a:rPr>
+              <a:t>::</a:t>
+            </a:r>
+            <a:r>
+              <a:rPr lang="en-US" dirty="0" err="1" smtClean="0">
+                <a:latin typeface="Courier New" panose="02070309020205020404" pitchFamily="49" charset="0"/>
+                <a:cs typeface="Courier New" panose="02070309020205020404" pitchFamily="49" charset="0"/>
+              </a:rPr>
+              <a:t>async</a:t>
+            </a:r>
+            <a:r>
+              <a:rPr lang="en-US" dirty="0" smtClean="0">
+                <a:cs typeface="Courier New" panose="02070309020205020404" pitchFamily="49" charset="0"/>
+              </a:rPr>
+              <a:t> returns a </a:t>
+            </a:r>
+            <a:r>
+              <a:rPr lang="en-US" dirty="0" err="1" smtClean="0">
+                <a:latin typeface="Courier New" panose="02070309020205020404" pitchFamily="49" charset="0"/>
+                <a:cs typeface="Courier New" panose="02070309020205020404" pitchFamily="49" charset="0"/>
+              </a:rPr>
+              <a:t>std</a:t>
+            </a:r>
+            <a:r>
+              <a:rPr lang="en-US" dirty="0" smtClean="0">
+                <a:latin typeface="Courier New" panose="02070309020205020404" pitchFamily="49" charset="0"/>
+                <a:cs typeface="Courier New" panose="02070309020205020404" pitchFamily="49" charset="0"/>
+              </a:rPr>
+              <a:t>::future</a:t>
+            </a:r>
+            <a:r>
+              <a:rPr lang="en-US" dirty="0" smtClean="0">
+                <a:cs typeface="Courier New" panose="02070309020205020404" pitchFamily="49" charset="0"/>
+              </a:rPr>
+              <a:t> which will have the return value of the callable object </a:t>
+            </a:r>
+            <a:r>
+              <a:rPr lang="en-US" dirty="0" smtClean="0">
+                <a:solidFill>
+                  <a:schemeClr val="tx2"/>
+                </a:solidFill>
+                <a:cs typeface="Courier New" panose="02070309020205020404" pitchFamily="49" charset="0"/>
+              </a:rPr>
+              <a:t>when it is ready</a:t>
+            </a:r>
+            <a:endParaRPr lang="en-US" dirty="0">
+              <a:solidFill>
+                <a:schemeClr val="tx2"/>
+              </a:solidFill>
+              <a:cs typeface="Courier New" panose="02070309020205020404" pitchFamily="49" charset="0"/>
+            </a:endParaRPr>
+          </a:p>
+        </p:txBody>
+      </p:sp>
+      <p:sp>
+        <p:nvSpPr>
+          <p:cNvPr id="4" name="Slide Number Placeholder 3"/>
+          <p:cNvSpPr>
+            <a:spLocks noGrp="1"/>
+          </p:cNvSpPr>
+          <p:nvPr>
+            <p:ph type="sldNum" sz="quarter" idx="12"/>
+          </p:nvPr>
+        </p:nvSpPr>
+        <p:spPr/>
+        <p:txBody>
+          <a:bodyPr/>
+          <a:lstStyle/>
+          <a:p>
+            <a:fld id="{6DA12B36-9664-4CB0-8B2E-F4A2F44AE97E}" type="slidenum">
+              <a:rPr lang="en-US" smtClean="0"/>
+              <a:t>13</a:t>
+            </a:fld>
+            <a:endParaRPr lang="en-US"/>
+          </a:p>
+        </p:txBody>
+      </p:sp>
+    </p:spTree>
+    <p:extLst>
+      <p:ext uri="{BB962C8B-B14F-4D97-AF65-F5344CB8AC3E}">
+        <p14:creationId xmlns:p14="http://schemas.microsoft.com/office/powerpoint/2010/main" val="1566791258"/>
+      </p:ext>
+    </p:extLst>
+  </p:cSld>
+  <p:clrMapOvr>
+    <a:masterClrMapping/>
+  </p:clrMapOvr>
+</p:sld>
+</file>
+
 <file path=ppt/slides/slide2.xml><?xml version="1.0" encoding="utf-8"?>
 <p:sld xmlns:a="http://schemas.openxmlformats.org/drawingml/2006/main" xmlns:r="http://schemas.openxmlformats.org/officeDocument/2006/relationships" xmlns:p="http://schemas.openxmlformats.org/presentationml/2006/main">
   <p:cSld>
@@ -3882,6 +4823,161 @@
           <a:p>
             <a:r>
               <a:rPr lang="en-US" dirty="0" smtClean="0"/>
+              <a:t>Asynchronous operations </a:t>
+            </a:r>
+            <a:endParaRPr lang="en-US" dirty="0"/>
+          </a:p>
+        </p:txBody>
+      </p:sp>
+      <p:sp>
+        <p:nvSpPr>
+          <p:cNvPr id="3" name="Content Placeholder 2"/>
+          <p:cNvSpPr>
+            <a:spLocks noGrp="1"/>
+          </p:cNvSpPr>
+          <p:nvPr>
+            <p:ph idx="1"/>
+          </p:nvPr>
+        </p:nvSpPr>
+        <p:spPr/>
+        <p:txBody>
+          <a:bodyPr/>
+          <a:lstStyle/>
+          <a:p>
+            <a:r>
+              <a:rPr lang="en-US" dirty="0" smtClean="0"/>
+              <a:t>Two operations are </a:t>
+            </a:r>
+            <a:r>
+              <a:rPr lang="en-US" i="1" dirty="0" smtClean="0"/>
+              <a:t>asynchronous</a:t>
+            </a:r>
+            <a:r>
+              <a:rPr lang="en-US" dirty="0" smtClean="0"/>
+              <a:t> when we have no knowledge of how the operating system will execute them</a:t>
+            </a:r>
+          </a:p>
+          <a:p>
+            <a:pPr marL="800100" lvl="1" indent="-342900"/>
+            <a:r>
+              <a:rPr lang="en-US" dirty="0" smtClean="0"/>
+              <a:t>Preemptive multitasking operating systems use time slices to execute instructions (Windows and Linus are examples).</a:t>
+            </a:r>
+          </a:p>
+          <a:p>
+            <a:pPr marL="800100" lvl="1" indent="-342900"/>
+            <a:r>
+              <a:rPr lang="en-US" dirty="0" smtClean="0"/>
+              <a:t>A given processor, in a time slice</a:t>
+            </a:r>
+          </a:p>
+          <a:p>
+            <a:pPr marL="1485900" lvl="2" indent="-342900"/>
+            <a:r>
+              <a:rPr lang="en-US" dirty="0" smtClean="0"/>
+              <a:t>Executes a sequence of instructions</a:t>
+            </a:r>
+          </a:p>
+          <a:p>
+            <a:pPr marL="1485900" lvl="2" indent="-342900"/>
+            <a:r>
+              <a:rPr lang="en-US" dirty="0" smtClean="0"/>
+              <a:t>Stores its register values (its context)</a:t>
+            </a:r>
+          </a:p>
+          <a:p>
+            <a:pPr marL="1485900" lvl="2" indent="-342900"/>
+            <a:r>
+              <a:rPr lang="en-US" dirty="0" smtClean="0"/>
+              <a:t>Switches to execute a different sequence of instructions</a:t>
+            </a:r>
+          </a:p>
+          <a:p>
+            <a:pPr marL="800100" lvl="1" indent="-342900"/>
+            <a:r>
+              <a:rPr lang="en-US" dirty="0" smtClean="0"/>
+              <a:t>The instructions way be from a different processes or different threads in the same process</a:t>
+            </a:r>
+          </a:p>
+          <a:p>
+            <a:pPr marL="800100" lvl="1" indent="-342900"/>
+            <a:r>
+              <a:rPr lang="en-US" dirty="0" smtClean="0"/>
+              <a:t>This makes coding with multiple threads both difficult and useful.</a:t>
+            </a:r>
+          </a:p>
+        </p:txBody>
+      </p:sp>
+      <p:sp>
+        <p:nvSpPr>
+          <p:cNvPr id="4" name="Slide Number Placeholder 3"/>
+          <p:cNvSpPr>
+            <a:spLocks noGrp="1"/>
+          </p:cNvSpPr>
+          <p:nvPr>
+            <p:ph type="sldNum" sz="quarter" idx="12"/>
+          </p:nvPr>
+        </p:nvSpPr>
+        <p:spPr/>
+        <p:txBody>
+          <a:bodyPr/>
+          <a:lstStyle/>
+          <a:p>
+            <a:fld id="{6DA12B36-9664-4CB0-8B2E-F4A2F44AE97E}" type="slidenum">
+              <a:rPr lang="en-US" smtClean="0"/>
+              <a:t>2</a:t>
+            </a:fld>
+            <a:endParaRPr lang="en-US"/>
+          </a:p>
+        </p:txBody>
+      </p:sp>
+    </p:spTree>
+    <p:extLst>
+      <p:ext uri="{BB962C8B-B14F-4D97-AF65-F5344CB8AC3E}">
+        <p14:creationId xmlns:p14="http://schemas.microsoft.com/office/powerpoint/2010/main" val="2574647839"/>
+      </p:ext>
+    </p:extLst>
+  </p:cSld>
+  <p:clrMapOvr>
+    <a:masterClrMapping/>
+  </p:clrMapOvr>
+</p:sld>
+</file>
+
+<file path=ppt/slides/slide3.xml><?xml version="1.0" encoding="utf-8"?>
+<p:sld xmlns:a="http://schemas.openxmlformats.org/drawingml/2006/main" xmlns:r="http://schemas.openxmlformats.org/officeDocument/2006/relationships" xmlns:p="http://schemas.openxmlformats.org/presentationml/2006/main">
+  <p:cSld>
+    <p:spTree>
+      <p:nvGrpSpPr>
+        <p:cNvPr id="1" name=""/>
+        <p:cNvGrpSpPr/>
+        <p:nvPr/>
+      </p:nvGrpSpPr>
+      <p:grpSpPr>
+        <a:xfrm>
+          <a:off x="0" y="0"/>
+          <a:ext cx="0" cy="0"/>
+          <a:chOff x="0" y="0"/>
+          <a:chExt cx="0" cy="0"/>
+        </a:xfrm>
+      </p:grpSpPr>
+      <p:sp>
+        <p:nvSpPr>
+          <p:cNvPr id="2" name="Title 1"/>
+          <p:cNvSpPr>
+            <a:spLocks noGrp="1"/>
+          </p:cNvSpPr>
+          <p:nvPr>
+            <p:ph type="title"/>
+          </p:nvPr>
+        </p:nvSpPr>
+        <p:spPr/>
+        <p:txBody>
+          <a:bodyPr/>
+          <a:lstStyle/>
+          <a:p>
+            <a:r>
+              <a:rPr lang="en-US" dirty="0" smtClean="0"/>
               <a:t>Condition variables</a:t>
             </a:r>
             <a:endParaRPr lang="en-US" dirty="0"/>
@@ -3953,8 +5049,20 @@
             <a:pPr marL="800100" lvl="1" indent="-342900"/>
             <a:r>
               <a:rPr lang="en-US" sz="2400" dirty="0" smtClean="0"/>
-              <a:t>Allows a thread to know exactly when to do something</a:t>
-            </a:r>
+              <a:t>Allows a thread to know exactly when to do </a:t>
+            </a:r>
+            <a:r>
+              <a:rPr lang="en-US" sz="2400" dirty="0" smtClean="0"/>
+              <a:t>something</a:t>
+            </a:r>
+          </a:p>
+          <a:p>
+            <a:pPr marL="800100" lvl="1" indent="-342900"/>
+            <a:r>
+              <a:rPr lang="en-US" sz="2400" dirty="0" smtClean="0"/>
+              <a:t>Used to synchronize two asynchronous operations</a:t>
+            </a:r>
+            <a:endParaRPr lang="en-US" sz="2400" dirty="0" smtClean="0"/>
           </a:p>
           <a:p>
             <a:pPr marL="342900" indent="-342900"/>
@@ -3986,7 +5094,7 @@
           <a:p>
             <a:fld id="{6DA12B36-9664-4CB0-8B2E-F4A2F44AE97E}" type="slidenum">
               <a:rPr lang="en-US" smtClean="0"/>
-              <a:t>2</a:t>
+              <a:t>3</a:t>
             </a:fld>
             <a:endParaRPr lang="en-US"/>
           </a:p>
@@ -4012,7 +5120,7 @@
 </p:sld>
 </file>
 
-<file path=ppt/slides/slide3.xml><?xml version="1.0" encoding="utf-8"?>
+<file path=ppt/slides/slide4.xml><?xml version="1.0" encoding="utf-8"?>
 <p:sld xmlns:a="http://schemas.openxmlformats.org/drawingml/2006/main" xmlns:r="http://schemas.openxmlformats.org/officeDocument/2006/relationships" xmlns:p="http://schemas.openxmlformats.org/presentationml/2006/main">
   <p:cSld>
     <p:spTree>
@@ -4510,7 +5618,7 @@
           <a:p>
             <a:fld id="{6DA12B36-9664-4CB0-8B2E-F4A2F44AE97E}" type="slidenum">
               <a:rPr lang="en-US" smtClean="0"/>
-              <a:t>3</a:t>
+              <a:t>4</a:t>
             </a:fld>
             <a:endParaRPr lang="en-US"/>
           </a:p>
@@ -5416,7 +6524,7 @@
 </p:sld>
 </file>
 
-<file path=ppt/slides/slide4.xml><?xml version="1.0" encoding="utf-8"?>
+<file path=ppt/slides/slide5.xml><?xml version="1.0" encoding="utf-8"?>
 <p:sld xmlns:a="http://schemas.openxmlformats.org/drawingml/2006/main" xmlns:r="http://schemas.openxmlformats.org/officeDocument/2006/relationships" xmlns:p="http://schemas.openxmlformats.org/presentationml/2006/main">
   <p:cSld>
     <p:spTree>
@@ -5516,18 +6624,101 @@
               <a:t> </a:t>
             </a:r>
             <a:r>
-              <a:rPr lang="en-US" dirty="0" err="1">
+              <a:rPr lang="en-US" dirty="0" err="1" smtClean="0">
                 <a:latin typeface="Courier New" panose="02070309020205020404" pitchFamily="49" charset="0"/>
                 <a:cs typeface="Courier New" panose="02070309020205020404" pitchFamily="49" charset="0"/>
               </a:rPr>
               <a:t>notifier</a:t>
             </a:r>
             <a:r>
+              <a:rPr lang="en-US" dirty="0" smtClean="0">
+                <a:latin typeface="Courier New" panose="02070309020205020404" pitchFamily="49" charset="0"/>
+                <a:cs typeface="Courier New" panose="02070309020205020404" pitchFamily="49" charset="0"/>
+              </a:rPr>
+              <a:t>;</a:t>
+            </a:r>
+          </a:p>
+          <a:p>
+            <a:r>
+              <a:rPr lang="en-US" dirty="0" err="1" smtClean="0">
+                <a:solidFill>
+                  <a:srgbClr val="7F0055"/>
+                </a:solidFill>
+                <a:latin typeface="Courier New" panose="02070309020205020404" pitchFamily="49" charset="0"/>
+                <a:cs typeface="Courier New" panose="02070309020205020404" pitchFamily="49" charset="0"/>
+              </a:rPr>
+              <a:t>int</a:t>
+            </a:r>
+            <a:r>
+              <a:rPr lang="en-US" dirty="0" smtClean="0">
+                <a:latin typeface="Courier New" panose="02070309020205020404" pitchFamily="49" charset="0"/>
+                <a:cs typeface="Courier New" panose="02070309020205020404" pitchFamily="49" charset="0"/>
+              </a:rPr>
+              <a:t> </a:t>
+            </a:r>
+            <a:r>
               <a:rPr lang="en-US" dirty="0">
-                <a:latin typeface="Courier New" panose="02070309020205020404" pitchFamily="49" charset="0"/>
-                <a:cs typeface="Courier New" panose="02070309020205020404" pitchFamily="49" charset="0"/>
-              </a:rPr>
-              <a:t>; </a:t>
+                <a:solidFill>
+                  <a:srgbClr val="7F0055"/>
+                </a:solidFill>
+                <a:latin typeface="Courier New" panose="02070309020205020404" pitchFamily="49" charset="0"/>
+                <a:cs typeface="Courier New" panose="02070309020205020404" pitchFamily="49" charset="0"/>
+              </a:rPr>
+              <a:t>main</a:t>
+            </a:r>
+            <a:r>
+              <a:rPr lang="en-US" dirty="0" smtClean="0">
+                <a:latin typeface="Courier New" panose="02070309020205020404" pitchFamily="49" charset="0"/>
+                <a:cs typeface="Courier New" panose="02070309020205020404" pitchFamily="49" charset="0"/>
+              </a:rPr>
+              <a:t>(){</a:t>
+            </a:r>
+          </a:p>
+          <a:p>
+            <a:r>
+              <a:rPr lang="en-US" dirty="0">
+                <a:latin typeface="Courier New" panose="02070309020205020404" pitchFamily="49" charset="0"/>
+                <a:cs typeface="Courier New" panose="02070309020205020404" pitchFamily="49" charset="0"/>
+              </a:rPr>
+              <a:t> </a:t>
+            </a:r>
+            <a:r>
+              <a:rPr lang="en-US" dirty="0" smtClean="0">
+                <a:latin typeface="Courier New" panose="02070309020205020404" pitchFamily="49" charset="0"/>
+                <a:cs typeface="Courier New" panose="02070309020205020404" pitchFamily="49" charset="0"/>
+              </a:rPr>
+              <a:t> </a:t>
+            </a:r>
+            <a:r>
+              <a:rPr lang="en-US" dirty="0" err="1" smtClean="0">
+                <a:latin typeface="Courier New" panose="02070309020205020404" pitchFamily="49" charset="0"/>
+                <a:cs typeface="Courier New" panose="02070309020205020404" pitchFamily="49" charset="0"/>
+              </a:rPr>
+              <a:t>std</a:t>
+            </a:r>
+            <a:r>
+              <a:rPr lang="en-US" dirty="0">
+                <a:latin typeface="Courier New" panose="02070309020205020404" pitchFamily="49" charset="0"/>
+                <a:cs typeface="Courier New" panose="02070309020205020404" pitchFamily="49" charset="0"/>
+              </a:rPr>
+              <a:t>::</a:t>
+            </a:r>
+            <a:r>
+              <a:rPr lang="en-US" dirty="0">
+                <a:solidFill>
+                  <a:srgbClr val="7F0055"/>
+                </a:solidFill>
+                <a:latin typeface="Courier New" panose="02070309020205020404" pitchFamily="49" charset="0"/>
+                <a:cs typeface="Courier New" panose="02070309020205020404" pitchFamily="49" charset="0"/>
+              </a:rPr>
+              <a:t>queue</a:t>
+            </a:r>
+            <a:r>
+              <a:rPr lang="en-US" dirty="0">
+                <a:latin typeface="Courier New" panose="02070309020205020404" pitchFamily="49" charset="0"/>
+                <a:cs typeface="Courier New" panose="02070309020205020404" pitchFamily="49" charset="0"/>
+              </a:rPr>
+              <a:t>&lt;</a:t>
             </a:r>
             <a:r>
               <a:rPr lang="en-US" dirty="0" err="1">
@@ -5544,8 +6735,27 @@
                 <a:latin typeface="Courier New" panose="02070309020205020404" pitchFamily="49" charset="0"/>
                 <a:cs typeface="Courier New" panose="02070309020205020404" pitchFamily="49" charset="0"/>
               </a:rPr>
-              <a:t> </a:t>
-            </a:r>
+              <a:t>&gt; </a:t>
+            </a:r>
+            <a:r>
+              <a:rPr lang="en-US" dirty="0" smtClean="0">
+                <a:solidFill>
+                  <a:srgbClr val="7F0055"/>
+                </a:solidFill>
+                <a:latin typeface="Courier New" panose="02070309020205020404" pitchFamily="49" charset="0"/>
+                <a:cs typeface="Courier New" panose="02070309020205020404" pitchFamily="49" charset="0"/>
+              </a:rPr>
+              <a:t>queue</a:t>
+            </a:r>
+            <a:r>
+              <a:rPr lang="en-US" dirty="0" smtClean="0">
+                <a:latin typeface="Courier New" panose="02070309020205020404" pitchFamily="49" charset="0"/>
+                <a:cs typeface="Courier New" panose="02070309020205020404" pitchFamily="49" charset="0"/>
+              </a:rPr>
+              <a:t>;</a:t>
+            </a:r>
+          </a:p>
+          <a:p>
             <a:r>
               <a:rPr lang="en-US" dirty="0">
                 <a:solidFill>
@@ -5554,22 +6764,56 @@
                 <a:latin typeface="Courier New" panose="02070309020205020404" pitchFamily="49" charset="0"/>
                 <a:cs typeface="Courier New" panose="02070309020205020404" pitchFamily="49" charset="0"/>
               </a:rPr>
-              <a:t>main</a:t>
+              <a:t> </a:t>
             </a:r>
             <a:r>
               <a:rPr lang="en-US" dirty="0" smtClean="0">
-                <a:latin typeface="Courier New" panose="02070309020205020404" pitchFamily="49" charset="0"/>
-                <a:cs typeface="Courier New" panose="02070309020205020404" pitchFamily="49" charset="0"/>
-              </a:rPr>
-              <a:t>(){</a:t>
-            </a:r>
-          </a:p>
-          <a:p>
+                <a:solidFill>
+                  <a:srgbClr val="7F0055"/>
+                </a:solidFill>
+                <a:latin typeface="Courier New" panose="02070309020205020404" pitchFamily="49" charset="0"/>
+                <a:cs typeface="Courier New" panose="02070309020205020404" pitchFamily="49" charset="0"/>
+              </a:rPr>
+              <a:t> </a:t>
+            </a:r>
+            <a:r>
+              <a:rPr lang="en-US" dirty="0" err="1" smtClean="0">
+                <a:solidFill>
+                  <a:srgbClr val="7F0055"/>
+                </a:solidFill>
+                <a:latin typeface="Courier New" panose="02070309020205020404" pitchFamily="49" charset="0"/>
+                <a:cs typeface="Courier New" panose="02070309020205020404" pitchFamily="49" charset="0"/>
+              </a:rPr>
+              <a:t>int</a:t>
+            </a:r>
+            <a:r>
+              <a:rPr lang="en-US" dirty="0" smtClean="0">
+                <a:latin typeface="Courier New" panose="02070309020205020404" pitchFamily="49" charset="0"/>
+                <a:cs typeface="Courier New" panose="02070309020205020404" pitchFamily="49" charset="0"/>
+              </a:rPr>
+              <a:t> </a:t>
+            </a:r>
             <a:r>
               <a:rPr lang="en-US" dirty="0">
                 <a:latin typeface="Courier New" panose="02070309020205020404" pitchFamily="49" charset="0"/>
                 <a:cs typeface="Courier New" panose="02070309020205020404" pitchFamily="49" charset="0"/>
               </a:rPr>
+              <a:t>sum = </a:t>
+            </a:r>
+            <a:r>
+              <a:rPr lang="en-US" dirty="0" smtClean="0">
+                <a:latin typeface="Courier New" panose="02070309020205020404" pitchFamily="49" charset="0"/>
+                <a:cs typeface="Courier New" panose="02070309020205020404" pitchFamily="49" charset="0"/>
+              </a:rPr>
+              <a:t>0;</a:t>
+            </a:r>
+          </a:p>
+          <a:p>
+            <a:r>
+              <a:rPr lang="en-US" dirty="0">
+                <a:latin typeface="Courier New" panose="02070309020205020404" pitchFamily="49" charset="0"/>
+                <a:cs typeface="Courier New" panose="02070309020205020404" pitchFamily="49" charset="0"/>
+              </a:rPr>
               <a:t> </a:t>
             </a:r>
             <a:r>
@@ -5591,8 +6835,149 @@
                 <a:latin typeface="Courier New" panose="02070309020205020404" pitchFamily="49" charset="0"/>
                 <a:cs typeface="Courier New" panose="02070309020205020404" pitchFamily="49" charset="0"/>
               </a:rPr>
+              <a:t>::thread t(gauss, </a:t>
+            </a:r>
+            <a:r>
+              <a:rPr lang="en-US" dirty="0" err="1">
+                <a:latin typeface="Courier New" panose="02070309020205020404" pitchFamily="49" charset="0"/>
+                <a:cs typeface="Courier New" panose="02070309020205020404" pitchFamily="49" charset="0"/>
+              </a:rPr>
+              <a:t>std</a:t>
+            </a:r>
+            <a:r>
+              <a:rPr lang="en-US" dirty="0">
+                <a:latin typeface="Courier New" panose="02070309020205020404" pitchFamily="49" charset="0"/>
+                <a:cs typeface="Courier New" panose="02070309020205020404" pitchFamily="49" charset="0"/>
+              </a:rPr>
+              <a:t>::ref(sum</a:t>
+            </a:r>
+            <a:r>
+              <a:rPr lang="en-US" dirty="0" smtClean="0">
+                <a:latin typeface="Courier New" panose="02070309020205020404" pitchFamily="49" charset="0"/>
+                <a:cs typeface="Courier New" panose="02070309020205020404" pitchFamily="49" charset="0"/>
+              </a:rPr>
+              <a:t>));</a:t>
+            </a:r>
+          </a:p>
+          <a:p>
+            <a:r>
+              <a:rPr lang="en-US" dirty="0">
+                <a:latin typeface="Courier New" panose="02070309020205020404" pitchFamily="49" charset="0"/>
+                <a:cs typeface="Courier New" panose="02070309020205020404" pitchFamily="49" charset="0"/>
+              </a:rPr>
+              <a:t> </a:t>
+            </a:r>
+            <a:r>
+              <a:rPr lang="en-US" dirty="0" smtClean="0">
+                <a:latin typeface="Courier New" panose="02070309020205020404" pitchFamily="49" charset="0"/>
+                <a:cs typeface="Courier New" panose="02070309020205020404" pitchFamily="49" charset="0"/>
+              </a:rPr>
+              <a:t> </a:t>
+            </a:r>
+            <a:r>
+              <a:rPr lang="en-US" dirty="0" err="1" smtClean="0">
+                <a:latin typeface="Courier New" panose="02070309020205020404" pitchFamily="49" charset="0"/>
+                <a:cs typeface="Courier New" panose="02070309020205020404" pitchFamily="49" charset="0"/>
+              </a:rPr>
+              <a:t>t.detach</a:t>
+            </a:r>
+            <a:r>
+              <a:rPr lang="en-US" dirty="0" smtClean="0">
+                <a:latin typeface="Courier New" panose="02070309020205020404" pitchFamily="49" charset="0"/>
+                <a:cs typeface="Courier New" panose="02070309020205020404" pitchFamily="49" charset="0"/>
+              </a:rPr>
+              <a:t>();</a:t>
+            </a:r>
+          </a:p>
+          <a:p>
+            <a:r>
+              <a:rPr lang="en-US" dirty="0">
+                <a:latin typeface="Courier New" panose="02070309020205020404" pitchFamily="49" charset="0"/>
+                <a:cs typeface="Courier New" panose="02070309020205020404" pitchFamily="49" charset="0"/>
+              </a:rPr>
+              <a:t> </a:t>
+            </a:r>
+            <a:r>
+              <a:rPr lang="en-US" dirty="0" smtClean="0">
+                <a:latin typeface="Courier New" panose="02070309020205020404" pitchFamily="49" charset="0"/>
+                <a:cs typeface="Courier New" panose="02070309020205020404" pitchFamily="49" charset="0"/>
+              </a:rPr>
+              <a:t> {</a:t>
+            </a:r>
+          </a:p>
+          <a:p>
+            <a:r>
+              <a:rPr lang="en-US" dirty="0">
+                <a:latin typeface="Courier New" panose="02070309020205020404" pitchFamily="49" charset="0"/>
+                <a:cs typeface="Courier New" panose="02070309020205020404" pitchFamily="49" charset="0"/>
+              </a:rPr>
+              <a:t> </a:t>
+            </a:r>
+            <a:r>
+              <a:rPr lang="en-US" dirty="0" smtClean="0">
+                <a:latin typeface="Courier New" panose="02070309020205020404" pitchFamily="49" charset="0"/>
+                <a:cs typeface="Courier New" panose="02070309020205020404" pitchFamily="49" charset="0"/>
+              </a:rPr>
+              <a:t>   </a:t>
+            </a:r>
+            <a:r>
+              <a:rPr lang="en-US" dirty="0" err="1" smtClean="0">
+                <a:latin typeface="Courier New" panose="02070309020205020404" pitchFamily="49" charset="0"/>
+                <a:cs typeface="Courier New" panose="02070309020205020404" pitchFamily="49" charset="0"/>
+              </a:rPr>
+              <a:t>std</a:t>
+            </a:r>
+            <a:r>
+              <a:rPr lang="en-US" dirty="0" smtClean="0">
+                <a:latin typeface="Courier New" panose="02070309020205020404" pitchFamily="49" charset="0"/>
+                <a:cs typeface="Courier New" panose="02070309020205020404" pitchFamily="49" charset="0"/>
+              </a:rPr>
               <a:t>::</a:t>
             </a:r>
+            <a:r>
+              <a:rPr lang="en-US" dirty="0" err="1" smtClean="0">
+                <a:latin typeface="Courier New" panose="02070309020205020404" pitchFamily="49" charset="0"/>
+                <a:cs typeface="Courier New" panose="02070309020205020404" pitchFamily="49" charset="0"/>
+              </a:rPr>
+              <a:t>lock_guard</a:t>
+            </a:r>
+            <a:r>
+              <a:rPr lang="en-US" dirty="0" smtClean="0">
+                <a:latin typeface="Courier New" panose="02070309020205020404" pitchFamily="49" charset="0"/>
+                <a:cs typeface="Courier New" panose="02070309020205020404" pitchFamily="49" charset="0"/>
+              </a:rPr>
+              <a:t>&lt;</a:t>
+            </a:r>
+            <a:r>
+              <a:rPr lang="en-US" dirty="0" err="1" smtClean="0">
+                <a:latin typeface="Courier New" panose="02070309020205020404" pitchFamily="49" charset="0"/>
+                <a:cs typeface="Courier New" panose="02070309020205020404" pitchFamily="49" charset="0"/>
+              </a:rPr>
+              <a:t>std</a:t>
+            </a:r>
+            <a:r>
+              <a:rPr lang="en-US" dirty="0" smtClean="0">
+                <a:latin typeface="Courier New" panose="02070309020205020404" pitchFamily="49" charset="0"/>
+                <a:cs typeface="Courier New" panose="02070309020205020404" pitchFamily="49" charset="0"/>
+              </a:rPr>
+              <a:t>::mutex&gt; </a:t>
+            </a:r>
+            <a:r>
+              <a:rPr lang="en-US" dirty="0" err="1" smtClean="0">
+                <a:latin typeface="Courier New" panose="02070309020205020404" pitchFamily="49" charset="0"/>
+                <a:cs typeface="Courier New" panose="02070309020205020404" pitchFamily="49" charset="0"/>
+              </a:rPr>
+              <a:t>lk</a:t>
+            </a:r>
+            <a:r>
+              <a:rPr lang="en-US" dirty="0" smtClean="0">
+                <a:latin typeface="Courier New" panose="02070309020205020404" pitchFamily="49" charset="0"/>
+                <a:cs typeface="Courier New" panose="02070309020205020404" pitchFamily="49" charset="0"/>
+              </a:rPr>
+              <a:t>(m);</a:t>
+            </a:r>
+          </a:p>
+          <a:p>
             <a:r>
               <a:rPr lang="en-US" dirty="0">
                 <a:solidFill>
@@ -5601,31 +6986,7 @@
                 <a:latin typeface="Courier New" panose="02070309020205020404" pitchFamily="49" charset="0"/>
                 <a:cs typeface="Courier New" panose="02070309020205020404" pitchFamily="49" charset="0"/>
               </a:rPr>
-              <a:t>queue</a:t>
-            </a:r>
-            <a:r>
-              <a:rPr lang="en-US" dirty="0">
-                <a:latin typeface="Courier New" panose="02070309020205020404" pitchFamily="49" charset="0"/>
-                <a:cs typeface="Courier New" panose="02070309020205020404" pitchFamily="49" charset="0"/>
-              </a:rPr>
-              <a:t>&lt;</a:t>
-            </a:r>
-            <a:r>
-              <a:rPr lang="en-US" dirty="0" err="1">
-                <a:solidFill>
-                  <a:srgbClr val="7F0055"/>
-                </a:solidFill>
-                <a:latin typeface="Courier New" panose="02070309020205020404" pitchFamily="49" charset="0"/>
-                <a:cs typeface="Courier New" panose="02070309020205020404" pitchFamily="49" charset="0"/>
-              </a:rPr>
-              <a:t>int</a:t>
-            </a:r>
-            <a:r>
-              <a:rPr lang="en-US" dirty="0">
-                <a:latin typeface="Courier New" panose="02070309020205020404" pitchFamily="49" charset="0"/>
-                <a:cs typeface="Courier New" panose="02070309020205020404" pitchFamily="49" charset="0"/>
-              </a:rPr>
-              <a:t>&gt; </a:t>
+              <a:t> </a:t>
             </a:r>
             <a:r>
               <a:rPr lang="en-US" dirty="0" smtClean="0">
@@ -5635,36 +6996,7 @@
                 <a:latin typeface="Courier New" panose="02070309020205020404" pitchFamily="49" charset="0"/>
                 <a:cs typeface="Courier New" panose="02070309020205020404" pitchFamily="49" charset="0"/>
               </a:rPr>
-              <a:t>queue</a:t>
-            </a:r>
-            <a:r>
-              <a:rPr lang="en-US" dirty="0" smtClean="0">
-                <a:latin typeface="Courier New" panose="02070309020205020404" pitchFamily="49" charset="0"/>
-                <a:cs typeface="Courier New" panose="02070309020205020404" pitchFamily="49" charset="0"/>
-              </a:rPr>
-              <a:t>;</a:t>
-            </a:r>
-          </a:p>
-          <a:p>
-            <a:r>
-              <a:rPr lang="en-US" dirty="0">
-                <a:solidFill>
-                  <a:srgbClr val="7F0055"/>
-                </a:solidFill>
-                <a:latin typeface="Courier New" panose="02070309020205020404" pitchFamily="49" charset="0"/>
-                <a:cs typeface="Courier New" panose="02070309020205020404" pitchFamily="49" charset="0"/>
-              </a:rPr>
-              <a:t> </a:t>
-            </a:r>
-            <a:r>
-              <a:rPr lang="en-US" dirty="0" smtClean="0">
-                <a:solidFill>
-                  <a:srgbClr val="7F0055"/>
-                </a:solidFill>
-                <a:latin typeface="Courier New" panose="02070309020205020404" pitchFamily="49" charset="0"/>
-                <a:cs typeface="Courier New" panose="02070309020205020404" pitchFamily="49" charset="0"/>
-              </a:rPr>
-              <a:t> </a:t>
+              <a:t>   </a:t>
             </a:r>
             <a:r>
               <a:rPr lang="en-US" dirty="0" err="1" smtClean="0">
@@ -5674,282 +7006,67 @@
                 <a:latin typeface="Courier New" panose="02070309020205020404" pitchFamily="49" charset="0"/>
                 <a:cs typeface="Courier New" panose="02070309020205020404" pitchFamily="49" charset="0"/>
               </a:rPr>
-              <a:t>int</a:t>
+              <a:t>queue</a:t>
+            </a:r>
+            <a:r>
+              <a:rPr lang="en-US" dirty="0" err="1" smtClean="0">
+                <a:latin typeface="Courier New" panose="02070309020205020404" pitchFamily="49" charset="0"/>
+                <a:cs typeface="Courier New" panose="02070309020205020404" pitchFamily="49" charset="0"/>
+              </a:rPr>
+              <a:t>.push</a:t>
             </a:r>
             <a:r>
               <a:rPr lang="en-US" dirty="0" smtClean="0">
                 <a:latin typeface="Courier New" panose="02070309020205020404" pitchFamily="49" charset="0"/>
                 <a:cs typeface="Courier New" panose="02070309020205020404" pitchFamily="49" charset="0"/>
               </a:rPr>
+              <a:t>(42);</a:t>
+            </a:r>
+          </a:p>
+          <a:p>
+            <a:r>
+              <a:rPr lang="en-US" dirty="0">
+                <a:latin typeface="Courier New" panose="02070309020205020404" pitchFamily="49" charset="0"/>
+                <a:cs typeface="Courier New" panose="02070309020205020404" pitchFamily="49" charset="0"/>
+              </a:rPr>
               <a:t> </a:t>
             </a:r>
             <a:r>
+              <a:rPr lang="en-US" dirty="0" smtClean="0">
+                <a:latin typeface="Courier New" panose="02070309020205020404" pitchFamily="49" charset="0"/>
+                <a:cs typeface="Courier New" panose="02070309020205020404" pitchFamily="49" charset="0"/>
+              </a:rPr>
+              <a:t> }</a:t>
+            </a:r>
+          </a:p>
+          <a:p>
+            <a:r>
               <a:rPr lang="en-US" dirty="0">
                 <a:latin typeface="Courier New" panose="02070309020205020404" pitchFamily="49" charset="0"/>
                 <a:cs typeface="Courier New" panose="02070309020205020404" pitchFamily="49" charset="0"/>
               </a:rPr>
-              <a:t>sum = </a:t>
+              <a:t> </a:t>
             </a:r>
             <a:r>
               <a:rPr lang="en-US" dirty="0" smtClean="0">
                 <a:latin typeface="Courier New" panose="02070309020205020404" pitchFamily="49" charset="0"/>
                 <a:cs typeface="Courier New" panose="02070309020205020404" pitchFamily="49" charset="0"/>
               </a:rPr>
-              <a:t>0;</a:t>
-            </a:r>
-          </a:p>
-          <a:p>
-            <a:r>
-              <a:rPr lang="en-US" dirty="0">
-                <a:latin typeface="Courier New" panose="02070309020205020404" pitchFamily="49" charset="0"/>
-                <a:cs typeface="Courier New" panose="02070309020205020404" pitchFamily="49" charset="0"/>
-              </a:rPr>
-              <a:t> </a:t>
+              <a:t>   </a:t>
+            </a:r>
+            <a:r>
+              <a:rPr lang="en-US" dirty="0" err="1" smtClean="0">
+                <a:latin typeface="Courier New" panose="02070309020205020404" pitchFamily="49" charset="0"/>
+                <a:cs typeface="Courier New" panose="02070309020205020404" pitchFamily="49" charset="0"/>
+              </a:rPr>
+              <a:t>notifier.notify_one</a:t>
             </a:r>
             <a:r>
               <a:rPr lang="en-US" dirty="0" smtClean="0">
                 <a:latin typeface="Courier New" panose="02070309020205020404" pitchFamily="49" charset="0"/>
                 <a:cs typeface="Courier New" panose="02070309020205020404" pitchFamily="49" charset="0"/>
               </a:rPr>
-              <a:t> </a:t>
-            </a:r>
-            <a:r>
-              <a:rPr lang="en-US" dirty="0" err="1" smtClean="0">
-                <a:latin typeface="Courier New" panose="02070309020205020404" pitchFamily="49" charset="0"/>
-                <a:cs typeface="Courier New" panose="02070309020205020404" pitchFamily="49" charset="0"/>
-              </a:rPr>
-              <a:t>std</a:t>
-            </a:r>
-            <a:r>
-              <a:rPr lang="en-US" dirty="0">
-                <a:latin typeface="Courier New" panose="02070309020205020404" pitchFamily="49" charset="0"/>
-                <a:cs typeface="Courier New" panose="02070309020205020404" pitchFamily="49" charset="0"/>
-              </a:rPr>
-              <a:t>::thread t(gauss, </a:t>
-            </a:r>
-            <a:r>
-              <a:rPr lang="en-US" dirty="0" err="1">
-                <a:latin typeface="Courier New" panose="02070309020205020404" pitchFamily="49" charset="0"/>
-                <a:cs typeface="Courier New" panose="02070309020205020404" pitchFamily="49" charset="0"/>
-              </a:rPr>
-              <a:t>std</a:t>
-            </a:r>
-            <a:r>
-              <a:rPr lang="en-US" dirty="0">
-                <a:latin typeface="Courier New" panose="02070309020205020404" pitchFamily="49" charset="0"/>
-                <a:cs typeface="Courier New" panose="02070309020205020404" pitchFamily="49" charset="0"/>
-              </a:rPr>
-              <a:t>::ref(sum</a:t>
-            </a:r>
-            <a:r>
-              <a:rPr lang="en-US" dirty="0" smtClean="0">
-                <a:latin typeface="Courier New" panose="02070309020205020404" pitchFamily="49" charset="0"/>
-                <a:cs typeface="Courier New" panose="02070309020205020404" pitchFamily="49" charset="0"/>
-              </a:rPr>
-              <a:t>));</a:t>
-            </a:r>
-          </a:p>
-          <a:p>
-            <a:r>
-              <a:rPr lang="en-US" dirty="0">
-                <a:latin typeface="Courier New" panose="02070309020205020404" pitchFamily="49" charset="0"/>
-                <a:cs typeface="Courier New" panose="02070309020205020404" pitchFamily="49" charset="0"/>
-              </a:rPr>
-              <a:t> </a:t>
-            </a:r>
-            <a:r>
-              <a:rPr lang="en-US" dirty="0" smtClean="0">
-                <a:latin typeface="Courier New" panose="02070309020205020404" pitchFamily="49" charset="0"/>
-                <a:cs typeface="Courier New" panose="02070309020205020404" pitchFamily="49" charset="0"/>
-              </a:rPr>
-              <a:t> </a:t>
-            </a:r>
-            <a:r>
-              <a:rPr lang="en-US" dirty="0" err="1" smtClean="0">
-                <a:latin typeface="Courier New" panose="02070309020205020404" pitchFamily="49" charset="0"/>
-                <a:cs typeface="Courier New" panose="02070309020205020404" pitchFamily="49" charset="0"/>
-              </a:rPr>
-              <a:t>t.detach</a:t>
-            </a:r>
-            <a:r>
-              <a:rPr lang="en-US" dirty="0" smtClean="0">
-                <a:latin typeface="Courier New" panose="02070309020205020404" pitchFamily="49" charset="0"/>
-                <a:cs typeface="Courier New" panose="02070309020205020404" pitchFamily="49" charset="0"/>
-              </a:rPr>
               <a:t>();</a:t>
-            </a:r>
-          </a:p>
-          <a:p>
-            <a:r>
-              <a:rPr lang="en-US" dirty="0">
-                <a:latin typeface="Courier New" panose="02070309020205020404" pitchFamily="49" charset="0"/>
-                <a:cs typeface="Courier New" panose="02070309020205020404" pitchFamily="49" charset="0"/>
-              </a:rPr>
-              <a:t> </a:t>
-            </a:r>
-            <a:r>
-              <a:rPr lang="en-US" dirty="0" smtClean="0">
-                <a:latin typeface="Courier New" panose="02070309020205020404" pitchFamily="49" charset="0"/>
-                <a:cs typeface="Courier New" panose="02070309020205020404" pitchFamily="49" charset="0"/>
-              </a:rPr>
-              <a:t> {</a:t>
-            </a:r>
-          </a:p>
-          <a:p>
-            <a:r>
-              <a:rPr lang="en-US" dirty="0">
-                <a:latin typeface="Courier New" panose="02070309020205020404" pitchFamily="49" charset="0"/>
-                <a:cs typeface="Courier New" panose="02070309020205020404" pitchFamily="49" charset="0"/>
-              </a:rPr>
-              <a:t> </a:t>
-            </a:r>
-            <a:r>
-              <a:rPr lang="en-US" dirty="0" smtClean="0">
-                <a:latin typeface="Courier New" panose="02070309020205020404" pitchFamily="49" charset="0"/>
-                <a:cs typeface="Courier New" panose="02070309020205020404" pitchFamily="49" charset="0"/>
-              </a:rPr>
-              <a:t>   </a:t>
-            </a:r>
-            <a:r>
-              <a:rPr lang="en-US" dirty="0" err="1" smtClean="0">
-                <a:latin typeface="Courier New" panose="02070309020205020404" pitchFamily="49" charset="0"/>
-                <a:cs typeface="Courier New" panose="02070309020205020404" pitchFamily="49" charset="0"/>
-              </a:rPr>
-              <a:t>std</a:t>
-            </a:r>
-            <a:r>
-              <a:rPr lang="en-US" dirty="0" smtClean="0">
-                <a:latin typeface="Courier New" panose="02070309020205020404" pitchFamily="49" charset="0"/>
-                <a:cs typeface="Courier New" panose="02070309020205020404" pitchFamily="49" charset="0"/>
-              </a:rPr>
-              <a:t>::</a:t>
-            </a:r>
-            <a:r>
-              <a:rPr lang="en-US" dirty="0" err="1" smtClean="0">
-                <a:latin typeface="Courier New" panose="02070309020205020404" pitchFamily="49" charset="0"/>
-                <a:cs typeface="Courier New" panose="02070309020205020404" pitchFamily="49" charset="0"/>
-              </a:rPr>
-              <a:t>lock_guard</a:t>
-            </a:r>
-            <a:r>
-              <a:rPr lang="en-US" dirty="0" smtClean="0">
-                <a:latin typeface="Courier New" panose="02070309020205020404" pitchFamily="49" charset="0"/>
-                <a:cs typeface="Courier New" panose="02070309020205020404" pitchFamily="49" charset="0"/>
-              </a:rPr>
-              <a:t>&lt;</a:t>
-            </a:r>
-            <a:r>
-              <a:rPr lang="en-US" dirty="0" err="1" smtClean="0">
-                <a:latin typeface="Courier New" panose="02070309020205020404" pitchFamily="49" charset="0"/>
-                <a:cs typeface="Courier New" panose="02070309020205020404" pitchFamily="49" charset="0"/>
-              </a:rPr>
-              <a:t>std</a:t>
-            </a:r>
-            <a:r>
-              <a:rPr lang="en-US" dirty="0" smtClean="0">
-                <a:latin typeface="Courier New" panose="02070309020205020404" pitchFamily="49" charset="0"/>
-                <a:cs typeface="Courier New" panose="02070309020205020404" pitchFamily="49" charset="0"/>
-              </a:rPr>
-              <a:t>::mutex&gt; </a:t>
-            </a:r>
-            <a:r>
-              <a:rPr lang="en-US" dirty="0" err="1" smtClean="0">
-                <a:latin typeface="Courier New" panose="02070309020205020404" pitchFamily="49" charset="0"/>
-                <a:cs typeface="Courier New" panose="02070309020205020404" pitchFamily="49" charset="0"/>
-              </a:rPr>
-              <a:t>lk</a:t>
-            </a:r>
-            <a:r>
-              <a:rPr lang="en-US" dirty="0" smtClean="0">
-                <a:latin typeface="Courier New" panose="02070309020205020404" pitchFamily="49" charset="0"/>
-                <a:cs typeface="Courier New" panose="02070309020205020404" pitchFamily="49" charset="0"/>
-              </a:rPr>
-              <a:t>(m);</a:t>
-            </a:r>
-          </a:p>
-          <a:p>
-            <a:r>
-              <a:rPr lang="en-US" dirty="0">
-                <a:solidFill>
-                  <a:srgbClr val="7F0055"/>
-                </a:solidFill>
-                <a:latin typeface="Courier New" panose="02070309020205020404" pitchFamily="49" charset="0"/>
-                <a:cs typeface="Courier New" panose="02070309020205020404" pitchFamily="49" charset="0"/>
-              </a:rPr>
-              <a:t> </a:t>
-            </a:r>
-            <a:r>
-              <a:rPr lang="en-US" dirty="0" smtClean="0">
-                <a:solidFill>
-                  <a:srgbClr val="7F0055"/>
-                </a:solidFill>
-                <a:latin typeface="Courier New" panose="02070309020205020404" pitchFamily="49" charset="0"/>
-                <a:cs typeface="Courier New" panose="02070309020205020404" pitchFamily="49" charset="0"/>
-              </a:rPr>
-              <a:t>   </a:t>
-            </a:r>
-            <a:r>
-              <a:rPr lang="en-US" dirty="0" err="1" smtClean="0">
-                <a:solidFill>
-                  <a:srgbClr val="7F0055"/>
-                </a:solidFill>
-                <a:latin typeface="Courier New" panose="02070309020205020404" pitchFamily="49" charset="0"/>
-                <a:cs typeface="Courier New" panose="02070309020205020404" pitchFamily="49" charset="0"/>
-              </a:rPr>
-              <a:t>queue</a:t>
-            </a:r>
-            <a:r>
-              <a:rPr lang="en-US" dirty="0" err="1" smtClean="0">
-                <a:latin typeface="Courier New" panose="02070309020205020404" pitchFamily="49" charset="0"/>
-                <a:cs typeface="Courier New" panose="02070309020205020404" pitchFamily="49" charset="0"/>
-              </a:rPr>
-              <a:t>.push</a:t>
-            </a:r>
-            <a:r>
-              <a:rPr lang="en-US" dirty="0" smtClean="0">
-                <a:latin typeface="Courier New" panose="02070309020205020404" pitchFamily="49" charset="0"/>
-                <a:cs typeface="Courier New" panose="02070309020205020404" pitchFamily="49" charset="0"/>
-              </a:rPr>
-              <a:t>(42);</a:t>
-            </a:r>
-          </a:p>
-          <a:p>
-            <a:r>
-              <a:rPr lang="en-US" dirty="0">
-                <a:latin typeface="Courier New" panose="02070309020205020404" pitchFamily="49" charset="0"/>
-                <a:cs typeface="Courier New" panose="02070309020205020404" pitchFamily="49" charset="0"/>
-              </a:rPr>
-              <a:t> </a:t>
-            </a:r>
-            <a:r>
-              <a:rPr lang="en-US" dirty="0" smtClean="0">
-                <a:latin typeface="Courier New" panose="02070309020205020404" pitchFamily="49" charset="0"/>
-                <a:cs typeface="Courier New" panose="02070309020205020404" pitchFamily="49" charset="0"/>
-              </a:rPr>
-              <a:t>   </a:t>
-            </a:r>
-            <a:r>
-              <a:rPr lang="en-US" dirty="0" err="1" smtClean="0">
-                <a:latin typeface="Courier New" panose="02070309020205020404" pitchFamily="49" charset="0"/>
-                <a:cs typeface="Courier New" panose="02070309020205020404" pitchFamily="49" charset="0"/>
-              </a:rPr>
-              <a:t>notifier.notify_one</a:t>
-            </a:r>
-            <a:r>
-              <a:rPr lang="en-US" dirty="0" smtClean="0">
-                <a:latin typeface="Courier New" panose="02070309020205020404" pitchFamily="49" charset="0"/>
-                <a:cs typeface="Courier New" panose="02070309020205020404" pitchFamily="49" charset="0"/>
-              </a:rPr>
-              <a:t>();</a:t>
-            </a:r>
-          </a:p>
-          <a:p>
-            <a:r>
-              <a:rPr lang="en-US" dirty="0" smtClean="0">
-                <a:latin typeface="Courier New" panose="02070309020205020404" pitchFamily="49" charset="0"/>
-                <a:cs typeface="Courier New" panose="02070309020205020404" pitchFamily="49" charset="0"/>
-              </a:rPr>
-              <a:t>  }</a:t>
             </a:r>
           </a:p>
           <a:p>
@@ -5984,7 +7101,7 @@
           <a:p>
             <a:fld id="{6DA12B36-9664-4CB0-8B2E-F4A2F44AE97E}" type="slidenum">
               <a:rPr lang="en-US" smtClean="0"/>
-              <a:t>4</a:t>
+              <a:t>5</a:t>
             </a:fld>
             <a:endParaRPr lang="en-US"/>
           </a:p>
@@ -6010,7 +7127,7 @@
 </p:sld>
 </file>
 
-<file path=ppt/slides/slide5.xml><?xml version="1.0" encoding="utf-8"?>
+<file path=ppt/slides/slide6.xml><?xml version="1.0" encoding="utf-8"?>
 <p:sld xmlns:a="http://schemas.openxmlformats.org/drawingml/2006/main" xmlns:r="http://schemas.openxmlformats.org/officeDocument/2006/relationships" xmlns:p="http://schemas.openxmlformats.org/presentationml/2006/main">
   <p:cSld>
     <p:spTree>
@@ -6080,6 +7197,55 @@
               <a:rPr lang="en-US" dirty="0" smtClean="0"/>
               <a:t> each time we add something to the queue?</a:t>
             </a:r>
+          </a:p>
+          <a:p>
+            <a:pPr marL="800100" lvl="1" indent="-342900"/>
+            <a:r>
+              <a:rPr lang="en-US" dirty="0" smtClean="0"/>
+              <a:t>A predicate is a callable object that returns a Boolean</a:t>
+            </a:r>
+          </a:p>
+          <a:p>
+            <a:pPr marL="800100" lvl="1" indent="-342900"/>
+            <a:r>
+              <a:rPr lang="en-US" dirty="0" smtClean="0"/>
+              <a:t>We can add a predicate as a wake condition</a:t>
+            </a:r>
+          </a:p>
+          <a:p>
+            <a:pPr marL="800100" lvl="1" indent="-342900"/>
+            <a:r>
+              <a:rPr lang="en-US" dirty="0" smtClean="0"/>
+              <a:t>This predicate will be called by the wait</a:t>
+            </a:r>
+          </a:p>
+          <a:p>
+            <a:pPr marL="1485900" lvl="2" indent="-342900"/>
+            <a:r>
+              <a:rPr lang="en-US" dirty="0" smtClean="0"/>
+              <a:t>No telling when it will be called</a:t>
+            </a:r>
+          </a:p>
+          <a:p>
+            <a:pPr marL="1485900" lvl="2" indent="-342900"/>
+            <a:r>
+              <a:rPr lang="en-US" dirty="0" smtClean="0"/>
+              <a:t>Always called with the mutex locked</a:t>
+            </a:r>
+          </a:p>
+          <a:p>
+            <a:pPr marL="1485900" lvl="2" indent="-342900"/>
+            <a:r>
+              <a:rPr lang="en-US" dirty="0" smtClean="0"/>
+              <a:t>Returning true causes a </a:t>
+            </a:r>
+            <a:r>
+              <a:rPr lang="en-US" i="1" dirty="0" smtClean="0"/>
+              <a:t>spurious wakeup</a:t>
+            </a:r>
+          </a:p>
+          <a:p>
+            <a:pPr marL="800100" lvl="1" indent="-342900"/>
             <a:endParaRPr lang="en-US" dirty="0"/>
           </a:p>
         </p:txBody>
@@ -6101,7 +7267,7 @@
           <a:p>
             <a:fld id="{6DA12B36-9664-4CB0-8B2E-F4A2F44AE97E}" type="slidenum">
               <a:rPr lang="en-US" smtClean="0"/>
-              <a:t>5</a:t>
+              <a:t>6</a:t>
             </a:fld>
             <a:endParaRPr lang="en-US"/>
           </a:p>
@@ -6124,6 +7290,1654 @@
       </p:par>
     </p:tnLst>
   </p:timing>
+</p:sld>
+</file>
+
+<file path=ppt/slides/slide7.xml><?xml version="1.0" encoding="utf-8"?>
+<p:sld xmlns:a="http://schemas.openxmlformats.org/drawingml/2006/main" xmlns:r="http://schemas.openxmlformats.org/officeDocument/2006/relationships" xmlns:p="http://schemas.openxmlformats.org/presentationml/2006/main">
+  <p:cSld>
+    <p:spTree>
+      <p:nvGrpSpPr>
+        <p:cNvPr id="1" name=""/>
+        <p:cNvGrpSpPr/>
+        <p:nvPr/>
+      </p:nvGrpSpPr>
+      <p:grpSpPr>
+        <a:xfrm>
+          <a:off x="0" y="0"/>
+          <a:ext cx="0" cy="0"/>
+          <a:chOff x="0" y="0"/>
+          <a:chExt cx="0" cy="0"/>
+        </a:xfrm>
+      </p:grpSpPr>
+      <p:sp>
+        <p:nvSpPr>
+          <p:cNvPr id="2" name="Title 1"/>
+          <p:cNvSpPr>
+            <a:spLocks noGrp="1"/>
+          </p:cNvSpPr>
+          <p:nvPr>
+            <p:ph type="title"/>
+          </p:nvPr>
+        </p:nvSpPr>
+        <p:spPr/>
+        <p:txBody>
+          <a:bodyPr/>
+          <a:lstStyle/>
+          <a:p>
+            <a:r>
+              <a:rPr lang="en-US" dirty="0" smtClean="0"/>
+              <a:t>A More useful gauss</a:t>
+            </a:r>
+            <a:endParaRPr lang="en-US" dirty="0"/>
+          </a:p>
+        </p:txBody>
+      </p:sp>
+      <p:sp>
+        <p:nvSpPr>
+          <p:cNvPr id="3" name="Content Placeholder 2"/>
+          <p:cNvSpPr>
+            <a:spLocks noGrp="1"/>
+          </p:cNvSpPr>
+          <p:nvPr>
+            <p:ph idx="1"/>
+          </p:nvPr>
+        </p:nvSpPr>
+        <p:spPr/>
+        <p:txBody>
+          <a:bodyPr>
+            <a:normAutofit fontScale="77500" lnSpcReduction="20000"/>
+          </a:bodyPr>
+          <a:lstStyle/>
+          <a:p>
+            <a:r>
+              <a:rPr lang="en-US" sz="2300" dirty="0" err="1">
+                <a:latin typeface="Courier New" panose="02070309020205020404" pitchFamily="49" charset="0"/>
+                <a:cs typeface="Courier New" panose="02070309020205020404" pitchFamily="49" charset="0"/>
+              </a:rPr>
+              <a:t>std</a:t>
+            </a:r>
+            <a:r>
+              <a:rPr lang="en-US" sz="2300" dirty="0">
+                <a:latin typeface="Courier New" panose="02070309020205020404" pitchFamily="49" charset="0"/>
+                <a:cs typeface="Courier New" panose="02070309020205020404" pitchFamily="49" charset="0"/>
+              </a:rPr>
+              <a:t>::mutex m; </a:t>
+            </a:r>
+            <a:r>
+              <a:rPr lang="en-US" sz="2300" dirty="0" err="1">
+                <a:latin typeface="Courier New" panose="02070309020205020404" pitchFamily="49" charset="0"/>
+                <a:cs typeface="Courier New" panose="02070309020205020404" pitchFamily="49" charset="0"/>
+              </a:rPr>
+              <a:t>std</a:t>
+            </a:r>
+            <a:r>
+              <a:rPr lang="en-US" sz="2300" dirty="0">
+                <a:latin typeface="Courier New" panose="02070309020205020404" pitchFamily="49" charset="0"/>
+                <a:cs typeface="Courier New" panose="02070309020205020404" pitchFamily="49" charset="0"/>
+              </a:rPr>
+              <a:t>::</a:t>
+            </a:r>
+            <a:r>
+              <a:rPr lang="en-US" sz="2300" dirty="0" err="1">
+                <a:latin typeface="Courier New" panose="02070309020205020404" pitchFamily="49" charset="0"/>
+                <a:cs typeface="Courier New" panose="02070309020205020404" pitchFamily="49" charset="0"/>
+              </a:rPr>
+              <a:t>condition_variable</a:t>
+            </a:r>
+            <a:r>
+              <a:rPr lang="en-US" sz="2300" dirty="0">
+                <a:latin typeface="Courier New" panose="02070309020205020404" pitchFamily="49" charset="0"/>
+                <a:cs typeface="Courier New" panose="02070309020205020404" pitchFamily="49" charset="0"/>
+              </a:rPr>
+              <a:t> </a:t>
+            </a:r>
+            <a:r>
+              <a:rPr lang="en-US" sz="2300" dirty="0" err="1">
+                <a:latin typeface="Courier New" panose="02070309020205020404" pitchFamily="49" charset="0"/>
+                <a:cs typeface="Courier New" panose="02070309020205020404" pitchFamily="49" charset="0"/>
+              </a:rPr>
+              <a:t>notifier</a:t>
+            </a:r>
+            <a:r>
+              <a:rPr lang="en-US" sz="2300" dirty="0">
+                <a:latin typeface="Courier New" panose="02070309020205020404" pitchFamily="49" charset="0"/>
+                <a:cs typeface="Courier New" panose="02070309020205020404" pitchFamily="49" charset="0"/>
+              </a:rPr>
+              <a:t>;</a:t>
+            </a:r>
+          </a:p>
+          <a:p>
+            <a:r>
+              <a:rPr lang="en-US" sz="2300" dirty="0" err="1">
+                <a:solidFill>
+                  <a:srgbClr val="7F0055"/>
+                </a:solidFill>
+                <a:latin typeface="Courier New" panose="02070309020205020404" pitchFamily="49" charset="0"/>
+                <a:cs typeface="Courier New" panose="02070309020205020404" pitchFamily="49" charset="0"/>
+              </a:rPr>
+              <a:t>int</a:t>
+            </a:r>
+            <a:r>
+              <a:rPr lang="en-US" sz="2300" dirty="0">
+                <a:latin typeface="Courier New" panose="02070309020205020404" pitchFamily="49" charset="0"/>
+                <a:cs typeface="Courier New" panose="02070309020205020404" pitchFamily="49" charset="0"/>
+              </a:rPr>
+              <a:t> </a:t>
+            </a:r>
+            <a:r>
+              <a:rPr lang="en-US" sz="2300" dirty="0">
+                <a:solidFill>
+                  <a:srgbClr val="7F0055"/>
+                </a:solidFill>
+                <a:latin typeface="Courier New" panose="02070309020205020404" pitchFamily="49" charset="0"/>
+                <a:cs typeface="Courier New" panose="02070309020205020404" pitchFamily="49" charset="0"/>
+              </a:rPr>
+              <a:t>main</a:t>
+            </a:r>
+            <a:r>
+              <a:rPr lang="en-US" sz="2300" dirty="0">
+                <a:latin typeface="Courier New" panose="02070309020205020404" pitchFamily="49" charset="0"/>
+                <a:cs typeface="Courier New" panose="02070309020205020404" pitchFamily="49" charset="0"/>
+              </a:rPr>
+              <a:t>(){</a:t>
+            </a:r>
+          </a:p>
+          <a:p>
+            <a:r>
+              <a:rPr lang="en-US" sz="2300" dirty="0">
+                <a:latin typeface="Courier New" panose="02070309020205020404" pitchFamily="49" charset="0"/>
+                <a:cs typeface="Courier New" panose="02070309020205020404" pitchFamily="49" charset="0"/>
+              </a:rPr>
+              <a:t>  </a:t>
+            </a:r>
+            <a:r>
+              <a:rPr lang="en-US" sz="2300" dirty="0" err="1">
+                <a:latin typeface="Courier New" panose="02070309020205020404" pitchFamily="49" charset="0"/>
+                <a:cs typeface="Courier New" panose="02070309020205020404" pitchFamily="49" charset="0"/>
+              </a:rPr>
+              <a:t>std</a:t>
+            </a:r>
+            <a:r>
+              <a:rPr lang="en-US" sz="2300" dirty="0">
+                <a:latin typeface="Courier New" panose="02070309020205020404" pitchFamily="49" charset="0"/>
+                <a:cs typeface="Courier New" panose="02070309020205020404" pitchFamily="49" charset="0"/>
+              </a:rPr>
+              <a:t>::</a:t>
+            </a:r>
+            <a:r>
+              <a:rPr lang="en-US" sz="2300" dirty="0">
+                <a:solidFill>
+                  <a:srgbClr val="7F0055"/>
+                </a:solidFill>
+                <a:latin typeface="Courier New" panose="02070309020205020404" pitchFamily="49" charset="0"/>
+                <a:cs typeface="Courier New" panose="02070309020205020404" pitchFamily="49" charset="0"/>
+              </a:rPr>
+              <a:t>queue</a:t>
+            </a:r>
+            <a:r>
+              <a:rPr lang="en-US" sz="2300" dirty="0">
+                <a:latin typeface="Courier New" panose="02070309020205020404" pitchFamily="49" charset="0"/>
+                <a:cs typeface="Courier New" panose="02070309020205020404" pitchFamily="49" charset="0"/>
+              </a:rPr>
+              <a:t>&lt;</a:t>
+            </a:r>
+            <a:r>
+              <a:rPr lang="en-US" sz="2300" dirty="0" err="1">
+                <a:solidFill>
+                  <a:srgbClr val="7F0055"/>
+                </a:solidFill>
+                <a:latin typeface="Courier New" panose="02070309020205020404" pitchFamily="49" charset="0"/>
+                <a:cs typeface="Courier New" panose="02070309020205020404" pitchFamily="49" charset="0"/>
+              </a:rPr>
+              <a:t>int</a:t>
+            </a:r>
+            <a:r>
+              <a:rPr lang="en-US" sz="2300" dirty="0">
+                <a:latin typeface="Courier New" panose="02070309020205020404" pitchFamily="49" charset="0"/>
+                <a:cs typeface="Courier New" panose="02070309020205020404" pitchFamily="49" charset="0"/>
+              </a:rPr>
+              <a:t>&gt; </a:t>
+            </a:r>
+            <a:r>
+              <a:rPr lang="en-US" sz="2300" dirty="0">
+                <a:solidFill>
+                  <a:srgbClr val="7F0055"/>
+                </a:solidFill>
+                <a:latin typeface="Courier New" panose="02070309020205020404" pitchFamily="49" charset="0"/>
+                <a:cs typeface="Courier New" panose="02070309020205020404" pitchFamily="49" charset="0"/>
+              </a:rPr>
+              <a:t>queue</a:t>
+            </a:r>
+            <a:r>
+              <a:rPr lang="en-US" sz="2300" dirty="0">
+                <a:latin typeface="Courier New" panose="02070309020205020404" pitchFamily="49" charset="0"/>
+                <a:cs typeface="Courier New" panose="02070309020205020404" pitchFamily="49" charset="0"/>
+              </a:rPr>
+              <a:t>;</a:t>
+            </a:r>
+          </a:p>
+          <a:p>
+            <a:r>
+              <a:rPr lang="en-US" sz="2300" dirty="0">
+                <a:solidFill>
+                  <a:srgbClr val="7F0055"/>
+                </a:solidFill>
+                <a:latin typeface="Courier New" panose="02070309020205020404" pitchFamily="49" charset="0"/>
+                <a:cs typeface="Courier New" panose="02070309020205020404" pitchFamily="49" charset="0"/>
+              </a:rPr>
+              <a:t>  </a:t>
+            </a:r>
+            <a:r>
+              <a:rPr lang="en-US" sz="2300" dirty="0" err="1">
+                <a:solidFill>
+                  <a:srgbClr val="7F0055"/>
+                </a:solidFill>
+                <a:latin typeface="Courier New" panose="02070309020205020404" pitchFamily="49" charset="0"/>
+                <a:cs typeface="Courier New" panose="02070309020205020404" pitchFamily="49" charset="0"/>
+              </a:rPr>
+              <a:t>int</a:t>
+            </a:r>
+            <a:r>
+              <a:rPr lang="en-US" sz="2300" dirty="0">
+                <a:latin typeface="Courier New" panose="02070309020205020404" pitchFamily="49" charset="0"/>
+                <a:cs typeface="Courier New" panose="02070309020205020404" pitchFamily="49" charset="0"/>
+              </a:rPr>
+              <a:t> sum = 0;</a:t>
+            </a:r>
+          </a:p>
+          <a:p>
+            <a:r>
+              <a:rPr lang="en-US" sz="2300" dirty="0">
+                <a:latin typeface="Courier New" panose="02070309020205020404" pitchFamily="49" charset="0"/>
+                <a:cs typeface="Courier New" panose="02070309020205020404" pitchFamily="49" charset="0"/>
+              </a:rPr>
+              <a:t>  </a:t>
+            </a:r>
+            <a:r>
+              <a:rPr lang="en-US" sz="2300" dirty="0" err="1">
+                <a:latin typeface="Courier New" panose="02070309020205020404" pitchFamily="49" charset="0"/>
+                <a:cs typeface="Courier New" panose="02070309020205020404" pitchFamily="49" charset="0"/>
+              </a:rPr>
+              <a:t>std</a:t>
+            </a:r>
+            <a:r>
+              <a:rPr lang="en-US" sz="2300" dirty="0">
+                <a:latin typeface="Courier New" panose="02070309020205020404" pitchFamily="49" charset="0"/>
+                <a:cs typeface="Courier New" panose="02070309020205020404" pitchFamily="49" charset="0"/>
+              </a:rPr>
+              <a:t>::thread t(gauss, </a:t>
+            </a:r>
+            <a:r>
+              <a:rPr lang="en-US" sz="2300" dirty="0" err="1">
+                <a:latin typeface="Courier New" panose="02070309020205020404" pitchFamily="49" charset="0"/>
+                <a:cs typeface="Courier New" panose="02070309020205020404" pitchFamily="49" charset="0"/>
+              </a:rPr>
+              <a:t>std</a:t>
+            </a:r>
+            <a:r>
+              <a:rPr lang="en-US" sz="2300" dirty="0">
+                <a:latin typeface="Courier New" panose="02070309020205020404" pitchFamily="49" charset="0"/>
+                <a:cs typeface="Courier New" panose="02070309020205020404" pitchFamily="49" charset="0"/>
+              </a:rPr>
+              <a:t>::ref(sum));</a:t>
+            </a:r>
+          </a:p>
+          <a:p>
+            <a:r>
+              <a:rPr lang="en-US" sz="2300" dirty="0">
+                <a:latin typeface="Courier New" panose="02070309020205020404" pitchFamily="49" charset="0"/>
+                <a:cs typeface="Courier New" panose="02070309020205020404" pitchFamily="49" charset="0"/>
+              </a:rPr>
+              <a:t>  </a:t>
+            </a:r>
+            <a:r>
+              <a:rPr lang="en-US" sz="2300" dirty="0" err="1">
+                <a:latin typeface="Courier New" panose="02070309020205020404" pitchFamily="49" charset="0"/>
+                <a:cs typeface="Courier New" panose="02070309020205020404" pitchFamily="49" charset="0"/>
+              </a:rPr>
+              <a:t>t.detach</a:t>
+            </a:r>
+            <a:r>
+              <a:rPr lang="en-US" sz="2300" dirty="0">
+                <a:latin typeface="Courier New" panose="02070309020205020404" pitchFamily="49" charset="0"/>
+                <a:cs typeface="Courier New" panose="02070309020205020404" pitchFamily="49" charset="0"/>
+              </a:rPr>
+              <a:t>();</a:t>
+            </a:r>
+          </a:p>
+          <a:p>
+            <a:r>
+              <a:rPr lang="en-US" sz="2300" dirty="0">
+                <a:latin typeface="Courier New" panose="02070309020205020404" pitchFamily="49" charset="0"/>
+                <a:cs typeface="Courier New" panose="02070309020205020404" pitchFamily="49" charset="0"/>
+              </a:rPr>
+              <a:t>  {</a:t>
+            </a:r>
+          </a:p>
+          <a:p>
+            <a:r>
+              <a:rPr lang="en-US" sz="2300" dirty="0">
+                <a:latin typeface="Courier New" panose="02070309020205020404" pitchFamily="49" charset="0"/>
+                <a:cs typeface="Courier New" panose="02070309020205020404" pitchFamily="49" charset="0"/>
+              </a:rPr>
+              <a:t>    </a:t>
+            </a:r>
+            <a:r>
+              <a:rPr lang="en-US" sz="2300" dirty="0" err="1">
+                <a:latin typeface="Courier New" panose="02070309020205020404" pitchFamily="49" charset="0"/>
+                <a:cs typeface="Courier New" panose="02070309020205020404" pitchFamily="49" charset="0"/>
+              </a:rPr>
+              <a:t>std</a:t>
+            </a:r>
+            <a:r>
+              <a:rPr lang="en-US" sz="2300" dirty="0">
+                <a:latin typeface="Courier New" panose="02070309020205020404" pitchFamily="49" charset="0"/>
+                <a:cs typeface="Courier New" panose="02070309020205020404" pitchFamily="49" charset="0"/>
+              </a:rPr>
+              <a:t>::</a:t>
+            </a:r>
+            <a:r>
+              <a:rPr lang="en-US" sz="2300" dirty="0" err="1">
+                <a:latin typeface="Courier New" panose="02070309020205020404" pitchFamily="49" charset="0"/>
+                <a:cs typeface="Courier New" panose="02070309020205020404" pitchFamily="49" charset="0"/>
+              </a:rPr>
+              <a:t>lock_guard</a:t>
+            </a:r>
+            <a:r>
+              <a:rPr lang="en-US" sz="2300" dirty="0">
+                <a:latin typeface="Courier New" panose="02070309020205020404" pitchFamily="49" charset="0"/>
+                <a:cs typeface="Courier New" panose="02070309020205020404" pitchFamily="49" charset="0"/>
+              </a:rPr>
+              <a:t>&lt;</a:t>
+            </a:r>
+            <a:r>
+              <a:rPr lang="en-US" sz="2300" dirty="0" err="1">
+                <a:latin typeface="Courier New" panose="02070309020205020404" pitchFamily="49" charset="0"/>
+                <a:cs typeface="Courier New" panose="02070309020205020404" pitchFamily="49" charset="0"/>
+              </a:rPr>
+              <a:t>std</a:t>
+            </a:r>
+            <a:r>
+              <a:rPr lang="en-US" sz="2300" dirty="0">
+                <a:latin typeface="Courier New" panose="02070309020205020404" pitchFamily="49" charset="0"/>
+                <a:cs typeface="Courier New" panose="02070309020205020404" pitchFamily="49" charset="0"/>
+              </a:rPr>
+              <a:t>::mutex&gt; </a:t>
+            </a:r>
+            <a:r>
+              <a:rPr lang="en-US" sz="2300" dirty="0" err="1">
+                <a:latin typeface="Courier New" panose="02070309020205020404" pitchFamily="49" charset="0"/>
+                <a:cs typeface="Courier New" panose="02070309020205020404" pitchFamily="49" charset="0"/>
+              </a:rPr>
+              <a:t>lk</a:t>
+            </a:r>
+            <a:r>
+              <a:rPr lang="en-US" sz="2300" dirty="0">
+                <a:latin typeface="Courier New" panose="02070309020205020404" pitchFamily="49" charset="0"/>
+                <a:cs typeface="Courier New" panose="02070309020205020404" pitchFamily="49" charset="0"/>
+              </a:rPr>
+              <a:t>(m);</a:t>
+            </a:r>
+          </a:p>
+          <a:p>
+            <a:r>
+              <a:rPr lang="en-US" sz="2300" dirty="0">
+                <a:solidFill>
+                  <a:srgbClr val="7F0055"/>
+                </a:solidFill>
+                <a:latin typeface="Courier New" panose="02070309020205020404" pitchFamily="49" charset="0"/>
+                <a:cs typeface="Courier New" panose="02070309020205020404" pitchFamily="49" charset="0"/>
+              </a:rPr>
+              <a:t>    </a:t>
+            </a:r>
+            <a:r>
+              <a:rPr lang="nn-NO" sz="2300" dirty="0">
+                <a:solidFill>
+                  <a:srgbClr val="7F0055"/>
+                </a:solidFill>
+                <a:latin typeface="Courier New" panose="02070309020205020404" pitchFamily="49" charset="0"/>
+                <a:cs typeface="Courier New" panose="02070309020205020404" pitchFamily="49" charset="0"/>
+              </a:rPr>
+              <a:t>for</a:t>
+            </a:r>
+            <a:r>
+              <a:rPr lang="nn-NO" sz="2300" dirty="0">
+                <a:latin typeface="Courier New" panose="02070309020205020404" pitchFamily="49" charset="0"/>
+                <a:cs typeface="Courier New" panose="02070309020205020404" pitchFamily="49" charset="0"/>
+              </a:rPr>
+              <a:t> (i=1; i &lt;= 10000; ++</a:t>
+            </a:r>
+            <a:r>
+              <a:rPr lang="nn-NO" sz="2300" dirty="0" smtClean="0">
+                <a:latin typeface="Courier New" panose="02070309020205020404" pitchFamily="49" charset="0"/>
+                <a:cs typeface="Courier New" panose="02070309020205020404" pitchFamily="49" charset="0"/>
+              </a:rPr>
+              <a:t>i) </a:t>
+            </a:r>
+            <a:r>
+              <a:rPr lang="nn-NO" sz="2300" dirty="0" smtClean="0">
+                <a:solidFill>
+                  <a:srgbClr val="7F0055"/>
+                </a:solidFill>
+                <a:latin typeface="Courier New" panose="02070309020205020404" pitchFamily="49" charset="0"/>
+                <a:cs typeface="Courier New" panose="02070309020205020404" pitchFamily="49" charset="0"/>
+              </a:rPr>
+              <a:t>queue</a:t>
+            </a:r>
+            <a:r>
+              <a:rPr lang="nn-NO" sz="2300" dirty="0" smtClean="0">
+                <a:latin typeface="Courier New" panose="02070309020205020404" pitchFamily="49" charset="0"/>
+                <a:cs typeface="Courier New" panose="02070309020205020404" pitchFamily="49" charset="0"/>
+              </a:rPr>
+              <a:t>.push(i);</a:t>
+            </a:r>
+          </a:p>
+          <a:p>
+            <a:r>
+              <a:rPr lang="nn-NO" sz="2300" dirty="0" smtClean="0">
+                <a:latin typeface="Courier New" panose="02070309020205020404" pitchFamily="49" charset="0"/>
+                <a:cs typeface="Courier New" panose="02070309020205020404" pitchFamily="49" charset="0"/>
+              </a:rPr>
+              <a:t>  }</a:t>
+            </a:r>
+            <a:endParaRPr lang="en-US" sz="2300" dirty="0">
+              <a:latin typeface="Courier New" panose="02070309020205020404" pitchFamily="49" charset="0"/>
+              <a:cs typeface="Courier New" panose="02070309020205020404" pitchFamily="49" charset="0"/>
+            </a:endParaRPr>
+          </a:p>
+          <a:p>
+            <a:r>
+              <a:rPr lang="en-US" sz="2300" dirty="0">
+                <a:latin typeface="Courier New" panose="02070309020205020404" pitchFamily="49" charset="0"/>
+                <a:cs typeface="Courier New" panose="02070309020205020404" pitchFamily="49" charset="0"/>
+              </a:rPr>
+              <a:t>    </a:t>
+            </a:r>
+            <a:r>
+              <a:rPr lang="en-US" sz="2300" dirty="0" err="1">
+                <a:latin typeface="Courier New" panose="02070309020205020404" pitchFamily="49" charset="0"/>
+                <a:cs typeface="Courier New" panose="02070309020205020404" pitchFamily="49" charset="0"/>
+              </a:rPr>
+              <a:t>notifier.notify_one</a:t>
+            </a:r>
+            <a:r>
+              <a:rPr lang="en-US" sz="2300" dirty="0">
+                <a:latin typeface="Courier New" panose="02070309020205020404" pitchFamily="49" charset="0"/>
+                <a:cs typeface="Courier New" panose="02070309020205020404" pitchFamily="49" charset="0"/>
+              </a:rPr>
+              <a:t>();</a:t>
+            </a:r>
+          </a:p>
+          <a:p>
+            <a:r>
+              <a:rPr lang="en-US" sz="2300" dirty="0" smtClean="0">
+                <a:latin typeface="Courier New" panose="02070309020205020404" pitchFamily="49" charset="0"/>
+                <a:cs typeface="Courier New" panose="02070309020205020404" pitchFamily="49" charset="0"/>
+              </a:rPr>
+              <a:t>}</a:t>
+            </a:r>
+            <a:endParaRPr lang="en-US" sz="2300" dirty="0">
+              <a:latin typeface="Courier New" panose="02070309020205020404" pitchFamily="49" charset="0"/>
+              <a:cs typeface="Courier New" panose="02070309020205020404" pitchFamily="49" charset="0"/>
+            </a:endParaRPr>
+          </a:p>
+          <a:p>
+            <a:endParaRPr lang="en-US" dirty="0"/>
+          </a:p>
+        </p:txBody>
+      </p:sp>
+      <p:sp>
+        <p:nvSpPr>
+          <p:cNvPr id="4" name="Slide Number Placeholder 3"/>
+          <p:cNvSpPr>
+            <a:spLocks noGrp="1"/>
+          </p:cNvSpPr>
+          <p:nvPr>
+            <p:ph type="sldNum" sz="quarter" idx="12"/>
+          </p:nvPr>
+        </p:nvSpPr>
+        <p:spPr/>
+        <p:txBody>
+          <a:bodyPr/>
+          <a:lstStyle/>
+          <a:p>
+            <a:fld id="{6DA12B36-9664-4CB0-8B2E-F4A2F44AE97E}" type="slidenum">
+              <a:rPr lang="en-US" smtClean="0"/>
+              <a:t>7</a:t>
+            </a:fld>
+            <a:endParaRPr lang="en-US"/>
+          </a:p>
+        </p:txBody>
+      </p:sp>
+    </p:spTree>
+    <p:extLst>
+      <p:ext uri="{BB962C8B-B14F-4D97-AF65-F5344CB8AC3E}">
+        <p14:creationId xmlns:p14="http://schemas.microsoft.com/office/powerpoint/2010/main" val="3398168659"/>
+      </p:ext>
+    </p:extLst>
+  </p:cSld>
+  <p:clrMapOvr>
+    <a:masterClrMapping/>
+  </p:clrMapOvr>
+</p:sld>
+</file>
+
+<file path=ppt/slides/slide8.xml><?xml version="1.0" encoding="utf-8"?>
+<p:sld xmlns:a="http://schemas.openxmlformats.org/drawingml/2006/main" xmlns:r="http://schemas.openxmlformats.org/officeDocument/2006/relationships" xmlns:p="http://schemas.openxmlformats.org/presentationml/2006/main">
+  <p:cSld>
+    <p:spTree>
+      <p:nvGrpSpPr>
+        <p:cNvPr id="1" name=""/>
+        <p:cNvGrpSpPr/>
+        <p:nvPr/>
+      </p:nvGrpSpPr>
+      <p:grpSpPr>
+        <a:xfrm>
+          <a:off x="0" y="0"/>
+          <a:ext cx="0" cy="0"/>
+          <a:chOff x="0" y="0"/>
+          <a:chExt cx="0" cy="0"/>
+        </a:xfrm>
+      </p:grpSpPr>
+      <p:sp>
+        <p:nvSpPr>
+          <p:cNvPr id="2" name="Title 1"/>
+          <p:cNvSpPr>
+            <a:spLocks noGrp="1"/>
+          </p:cNvSpPr>
+          <p:nvPr>
+            <p:ph type="title"/>
+          </p:nvPr>
+        </p:nvSpPr>
+        <p:spPr/>
+        <p:txBody>
+          <a:bodyPr/>
+          <a:lstStyle/>
+          <a:p>
+            <a:r>
+              <a:rPr lang="en-US" dirty="0" smtClean="0"/>
+              <a:t>Gauss with a wake condition</a:t>
+            </a:r>
+            <a:endParaRPr lang="en-US" dirty="0"/>
+          </a:p>
+        </p:txBody>
+      </p:sp>
+      <p:sp>
+        <p:nvSpPr>
+          <p:cNvPr id="3" name="Content Placeholder 2"/>
+          <p:cNvSpPr>
+            <a:spLocks noGrp="1"/>
+          </p:cNvSpPr>
+          <p:nvPr>
+            <p:ph idx="1"/>
+          </p:nvPr>
+        </p:nvSpPr>
+        <p:spPr/>
+        <p:txBody>
+          <a:bodyPr>
+            <a:normAutofit fontScale="85000" lnSpcReduction="20000"/>
+          </a:bodyPr>
+          <a:lstStyle/>
+          <a:p>
+            <a:r>
+              <a:rPr lang="en-US" sz="2100" dirty="0" err="1">
+                <a:latin typeface="Courier New" panose="02070309020205020404" pitchFamily="49" charset="0"/>
+                <a:cs typeface="Courier New" panose="02070309020205020404" pitchFamily="49" charset="0"/>
+              </a:rPr>
+              <a:t>std</a:t>
+            </a:r>
+            <a:r>
+              <a:rPr lang="en-US" sz="2100" dirty="0">
+                <a:latin typeface="Courier New" panose="02070309020205020404" pitchFamily="49" charset="0"/>
+                <a:cs typeface="Courier New" panose="02070309020205020404" pitchFamily="49" charset="0"/>
+              </a:rPr>
+              <a:t>::mutex m; </a:t>
+            </a:r>
+            <a:r>
+              <a:rPr lang="en-US" sz="2100" dirty="0" err="1">
+                <a:latin typeface="Courier New" panose="02070309020205020404" pitchFamily="49" charset="0"/>
+                <a:cs typeface="Courier New" panose="02070309020205020404" pitchFamily="49" charset="0"/>
+              </a:rPr>
+              <a:t>std</a:t>
+            </a:r>
+            <a:r>
+              <a:rPr lang="en-US" sz="2100" dirty="0">
+                <a:latin typeface="Courier New" panose="02070309020205020404" pitchFamily="49" charset="0"/>
+                <a:cs typeface="Courier New" panose="02070309020205020404" pitchFamily="49" charset="0"/>
+              </a:rPr>
+              <a:t>::</a:t>
+            </a:r>
+            <a:r>
+              <a:rPr lang="en-US" sz="2100" dirty="0" err="1">
+                <a:latin typeface="Courier New" panose="02070309020205020404" pitchFamily="49" charset="0"/>
+                <a:cs typeface="Courier New" panose="02070309020205020404" pitchFamily="49" charset="0"/>
+              </a:rPr>
+              <a:t>condition_variable</a:t>
+            </a:r>
+            <a:r>
+              <a:rPr lang="en-US" sz="2100" dirty="0">
+                <a:latin typeface="Courier New" panose="02070309020205020404" pitchFamily="49" charset="0"/>
+                <a:cs typeface="Courier New" panose="02070309020205020404" pitchFamily="49" charset="0"/>
+              </a:rPr>
+              <a:t> </a:t>
+            </a:r>
+            <a:r>
+              <a:rPr lang="en-US" sz="2100" dirty="0" err="1">
+                <a:latin typeface="Courier New" panose="02070309020205020404" pitchFamily="49" charset="0"/>
+                <a:cs typeface="Courier New" panose="02070309020205020404" pitchFamily="49" charset="0"/>
+              </a:rPr>
+              <a:t>notifier</a:t>
+            </a:r>
+            <a:r>
+              <a:rPr lang="en-US" sz="2100" dirty="0">
+                <a:latin typeface="Courier New" panose="02070309020205020404" pitchFamily="49" charset="0"/>
+                <a:cs typeface="Courier New" panose="02070309020205020404" pitchFamily="49" charset="0"/>
+              </a:rPr>
+              <a:t>;</a:t>
+            </a:r>
+          </a:p>
+          <a:p>
+            <a:r>
+              <a:rPr lang="en-US" sz="2100" dirty="0">
+                <a:solidFill>
+                  <a:srgbClr val="7F0055"/>
+                </a:solidFill>
+                <a:latin typeface="Courier New" panose="02070309020205020404" pitchFamily="49" charset="0"/>
+                <a:cs typeface="Courier New" panose="02070309020205020404" pitchFamily="49" charset="0"/>
+              </a:rPr>
+              <a:t>void</a:t>
+            </a:r>
+            <a:r>
+              <a:rPr lang="en-US" sz="2100" dirty="0">
+                <a:latin typeface="Courier New" panose="02070309020205020404" pitchFamily="49" charset="0"/>
+                <a:cs typeface="Courier New" panose="02070309020205020404" pitchFamily="49" charset="0"/>
+              </a:rPr>
+              <a:t> gauss(</a:t>
+            </a:r>
+            <a:r>
+              <a:rPr lang="en-US" sz="2100" dirty="0" err="1">
+                <a:latin typeface="Courier New" panose="02070309020205020404" pitchFamily="49" charset="0"/>
+                <a:cs typeface="Courier New" panose="02070309020205020404" pitchFamily="49" charset="0"/>
+              </a:rPr>
+              <a:t>std</a:t>
+            </a:r>
+            <a:r>
+              <a:rPr lang="en-US" sz="2100" dirty="0">
+                <a:latin typeface="Courier New" panose="02070309020205020404" pitchFamily="49" charset="0"/>
+                <a:cs typeface="Courier New" panose="02070309020205020404" pitchFamily="49" charset="0"/>
+              </a:rPr>
+              <a:t>::queue&lt;</a:t>
+            </a:r>
+            <a:r>
+              <a:rPr lang="en-US" sz="2100" dirty="0" err="1">
+                <a:latin typeface="Courier New" panose="02070309020205020404" pitchFamily="49" charset="0"/>
+                <a:cs typeface="Courier New" panose="02070309020205020404" pitchFamily="49" charset="0"/>
+              </a:rPr>
+              <a:t>int</a:t>
+            </a:r>
+            <a:r>
+              <a:rPr lang="en-US" sz="2100" dirty="0">
+                <a:latin typeface="Courier New" panose="02070309020205020404" pitchFamily="49" charset="0"/>
+                <a:cs typeface="Courier New" panose="02070309020205020404" pitchFamily="49" charset="0"/>
+              </a:rPr>
+              <a:t>&gt;&amp; </a:t>
+            </a:r>
+            <a:r>
+              <a:rPr lang="en-US" sz="2100" dirty="0">
+                <a:solidFill>
+                  <a:srgbClr val="7F0055"/>
+                </a:solidFill>
+                <a:latin typeface="Courier New" panose="02070309020205020404" pitchFamily="49" charset="0"/>
+                <a:cs typeface="Courier New" panose="02070309020205020404" pitchFamily="49" charset="0"/>
+              </a:rPr>
+              <a:t>queue</a:t>
+            </a:r>
+            <a:r>
+              <a:rPr lang="en-US" sz="2100" dirty="0">
+                <a:latin typeface="Courier New" panose="02070309020205020404" pitchFamily="49" charset="0"/>
+                <a:cs typeface="Courier New" panose="02070309020205020404" pitchFamily="49" charset="0"/>
+              </a:rPr>
+              <a:t>, </a:t>
+            </a:r>
+            <a:r>
+              <a:rPr lang="en-US" sz="2100" dirty="0" err="1">
+                <a:solidFill>
+                  <a:srgbClr val="7F0055"/>
+                </a:solidFill>
+                <a:latin typeface="Courier New" panose="02070309020205020404" pitchFamily="49" charset="0"/>
+                <a:cs typeface="Courier New" panose="02070309020205020404" pitchFamily="49" charset="0"/>
+              </a:rPr>
+              <a:t>int</a:t>
+            </a:r>
+            <a:r>
+              <a:rPr lang="en-US" sz="2100" dirty="0">
+                <a:latin typeface="Courier New" panose="02070309020205020404" pitchFamily="49" charset="0"/>
+                <a:cs typeface="Courier New" panose="02070309020205020404" pitchFamily="49" charset="0"/>
+              </a:rPr>
+              <a:t>&amp; sum){</a:t>
+            </a:r>
+          </a:p>
+          <a:p>
+            <a:r>
+              <a:rPr lang="en-US" sz="2100" dirty="0">
+                <a:latin typeface="Courier New" panose="02070309020205020404" pitchFamily="49" charset="0"/>
+                <a:cs typeface="Courier New" panose="02070309020205020404" pitchFamily="49" charset="0"/>
+              </a:rPr>
+              <a:t>  sum = 0;</a:t>
+            </a:r>
+          </a:p>
+          <a:p>
+            <a:r>
+              <a:rPr lang="en-US" sz="2100" dirty="0">
+                <a:solidFill>
+                  <a:srgbClr val="7F0055"/>
+                </a:solidFill>
+                <a:latin typeface="Courier New" panose="02070309020205020404" pitchFamily="49" charset="0"/>
+                <a:cs typeface="Courier New" panose="02070309020205020404" pitchFamily="49" charset="0"/>
+              </a:rPr>
+              <a:t>  while</a:t>
+            </a:r>
+            <a:r>
+              <a:rPr lang="en-US" sz="2100" dirty="0">
+                <a:latin typeface="Courier New" panose="02070309020205020404" pitchFamily="49" charset="0"/>
+                <a:cs typeface="Courier New" panose="02070309020205020404" pitchFamily="49" charset="0"/>
+              </a:rPr>
+              <a:t> (</a:t>
+            </a:r>
+            <a:r>
+              <a:rPr lang="en-US" sz="2100" dirty="0">
+                <a:solidFill>
+                  <a:srgbClr val="7F0055"/>
+                </a:solidFill>
+                <a:latin typeface="Courier New" panose="02070309020205020404" pitchFamily="49" charset="0"/>
+                <a:cs typeface="Courier New" panose="02070309020205020404" pitchFamily="49" charset="0"/>
+              </a:rPr>
+              <a:t>true</a:t>
+            </a:r>
+            <a:r>
+              <a:rPr lang="en-US" sz="2100" dirty="0">
+                <a:latin typeface="Courier New" panose="02070309020205020404" pitchFamily="49" charset="0"/>
+                <a:cs typeface="Courier New" panose="02070309020205020404" pitchFamily="49" charset="0"/>
+              </a:rPr>
+              <a:t>){</a:t>
+            </a:r>
+          </a:p>
+          <a:p>
+            <a:r>
+              <a:rPr lang="en-US" sz="2100" dirty="0">
+                <a:latin typeface="Courier New" panose="02070309020205020404" pitchFamily="49" charset="0"/>
+                <a:cs typeface="Courier New" panose="02070309020205020404" pitchFamily="49" charset="0"/>
+              </a:rPr>
+              <a:t>    </a:t>
+            </a:r>
+            <a:r>
+              <a:rPr lang="en-US" sz="2100" dirty="0" err="1">
+                <a:latin typeface="Courier New" panose="02070309020205020404" pitchFamily="49" charset="0"/>
+                <a:cs typeface="Courier New" panose="02070309020205020404" pitchFamily="49" charset="0"/>
+              </a:rPr>
+              <a:t>std</a:t>
+            </a:r>
+            <a:r>
+              <a:rPr lang="en-US" sz="2100" dirty="0">
+                <a:latin typeface="Courier New" panose="02070309020205020404" pitchFamily="49" charset="0"/>
+                <a:cs typeface="Courier New" panose="02070309020205020404" pitchFamily="49" charset="0"/>
+              </a:rPr>
+              <a:t>::</a:t>
+            </a:r>
+            <a:r>
+              <a:rPr lang="en-US" sz="2100" dirty="0" err="1">
+                <a:latin typeface="Courier New" panose="02070309020205020404" pitchFamily="49" charset="0"/>
+                <a:cs typeface="Courier New" panose="02070309020205020404" pitchFamily="49" charset="0"/>
+              </a:rPr>
+              <a:t>unique_lock</a:t>
+            </a:r>
+            <a:r>
+              <a:rPr lang="en-US" sz="2100" dirty="0">
+                <a:latin typeface="Courier New" panose="02070309020205020404" pitchFamily="49" charset="0"/>
+                <a:cs typeface="Courier New" panose="02070309020205020404" pitchFamily="49" charset="0"/>
+              </a:rPr>
+              <a:t>&lt;</a:t>
+            </a:r>
+            <a:r>
+              <a:rPr lang="en-US" sz="2100" dirty="0" err="1">
+                <a:latin typeface="Courier New" panose="02070309020205020404" pitchFamily="49" charset="0"/>
+                <a:cs typeface="Courier New" panose="02070309020205020404" pitchFamily="49" charset="0"/>
+              </a:rPr>
+              <a:t>std</a:t>
+            </a:r>
+            <a:r>
+              <a:rPr lang="en-US" sz="2100" dirty="0">
+                <a:latin typeface="Courier New" panose="02070309020205020404" pitchFamily="49" charset="0"/>
+                <a:cs typeface="Courier New" panose="02070309020205020404" pitchFamily="49" charset="0"/>
+              </a:rPr>
+              <a:t>::mutex&gt; </a:t>
+            </a:r>
+            <a:r>
+              <a:rPr lang="en-US" sz="2100" dirty="0" err="1">
+                <a:latin typeface="Courier New" panose="02070309020205020404" pitchFamily="49" charset="0"/>
+                <a:cs typeface="Courier New" panose="02070309020205020404" pitchFamily="49" charset="0"/>
+              </a:rPr>
+              <a:t>lk</a:t>
+            </a:r>
+            <a:r>
+              <a:rPr lang="en-US" sz="2100" dirty="0">
+                <a:latin typeface="Courier New" panose="02070309020205020404" pitchFamily="49" charset="0"/>
+                <a:cs typeface="Courier New" panose="02070309020205020404" pitchFamily="49" charset="0"/>
+              </a:rPr>
+              <a:t>(m);</a:t>
+            </a:r>
+          </a:p>
+          <a:p>
+            <a:r>
+              <a:rPr lang="en-US" sz="2100" dirty="0">
+                <a:latin typeface="Courier New" panose="02070309020205020404" pitchFamily="49" charset="0"/>
+                <a:cs typeface="Courier New" panose="02070309020205020404" pitchFamily="49" charset="0"/>
+              </a:rPr>
+              <a:t>    </a:t>
+            </a:r>
+            <a:r>
+              <a:rPr lang="en-US" sz="2100" dirty="0" err="1" smtClean="0">
+                <a:latin typeface="Courier New" panose="02070309020205020404" pitchFamily="49" charset="0"/>
+                <a:cs typeface="Courier New" panose="02070309020205020404" pitchFamily="49" charset="0"/>
+              </a:rPr>
+              <a:t>notifier.wait</a:t>
+            </a:r>
+            <a:r>
+              <a:rPr lang="en-US" sz="2100" dirty="0" smtClean="0">
+                <a:latin typeface="Courier New" panose="02070309020205020404" pitchFamily="49" charset="0"/>
+                <a:cs typeface="Courier New" panose="02070309020205020404" pitchFamily="49" charset="0"/>
+              </a:rPr>
+              <a:t>(</a:t>
+            </a:r>
+            <a:r>
+              <a:rPr lang="en-US" sz="2100" dirty="0" err="1" smtClean="0">
+                <a:latin typeface="Courier New" panose="02070309020205020404" pitchFamily="49" charset="0"/>
+                <a:cs typeface="Courier New" panose="02070309020205020404" pitchFamily="49" charset="0"/>
+              </a:rPr>
+              <a:t>lk</a:t>
+            </a:r>
+            <a:r>
+              <a:rPr lang="en-US" sz="2100" dirty="0" smtClean="0">
+                <a:latin typeface="Courier New" panose="02070309020205020404" pitchFamily="49" charset="0"/>
+                <a:cs typeface="Courier New" panose="02070309020205020404" pitchFamily="49" charset="0"/>
+              </a:rPr>
+              <a:t>, []{</a:t>
+            </a:r>
+            <a:r>
+              <a:rPr lang="en-US" sz="2100" dirty="0" smtClean="0">
+                <a:solidFill>
+                  <a:srgbClr val="7F0055"/>
+                </a:solidFill>
+                <a:latin typeface="Courier New" panose="02070309020205020404" pitchFamily="49" charset="0"/>
+                <a:cs typeface="Courier New" panose="02070309020205020404" pitchFamily="49" charset="0"/>
+              </a:rPr>
+              <a:t>return </a:t>
+            </a:r>
+            <a:r>
+              <a:rPr lang="en-US" sz="2100" dirty="0" smtClean="0">
+                <a:latin typeface="Courier New" panose="02070309020205020404" pitchFamily="49" charset="0"/>
+                <a:cs typeface="Courier New" panose="02070309020205020404" pitchFamily="49" charset="0"/>
+              </a:rPr>
+              <a:t>!</a:t>
+            </a:r>
+            <a:r>
+              <a:rPr lang="en-US" sz="2100" dirty="0" err="1" smtClean="0">
+                <a:latin typeface="Courier New" panose="02070309020205020404" pitchFamily="49" charset="0"/>
+                <a:cs typeface="Courier New" panose="02070309020205020404" pitchFamily="49" charset="0"/>
+              </a:rPr>
+              <a:t>queue.empty</a:t>
+            </a:r>
+            <a:r>
+              <a:rPr lang="en-US" sz="2100" dirty="0" smtClean="0">
+                <a:latin typeface="Courier New" panose="02070309020205020404" pitchFamily="49" charset="0"/>
+                <a:cs typeface="Courier New" panose="02070309020205020404" pitchFamily="49" charset="0"/>
+              </a:rPr>
+              <a:t>()});</a:t>
+            </a:r>
+            <a:endParaRPr lang="en-US" sz="2100" dirty="0">
+              <a:latin typeface="Courier New" panose="02070309020205020404" pitchFamily="49" charset="0"/>
+              <a:cs typeface="Courier New" panose="02070309020205020404" pitchFamily="49" charset="0"/>
+            </a:endParaRPr>
+          </a:p>
+          <a:p>
+            <a:r>
+              <a:rPr lang="en-US" sz="2100" dirty="0">
+                <a:solidFill>
+                  <a:srgbClr val="7F0055"/>
+                </a:solidFill>
+                <a:latin typeface="Courier New" panose="02070309020205020404" pitchFamily="49" charset="0"/>
+                <a:cs typeface="Courier New" panose="02070309020205020404" pitchFamily="49" charset="0"/>
+              </a:rPr>
+              <a:t>    if</a:t>
+            </a:r>
+            <a:r>
+              <a:rPr lang="en-US" sz="2100" dirty="0">
+                <a:latin typeface="Courier New" panose="02070309020205020404" pitchFamily="49" charset="0"/>
+                <a:cs typeface="Courier New" panose="02070309020205020404" pitchFamily="49" charset="0"/>
+              </a:rPr>
+              <a:t> (!</a:t>
+            </a:r>
+            <a:r>
+              <a:rPr lang="en-US" sz="2100" dirty="0" err="1">
+                <a:latin typeface="Courier New" panose="02070309020205020404" pitchFamily="49" charset="0"/>
+                <a:cs typeface="Courier New" panose="02070309020205020404" pitchFamily="49" charset="0"/>
+              </a:rPr>
+              <a:t>queue.empty</a:t>
+            </a:r>
+            <a:r>
+              <a:rPr lang="en-US" sz="2100" dirty="0">
+                <a:latin typeface="Courier New" panose="02070309020205020404" pitchFamily="49" charset="0"/>
+                <a:cs typeface="Courier New" panose="02070309020205020404" pitchFamily="49" charset="0"/>
+              </a:rPr>
+              <a:t>()) {</a:t>
+            </a:r>
+          </a:p>
+          <a:p>
+            <a:r>
+              <a:rPr lang="en-US" sz="2100" dirty="0">
+                <a:latin typeface="Courier New" panose="02070309020205020404" pitchFamily="49" charset="0"/>
+                <a:cs typeface="Courier New" panose="02070309020205020404" pitchFamily="49" charset="0"/>
+              </a:rPr>
+              <a:t>      sum += </a:t>
+            </a:r>
+            <a:r>
+              <a:rPr lang="en-US" sz="2100" dirty="0" err="1">
+                <a:latin typeface="Courier New" panose="02070309020205020404" pitchFamily="49" charset="0"/>
+                <a:cs typeface="Courier New" panose="02070309020205020404" pitchFamily="49" charset="0"/>
+              </a:rPr>
+              <a:t>queue.front</a:t>
+            </a:r>
+            <a:r>
+              <a:rPr lang="en-US" sz="2100" dirty="0">
+                <a:latin typeface="Courier New" panose="02070309020205020404" pitchFamily="49" charset="0"/>
+                <a:cs typeface="Courier New" panose="02070309020205020404" pitchFamily="49" charset="0"/>
+              </a:rPr>
+              <a:t>();</a:t>
+            </a:r>
+          </a:p>
+          <a:p>
+            <a:r>
+              <a:rPr lang="en-US" sz="2100" dirty="0">
+                <a:latin typeface="Courier New" panose="02070309020205020404" pitchFamily="49" charset="0"/>
+                <a:cs typeface="Courier New" panose="02070309020205020404" pitchFamily="49" charset="0"/>
+              </a:rPr>
+              <a:t>      </a:t>
+            </a:r>
+            <a:r>
+              <a:rPr lang="en-US" sz="2100" dirty="0" err="1">
+                <a:latin typeface="Courier New" panose="02070309020205020404" pitchFamily="49" charset="0"/>
+                <a:cs typeface="Courier New" panose="02070309020205020404" pitchFamily="49" charset="0"/>
+              </a:rPr>
+              <a:t>queue.pop</a:t>
+            </a:r>
+            <a:r>
+              <a:rPr lang="en-US" sz="2100" dirty="0">
+                <a:latin typeface="Courier New" panose="02070309020205020404" pitchFamily="49" charset="0"/>
+                <a:cs typeface="Courier New" panose="02070309020205020404" pitchFamily="49" charset="0"/>
+              </a:rPr>
+              <a:t>();</a:t>
+            </a:r>
+          </a:p>
+          <a:p>
+            <a:r>
+              <a:rPr lang="en-US" sz="2100" dirty="0">
+                <a:latin typeface="Courier New" panose="02070309020205020404" pitchFamily="49" charset="0"/>
+                <a:cs typeface="Courier New" panose="02070309020205020404" pitchFamily="49" charset="0"/>
+              </a:rPr>
+              <a:t>    }</a:t>
+            </a:r>
+          </a:p>
+          <a:p>
+            <a:r>
+              <a:rPr lang="en-US" sz="2100" dirty="0">
+                <a:latin typeface="Courier New" panose="02070309020205020404" pitchFamily="49" charset="0"/>
+                <a:cs typeface="Courier New" panose="02070309020205020404" pitchFamily="49" charset="0"/>
+              </a:rPr>
+              <a:t>  }</a:t>
+            </a:r>
+          </a:p>
+          <a:p>
+            <a:r>
+              <a:rPr lang="en-US" sz="2100" dirty="0">
+                <a:latin typeface="Courier New" panose="02070309020205020404" pitchFamily="49" charset="0"/>
+                <a:cs typeface="Courier New" panose="02070309020205020404" pitchFamily="49" charset="0"/>
+              </a:rPr>
+              <a:t>} </a:t>
+            </a:r>
+          </a:p>
+          <a:p>
+            <a:endParaRPr lang="en-US" dirty="0"/>
+          </a:p>
+        </p:txBody>
+      </p:sp>
+      <p:sp>
+        <p:nvSpPr>
+          <p:cNvPr id="4" name="Slide Number Placeholder 3"/>
+          <p:cNvSpPr>
+            <a:spLocks noGrp="1"/>
+          </p:cNvSpPr>
+          <p:nvPr>
+            <p:ph type="sldNum" sz="quarter" idx="12"/>
+          </p:nvPr>
+        </p:nvSpPr>
+        <p:spPr/>
+        <p:txBody>
+          <a:bodyPr/>
+          <a:lstStyle/>
+          <a:p>
+            <a:fld id="{6DA12B36-9664-4CB0-8B2E-F4A2F44AE97E}" type="slidenum">
+              <a:rPr lang="en-US" smtClean="0"/>
+              <a:t>8</a:t>
+            </a:fld>
+            <a:endParaRPr lang="en-US"/>
+          </a:p>
+        </p:txBody>
+      </p:sp>
+    </p:spTree>
+    <p:extLst>
+      <p:ext uri="{BB962C8B-B14F-4D97-AF65-F5344CB8AC3E}">
+        <p14:creationId xmlns:p14="http://schemas.microsoft.com/office/powerpoint/2010/main" val="4175654029"/>
+      </p:ext>
+    </p:extLst>
+  </p:cSld>
+  <p:clrMapOvr>
+    <a:masterClrMapping/>
+  </p:clrMapOvr>
+</p:sld>
+</file>
+
+<file path=ppt/slides/slide9.xml><?xml version="1.0" encoding="utf-8"?>
+<p:sld xmlns:a="http://schemas.openxmlformats.org/drawingml/2006/main" xmlns:r="http://schemas.openxmlformats.org/officeDocument/2006/relationships" xmlns:p="http://schemas.openxmlformats.org/presentationml/2006/main">
+  <p:cSld>
+    <p:spTree>
+      <p:nvGrpSpPr>
+        <p:cNvPr id="1" name=""/>
+        <p:cNvGrpSpPr/>
+        <p:nvPr/>
+      </p:nvGrpSpPr>
+      <p:grpSpPr>
+        <a:xfrm>
+          <a:off x="0" y="0"/>
+          <a:ext cx="0" cy="0"/>
+          <a:chOff x="0" y="0"/>
+          <a:chExt cx="0" cy="0"/>
+        </a:xfrm>
+      </p:grpSpPr>
+      <p:sp>
+        <p:nvSpPr>
+          <p:cNvPr id="2" name="Title 1"/>
+          <p:cNvSpPr>
+            <a:spLocks noGrp="1"/>
+          </p:cNvSpPr>
+          <p:nvPr>
+            <p:ph type="title"/>
+          </p:nvPr>
+        </p:nvSpPr>
+        <p:spPr/>
+        <p:txBody>
+          <a:bodyPr/>
+          <a:lstStyle/>
+          <a:p>
+            <a:r>
+              <a:rPr lang="en-US" dirty="0" smtClean="0"/>
+              <a:t>Summary of wait() Behavior</a:t>
+            </a:r>
+            <a:endParaRPr lang="en-US" dirty="0"/>
+          </a:p>
+        </p:txBody>
+      </p:sp>
+      <p:graphicFrame>
+        <p:nvGraphicFramePr>
+          <p:cNvPr id="5" name="Content Placeholder 4"/>
+          <p:cNvGraphicFramePr>
+            <a:graphicFrameLocks noGrp="1"/>
+          </p:cNvGraphicFramePr>
+          <p:nvPr>
+            <p:ph idx="1"/>
+            <p:extLst>
+              <p:ext uri="{D42A27DB-BD31-4B8C-83A1-F6EECF244321}">
+                <p14:modId xmlns:p14="http://schemas.microsoft.com/office/powerpoint/2010/main" val="3339236033"/>
+              </p:ext>
+            </p:extLst>
+          </p:nvPr>
+        </p:nvGraphicFramePr>
+        <p:xfrm>
+          <a:off x="990600" y="1752600"/>
+          <a:ext cx="7162800" cy="4399280"/>
+        </p:xfrm>
+        <a:graphic>
+          <a:graphicData uri="http://schemas.openxmlformats.org/drawingml/2006/table">
+            <a:tbl>
+              <a:tblPr firstRow="1" bandRow="1">
+                <a:tableStyleId>{5C22544A-7EE6-4342-B048-85BDC9FD1C3A}</a:tableStyleId>
+              </a:tblPr>
+              <a:tblGrid>
+                <a:gridCol w="1295400"/>
+                <a:gridCol w="1219200"/>
+                <a:gridCol w="2667000"/>
+                <a:gridCol w="1981200"/>
+              </a:tblGrid>
+              <a:tr h="370840">
+                <a:tc>
+                  <a:txBody>
+                    <a:bodyPr/>
+                    <a:lstStyle/>
+                    <a:p>
+                      <a:r>
+                        <a:rPr lang="en-US" dirty="0" smtClean="0"/>
+                        <a:t>Signaled?</a:t>
+                      </a:r>
+                      <a:endParaRPr lang="en-US" dirty="0"/>
+                    </a:p>
+                  </a:txBody>
+                  <a:tcPr/>
+                </a:tc>
+                <a:tc>
+                  <a:txBody>
+                    <a:bodyPr/>
+                    <a:lstStyle/>
+                    <a:p>
+                      <a:r>
+                        <a:rPr lang="en-US" dirty="0" smtClean="0"/>
+                        <a:t>Predicate</a:t>
+                      </a:r>
+                      <a:endParaRPr lang="en-US" dirty="0"/>
+                    </a:p>
+                  </a:txBody>
+                  <a:tcPr/>
+                </a:tc>
+                <a:tc>
+                  <a:txBody>
+                    <a:bodyPr/>
+                    <a:lstStyle/>
+                    <a:p>
+                      <a:r>
+                        <a:rPr lang="en-US" dirty="0" smtClean="0"/>
+                        <a:t>Behavior</a:t>
+                      </a:r>
+                      <a:endParaRPr lang="en-US" dirty="0"/>
+                    </a:p>
+                  </a:txBody>
+                  <a:tcPr/>
+                </a:tc>
+                <a:tc>
+                  <a:txBody>
+                    <a:bodyPr/>
+                    <a:lstStyle/>
+                    <a:p>
+                      <a:r>
+                        <a:rPr lang="en-US" dirty="0" smtClean="0"/>
+                        <a:t>Locked</a:t>
+                      </a:r>
+                      <a:r>
+                        <a:rPr lang="en-US" baseline="0" dirty="0" smtClean="0"/>
+                        <a:t> on exit</a:t>
+                      </a:r>
+                      <a:r>
+                        <a:rPr lang="en-US" dirty="0" smtClean="0"/>
+                        <a:t>?</a:t>
+                      </a:r>
+                      <a:endParaRPr lang="en-US" dirty="0"/>
+                    </a:p>
+                  </a:txBody>
+                  <a:tcPr/>
+                </a:tc>
+              </a:tr>
+              <a:tr h="370840">
+                <a:tc>
+                  <a:txBody>
+                    <a:bodyPr/>
+                    <a:lstStyle/>
+                    <a:p>
+                      <a:r>
+                        <a:rPr lang="en-US" dirty="0" smtClean="0"/>
+                        <a:t>No</a:t>
+                      </a:r>
+                      <a:endParaRPr lang="en-US" dirty="0"/>
+                    </a:p>
+                  </a:txBody>
+                  <a:tcPr/>
+                </a:tc>
+                <a:tc>
+                  <a:txBody>
+                    <a:bodyPr/>
+                    <a:lstStyle/>
+                    <a:p>
+                      <a:r>
+                        <a:rPr lang="en-US" dirty="0" smtClean="0">
+                          <a:latin typeface="+mn-lt"/>
+                          <a:cs typeface="Courier New" panose="02070309020205020404" pitchFamily="49" charset="0"/>
+                        </a:rPr>
+                        <a:t>false</a:t>
+                      </a:r>
+                      <a:endParaRPr lang="en-US" dirty="0">
+                        <a:latin typeface="+mn-lt"/>
+                      </a:endParaRPr>
+                    </a:p>
+                  </a:txBody>
+                  <a:tcPr/>
+                </a:tc>
+                <a:tc>
+                  <a:txBody>
+                    <a:bodyPr/>
+                    <a:lstStyle/>
+                    <a:p>
+                      <a:pPr marL="342900" indent="-342900">
+                        <a:buFont typeface="+mj-lt"/>
+                        <a:buAutoNum type="arabicPeriod"/>
+                      </a:pPr>
+                      <a:r>
+                        <a:rPr lang="en-US" baseline="0" dirty="0" smtClean="0"/>
+                        <a:t>Check if signaled</a:t>
+                      </a:r>
+                    </a:p>
+                    <a:p>
+                      <a:pPr marL="342900" indent="-342900">
+                        <a:buFont typeface="+mj-lt"/>
+                        <a:buAutoNum type="arabicPeriod"/>
+                      </a:pPr>
+                      <a:r>
+                        <a:rPr lang="en-US" baseline="0" dirty="0" smtClean="0"/>
+                        <a:t>Check predicate</a:t>
+                      </a:r>
+                    </a:p>
+                    <a:p>
+                      <a:pPr marL="342900" indent="-342900">
+                        <a:buFont typeface="+mj-lt"/>
+                        <a:buAutoNum type="arabicPeriod"/>
+                      </a:pPr>
+                      <a:r>
+                        <a:rPr lang="en-US" baseline="0" dirty="0" smtClean="0"/>
+                        <a:t>Release lock</a:t>
+                      </a:r>
+                    </a:p>
+                    <a:p>
+                      <a:pPr marL="342900" indent="-342900">
+                        <a:buFont typeface="+mj-lt"/>
+                        <a:buAutoNum type="arabicPeriod"/>
+                      </a:pPr>
+                      <a:r>
+                        <a:rPr lang="en-US" baseline="0" dirty="0" smtClean="0"/>
+                        <a:t>Sleep</a:t>
+                      </a:r>
+                      <a:endParaRPr lang="en-US" dirty="0"/>
+                    </a:p>
+                  </a:txBody>
+                  <a:tcPr/>
+                </a:tc>
+                <a:tc>
+                  <a:txBody>
+                    <a:bodyPr/>
+                    <a:lstStyle/>
+                    <a:p>
+                      <a:r>
+                        <a:rPr lang="en-US" dirty="0" smtClean="0"/>
+                        <a:t>No</a:t>
+                      </a:r>
+                      <a:endParaRPr lang="en-US" dirty="0"/>
+                    </a:p>
+                  </a:txBody>
+                  <a:tcPr/>
+                </a:tc>
+              </a:tr>
+              <a:tr h="370840">
+                <a:tc>
+                  <a:txBody>
+                    <a:bodyPr/>
+                    <a:lstStyle/>
+                    <a:p>
+                      <a:r>
+                        <a:rPr lang="en-US" dirty="0" smtClean="0"/>
+                        <a:t>Yes</a:t>
+                      </a:r>
+                      <a:endParaRPr lang="en-US" dirty="0"/>
+                    </a:p>
+                  </a:txBody>
+                  <a:tcPr/>
+                </a:tc>
+                <a:tc>
+                  <a:txBody>
+                    <a:bodyPr/>
+                    <a:lstStyle/>
+                    <a:p>
+                      <a:pPr marL="0" marR="0" indent="0" algn="l" defTabSz="914400" rtl="0" eaLnBrk="1" fontAlgn="auto" latinLnBrk="0" hangingPunct="1">
+                        <a:lnSpc>
+                          <a:spcPct val="100000"/>
+                        </a:lnSpc>
+                        <a:spcBef>
+                          <a:spcPts val="0"/>
+                        </a:spcBef>
+                        <a:spcAft>
+                          <a:spcPts val="0"/>
+                        </a:spcAft>
+                        <a:buClrTx/>
+                        <a:buSzTx/>
+                        <a:buFontTx/>
+                        <a:buNone/>
+                        <a:tabLst/>
+                        <a:defRPr/>
+                      </a:pPr>
+                      <a:r>
+                        <a:rPr lang="en-US" dirty="0" smtClean="0">
+                          <a:latin typeface="+mn-lt"/>
+                          <a:cs typeface="Courier New" panose="02070309020205020404" pitchFamily="49" charset="0"/>
+                        </a:rPr>
+                        <a:t>false</a:t>
+                      </a:r>
+                      <a:endParaRPr lang="en-US" dirty="0" smtClean="0">
+                        <a:latin typeface="+mn-lt"/>
+                      </a:endParaRPr>
+                    </a:p>
+                    <a:p>
+                      <a:endParaRPr lang="en-US" dirty="0"/>
+                    </a:p>
+                  </a:txBody>
+                  <a:tcPr/>
+                </a:tc>
+                <a:tc>
+                  <a:txBody>
+                    <a:bodyPr/>
+                    <a:lstStyle/>
+                    <a:p>
+                      <a:pPr marL="342900" indent="-342900">
+                        <a:buFont typeface="+mj-lt"/>
+                        <a:buAutoNum type="arabicPeriod"/>
+                      </a:pPr>
+                      <a:r>
+                        <a:rPr lang="en-US" dirty="0" smtClean="0"/>
+                        <a:t>Check</a:t>
+                      </a:r>
+                      <a:r>
+                        <a:rPr lang="en-US" baseline="0" dirty="0" smtClean="0"/>
+                        <a:t> if signaled</a:t>
+                      </a:r>
+                    </a:p>
+                    <a:p>
+                      <a:pPr marL="342900" indent="-342900">
+                        <a:buFont typeface="+mj-lt"/>
+                        <a:buAutoNum type="arabicPeriod"/>
+                      </a:pPr>
+                      <a:r>
+                        <a:rPr lang="en-US" baseline="0" dirty="0" smtClean="0"/>
+                        <a:t>Return</a:t>
+                      </a:r>
+                      <a:endParaRPr lang="en-US" dirty="0"/>
+                    </a:p>
+                  </a:txBody>
+                  <a:tcPr/>
+                </a:tc>
+                <a:tc>
+                  <a:txBody>
+                    <a:bodyPr/>
+                    <a:lstStyle/>
+                    <a:p>
+                      <a:r>
+                        <a:rPr lang="en-US" dirty="0" smtClean="0"/>
+                        <a:t>Yes</a:t>
+                      </a:r>
+                      <a:endParaRPr lang="en-US" dirty="0"/>
+                    </a:p>
+                  </a:txBody>
+                  <a:tcPr/>
+                </a:tc>
+              </a:tr>
+              <a:tr h="370840">
+                <a:tc>
+                  <a:txBody>
+                    <a:bodyPr/>
+                    <a:lstStyle/>
+                    <a:p>
+                      <a:r>
+                        <a:rPr lang="en-US" dirty="0" smtClean="0"/>
+                        <a:t>No</a:t>
+                      </a:r>
+                      <a:endParaRPr lang="en-US" dirty="0"/>
+                    </a:p>
+                  </a:txBody>
+                  <a:tcPr/>
+                </a:tc>
+                <a:tc>
+                  <a:txBody>
+                    <a:bodyPr/>
+                    <a:lstStyle/>
+                    <a:p>
+                      <a:r>
+                        <a:rPr lang="en-US" dirty="0" smtClean="0"/>
+                        <a:t>true</a:t>
+                      </a:r>
+                      <a:endParaRPr lang="en-US" dirty="0"/>
+                    </a:p>
+                  </a:txBody>
+                  <a:tcPr/>
+                </a:tc>
+                <a:tc>
+                  <a:txBody>
+                    <a:bodyPr/>
+                    <a:lstStyle/>
+                    <a:p>
+                      <a:pPr marL="342900" indent="-342900">
+                        <a:buFont typeface="+mj-lt"/>
+                        <a:buAutoNum type="arabicPeriod"/>
+                      </a:pPr>
+                      <a:r>
+                        <a:rPr lang="en-US" dirty="0" smtClean="0"/>
+                        <a:t>Check if signaled</a:t>
+                      </a:r>
+                    </a:p>
+                    <a:p>
+                      <a:pPr marL="342900" indent="-342900">
+                        <a:buFont typeface="+mj-lt"/>
+                        <a:buAutoNum type="arabicPeriod"/>
+                      </a:pPr>
+                      <a:r>
+                        <a:rPr lang="en-US" dirty="0" smtClean="0"/>
+                        <a:t>Check predicate</a:t>
+                      </a:r>
+                    </a:p>
+                    <a:p>
+                      <a:pPr marL="342900" indent="-342900">
+                        <a:buFont typeface="+mj-lt"/>
+                        <a:buAutoNum type="arabicPeriod"/>
+                      </a:pPr>
+                      <a:r>
+                        <a:rPr lang="en-US" dirty="0" smtClean="0"/>
+                        <a:t>Return</a:t>
+                      </a:r>
+                      <a:endParaRPr lang="en-US" dirty="0"/>
+                    </a:p>
+                  </a:txBody>
+                  <a:tcPr/>
+                </a:tc>
+                <a:tc>
+                  <a:txBody>
+                    <a:bodyPr/>
+                    <a:lstStyle/>
+                    <a:p>
+                      <a:r>
+                        <a:rPr lang="en-US" dirty="0" smtClean="0"/>
+                        <a:t>Yes</a:t>
+                      </a:r>
+                      <a:endParaRPr lang="en-US" dirty="0"/>
+                    </a:p>
+                  </a:txBody>
+                  <a:tcPr/>
+                </a:tc>
+              </a:tr>
+              <a:tr h="370840">
+                <a:tc>
+                  <a:txBody>
+                    <a:bodyPr/>
+                    <a:lstStyle/>
+                    <a:p>
+                      <a:r>
+                        <a:rPr lang="en-US" dirty="0" smtClean="0"/>
+                        <a:t>Yes</a:t>
+                      </a:r>
+                      <a:endParaRPr lang="en-US" dirty="0"/>
+                    </a:p>
+                  </a:txBody>
+                  <a:tcPr/>
+                </a:tc>
+                <a:tc>
+                  <a:txBody>
+                    <a:bodyPr/>
+                    <a:lstStyle/>
+                    <a:p>
+                      <a:r>
+                        <a:rPr lang="en-US" dirty="0" smtClean="0"/>
+                        <a:t>true</a:t>
+                      </a:r>
+                      <a:endParaRPr lang="en-US" dirty="0"/>
+                    </a:p>
+                  </a:txBody>
+                  <a:tcPr/>
+                </a:tc>
+                <a:tc>
+                  <a:txBody>
+                    <a:bodyPr/>
+                    <a:lstStyle/>
+                    <a:p>
+                      <a:pPr marL="342900" indent="-342900">
+                        <a:buFont typeface="+mj-lt"/>
+                        <a:buAutoNum type="arabicPeriod"/>
+                      </a:pPr>
+                      <a:r>
+                        <a:rPr lang="en-US" dirty="0" smtClean="0"/>
+                        <a:t>Check</a:t>
+                      </a:r>
+                      <a:r>
+                        <a:rPr lang="en-US" baseline="0" dirty="0" smtClean="0"/>
+                        <a:t> if signaled</a:t>
+                      </a:r>
+                    </a:p>
+                    <a:p>
+                      <a:pPr marL="342900" indent="-342900">
+                        <a:buFont typeface="+mj-lt"/>
+                        <a:buAutoNum type="arabicPeriod"/>
+                      </a:pPr>
+                      <a:r>
+                        <a:rPr lang="en-US" baseline="0" dirty="0" smtClean="0"/>
+                        <a:t>Return</a:t>
+                      </a:r>
+                      <a:endParaRPr lang="en-US" dirty="0" smtClean="0"/>
+                    </a:p>
+                    <a:p>
+                      <a:endParaRPr lang="en-US" dirty="0"/>
+                    </a:p>
+                  </a:txBody>
+                  <a:tcPr/>
+                </a:tc>
+                <a:tc>
+                  <a:txBody>
+                    <a:bodyPr/>
+                    <a:lstStyle/>
+                    <a:p>
+                      <a:r>
+                        <a:rPr lang="en-US" dirty="0" smtClean="0"/>
+                        <a:t>Yes</a:t>
+                      </a:r>
+                      <a:endParaRPr lang="en-US" dirty="0"/>
+                    </a:p>
+                  </a:txBody>
+                  <a:tcPr/>
+                </a:tc>
+              </a:tr>
+              <a:tr h="370840">
+                <a:tc>
+                  <a:txBody>
+                    <a:bodyPr/>
+                    <a:lstStyle/>
+                    <a:p>
+                      <a:r>
+                        <a:rPr lang="en-US" dirty="0" smtClean="0"/>
+                        <a:t>X</a:t>
+                      </a:r>
+                      <a:endParaRPr lang="en-US" dirty="0"/>
+                    </a:p>
+                  </a:txBody>
+                  <a:tcPr/>
+                </a:tc>
+                <a:tc>
+                  <a:txBody>
+                    <a:bodyPr/>
+                    <a:lstStyle/>
+                    <a:p>
+                      <a:r>
+                        <a:rPr lang="en-US" dirty="0" smtClean="0"/>
+                        <a:t>X</a:t>
+                      </a:r>
+                      <a:endParaRPr lang="en-US" dirty="0"/>
+                    </a:p>
+                  </a:txBody>
+                  <a:tcPr/>
+                </a:tc>
+                <a:tc>
+                  <a:txBody>
+                    <a:bodyPr/>
+                    <a:lstStyle/>
+                    <a:p>
+                      <a:r>
+                        <a:rPr lang="en-US" dirty="0" smtClean="0"/>
+                        <a:t>Exits via exception</a:t>
+                      </a:r>
+                      <a:endParaRPr lang="en-US" dirty="0"/>
+                    </a:p>
+                  </a:txBody>
+                  <a:tcPr/>
+                </a:tc>
+                <a:tc>
+                  <a:txBody>
+                    <a:bodyPr/>
+                    <a:lstStyle/>
+                    <a:p>
+                      <a:r>
+                        <a:rPr lang="en-US" dirty="0" smtClean="0"/>
+                        <a:t>Yes</a:t>
+                      </a:r>
+                      <a:endParaRPr lang="en-US" dirty="0"/>
+                    </a:p>
+                  </a:txBody>
+                  <a:tcPr/>
+                </a:tc>
+              </a:tr>
+            </a:tbl>
+          </a:graphicData>
+        </a:graphic>
+      </p:graphicFrame>
+      <p:sp>
+        <p:nvSpPr>
+          <p:cNvPr id="4" name="Slide Number Placeholder 3"/>
+          <p:cNvSpPr>
+            <a:spLocks noGrp="1"/>
+          </p:cNvSpPr>
+          <p:nvPr>
+            <p:ph type="sldNum" sz="quarter" idx="12"/>
+          </p:nvPr>
+        </p:nvSpPr>
+        <p:spPr/>
+        <p:txBody>
+          <a:bodyPr/>
+          <a:lstStyle/>
+          <a:p>
+            <a:fld id="{6DA12B36-9664-4CB0-8B2E-F4A2F44AE97E}" type="slidenum">
+              <a:rPr lang="en-US" smtClean="0"/>
+              <a:t>9</a:t>
+            </a:fld>
+            <a:endParaRPr lang="en-US"/>
+          </a:p>
+        </p:txBody>
+      </p:sp>
+    </p:spTree>
+    <p:extLst>
+      <p:ext uri="{BB962C8B-B14F-4D97-AF65-F5344CB8AC3E}">
+        <p14:creationId xmlns:p14="http://schemas.microsoft.com/office/powerpoint/2010/main" val="4263009234"/>
+      </p:ext>
+    </p:extLst>
+  </p:cSld>
+  <p:clrMapOvr>
+    <a:masterClrMapping/>
+  </p:clrMapOvr>
 </p:sld>
 </file>
 

</xml_diff>

<commit_message>
Wrap up some changes to the std::condition_variable part of the lecture.
</commit_message>
<xml_diff>
--- a/Lectures/Asynchronous Operations/Asynchronous Operations.pptx
+++ b/Lectures/Asynchronous Operations/Asynchronous Operations.pptx
@@ -204,7 +204,7 @@
           <a:p>
             <a:fld id="{DBE0ECA1-3FBF-48AE-AD2A-4439AE745E19}" type="datetimeFigureOut">
               <a:rPr lang="en-US" smtClean="0"/>
-              <a:t>11/15/2013</a:t>
+              <a:t>11/18/2013</a:t>
             </a:fld>
             <a:endParaRPr lang="en-US"/>
           </a:p>
@@ -665,7 +665,7 @@
           <a:p>
             <a:fld id="{9769DED8-28D4-45B9-A00F-7CFE9335FEA6}" type="datetime1">
               <a:rPr lang="en-US" smtClean="0"/>
-              <a:t>11/15/2013</a:t>
+              <a:t>11/18/2013</a:t>
             </a:fld>
             <a:endParaRPr lang="en-US"/>
           </a:p>
@@ -930,7 +930,7 @@
           <a:p>
             <a:fld id="{2DB3D439-1F88-44B4-B5F7-F9BCD4064257}" type="datetime1">
               <a:rPr lang="en-US" smtClean="0"/>
-              <a:t>11/15/2013</a:t>
+              <a:t>11/18/2013</a:t>
             </a:fld>
             <a:endParaRPr lang="en-US"/>
           </a:p>
@@ -1105,7 +1105,7 @@
           <a:p>
             <a:fld id="{99C5638F-6F55-4055-935C-67841BE78C36}" type="datetime1">
               <a:rPr lang="en-US" smtClean="0"/>
-              <a:t>11/15/2013</a:t>
+              <a:t>11/18/2013</a:t>
             </a:fld>
             <a:endParaRPr lang="en-US"/>
           </a:p>
@@ -1270,7 +1270,7 @@
           <a:p>
             <a:fld id="{E6987D90-0C92-4B22-A29D-FED15412CED2}" type="datetime1">
               <a:rPr lang="en-US" smtClean="0"/>
-              <a:t>11/15/2013</a:t>
+              <a:t>11/18/2013</a:t>
             </a:fld>
             <a:endParaRPr lang="en-US"/>
           </a:p>
@@ -1519,7 +1519,7 @@
           <a:p>
             <a:fld id="{DDB67BC4-9554-49E0-BCB3-D1EF965BA0B8}" type="datetime1">
               <a:rPr lang="en-US" smtClean="0"/>
-              <a:t>11/15/2013</a:t>
+              <a:t>11/18/2013</a:t>
             </a:fld>
             <a:endParaRPr lang="en-US"/>
           </a:p>
@@ -1802,7 +1802,7 @@
           <a:p>
             <a:fld id="{EC24D770-803D-4E01-921C-9C100DD8230C}" type="datetime1">
               <a:rPr lang="en-US" smtClean="0"/>
-              <a:t>11/15/2013</a:t>
+              <a:t>11/18/2013</a:t>
             </a:fld>
             <a:endParaRPr lang="en-US"/>
           </a:p>
@@ -2241,7 +2241,7 @@
           <a:p>
             <a:fld id="{356AD44B-78A4-4209-8070-7DCBE2DC4992}" type="datetime1">
               <a:rPr lang="en-US" smtClean="0"/>
-              <a:t>11/15/2013</a:t>
+              <a:t>11/18/2013</a:t>
             </a:fld>
             <a:endParaRPr lang="en-US"/>
           </a:p>
@@ -2354,7 +2354,7 @@
           <a:p>
             <a:fld id="{A993C59A-7CA2-467F-B7F1-9096881A01B8}" type="datetime1">
               <a:rPr lang="en-US" smtClean="0"/>
-              <a:t>11/15/2013</a:t>
+              <a:t>11/18/2013</a:t>
             </a:fld>
             <a:endParaRPr lang="en-US"/>
           </a:p>
@@ -2444,7 +2444,7 @@
           <a:p>
             <a:fld id="{2B6B58D0-2488-434A-8ED1-692E09B85CC5}" type="datetime1">
               <a:rPr lang="en-US" smtClean="0"/>
-              <a:t>11/15/2013</a:t>
+              <a:t>11/18/2013</a:t>
             </a:fld>
             <a:endParaRPr lang="en-US"/>
           </a:p>
@@ -2686,7 +2686,7 @@
           <a:p>
             <a:fld id="{FDB0AFC2-7D64-4F61-A7B7-9932D3305DDA}" type="datetime1">
               <a:rPr lang="en-US" smtClean="0"/>
-              <a:t>11/15/2013</a:t>
+              <a:t>11/18/2013</a:t>
             </a:fld>
             <a:endParaRPr lang="en-US"/>
           </a:p>
@@ -2980,7 +2980,7 @@
           <a:p>
             <a:fld id="{4983D17A-D7B2-4ECE-8A2C-93679B9D177B}" type="datetime1">
               <a:rPr lang="en-US" smtClean="0"/>
-              <a:t>11/15/2013</a:t>
+              <a:t>11/18/2013</a:t>
             </a:fld>
             <a:endParaRPr lang="en-US"/>
           </a:p>
@@ -3274,7 +3274,7 @@
           <a:p>
             <a:fld id="{2A5275F7-419E-4C23-8A3D-2EE5742B2EC9}" type="datetime1">
               <a:rPr lang="en-US" smtClean="0"/>
-              <a:t>11/15/2013</a:t>
+              <a:t>11/18/2013</a:t>
             </a:fld>
             <a:endParaRPr lang="en-US"/>
           </a:p>
@@ -4023,7 +4023,15 @@
             </a:r>
             <a:r>
               <a:rPr lang="en-US" dirty="0" smtClean="0"/>
-              <a:t> is like a gate that always one thread to continue</a:t>
+              <a:t> is like a gate that always </a:t>
+            </a:r>
+            <a:r>
+              <a:rPr lang="en-US" dirty="0" smtClean="0"/>
+              <a:t>allows one </a:t>
+            </a:r>
+            <a:r>
+              <a:rPr lang="en-US" dirty="0" smtClean="0"/>
+              <a:t>thread to continue</a:t>
             </a:r>
           </a:p>
           <a:p>
@@ -4113,7 +4121,7 @@
           <a:p>
             <a:r>
               <a:rPr lang="en-US" dirty="0" smtClean="0"/>
-              <a:t>Condition variable guidelines</a:t>
+              <a:t>Spurious wakes</a:t>
             </a:r>
             <a:endParaRPr lang="en-US" dirty="0"/>
           </a:p>
@@ -4136,7 +4144,37 @@
           <a:p>
             <a:r>
               <a:rPr lang="en-US" dirty="0" smtClean="0"/>
-              <a:t>When using condition variables, keep things simple</a:t>
+              <a:t>A call to </a:t>
+            </a:r>
+            <a:r>
+              <a:rPr lang="en-US" dirty="0" smtClean="0">
+                <a:latin typeface="Courier New" panose="02070309020205020404" pitchFamily="49" charset="0"/>
+                <a:cs typeface="Courier New" panose="02070309020205020404" pitchFamily="49" charset="0"/>
+              </a:rPr>
+              <a:t>wait</a:t>
+            </a:r>
+            <a:r>
+              <a:rPr lang="en-US" dirty="0" smtClean="0"/>
+              <a:t> may exit before one of the notify methods is called</a:t>
+            </a:r>
+          </a:p>
+          <a:p>
+            <a:pPr marL="800100" lvl="1" indent="-342900"/>
+            <a:r>
+              <a:rPr lang="en-US" dirty="0" smtClean="0"/>
+              <a:t>This is called a </a:t>
+            </a:r>
+            <a:r>
+              <a:rPr lang="en-US" i="1" dirty="0" smtClean="0"/>
+              <a:t>spurious wake</a:t>
+            </a:r>
+            <a:endParaRPr lang="en-US" dirty="0" smtClean="0"/>
+          </a:p>
+          <a:p>
+            <a:pPr marL="800100" lvl="1" indent="-342900"/>
+            <a:r>
+              <a:rPr lang="en-US" dirty="0" smtClean="0"/>
+              <a:t>May happen at any time</a:t>
             </a:r>
           </a:p>
           <a:p>
@@ -4148,6 +4186,11 @@
               </a:rPr>
               <a:t>Guidelines</a:t>
             </a:r>
+            <a:endParaRPr lang="en-US" dirty="0" smtClean="0">
+              <a:solidFill>
+                <a:schemeClr val="accent3"/>
+              </a:solidFill>
+            </a:endParaRPr>
           </a:p>
           <a:p>
             <a:pPr marL="800100" lvl="1" indent="-342900"/>
@@ -4175,17 +4218,75 @@
                   <a:schemeClr val="accent3"/>
                 </a:solidFill>
               </a:rPr>
-              <a:t> without a wake condition.</a:t>
-            </a:r>
-          </a:p>
-          <a:p>
-            <a:pPr marL="800100" lvl="1" indent="-342900"/>
+              <a:t> </a:t>
+            </a:r>
             <a:r>
               <a:rPr lang="en-US" dirty="0" smtClean="0">
                 <a:solidFill>
                   <a:schemeClr val="accent3"/>
                 </a:solidFill>
               </a:rPr>
+              <a:t>with </a:t>
+            </a:r>
+            <a:r>
+              <a:rPr lang="en-US" dirty="0" smtClean="0">
+                <a:solidFill>
+                  <a:schemeClr val="accent3"/>
+                </a:solidFill>
+              </a:rPr>
+              <a:t>a wake condition</a:t>
+            </a:r>
+            <a:r>
+              <a:rPr lang="en-US" dirty="0" smtClean="0">
+                <a:solidFill>
+                  <a:schemeClr val="accent3"/>
+                </a:solidFill>
+              </a:rPr>
+              <a:t>.</a:t>
+            </a:r>
+          </a:p>
+          <a:p>
+            <a:pPr marL="800100" lvl="1" indent="-342900"/>
+            <a:r>
+              <a:rPr lang="en-US" dirty="0" smtClean="0">
+                <a:solidFill>
+                  <a:schemeClr val="accent3"/>
+                </a:solidFill>
+              </a:rPr>
+              <a:t>Check wake condition again after </a:t>
+            </a:r>
+            <a:r>
+              <a:rPr lang="en-US" dirty="0" smtClean="0">
+                <a:solidFill>
+                  <a:schemeClr val="accent3"/>
+                </a:solidFill>
+                <a:latin typeface="Courier New" panose="02070309020205020404" pitchFamily="49" charset="0"/>
+                <a:cs typeface="Courier New" panose="02070309020205020404" pitchFamily="49" charset="0"/>
+              </a:rPr>
+              <a:t>wake</a:t>
+            </a:r>
+            <a:r>
+              <a:rPr lang="en-US" dirty="0" smtClean="0">
+                <a:solidFill>
+                  <a:schemeClr val="accent3"/>
+                </a:solidFill>
+              </a:rPr>
+              <a:t> returns.</a:t>
+            </a:r>
+            <a:endParaRPr lang="en-US" dirty="0" smtClean="0">
+              <a:solidFill>
+                <a:schemeClr val="accent3"/>
+              </a:solidFill>
+            </a:endParaRPr>
+          </a:p>
+          <a:p>
+            <a:pPr marL="800100" lvl="1" indent="-342900"/>
+            <a:r>
+              <a:rPr lang="en-US" dirty="0" smtClean="0">
+                <a:solidFill>
+                  <a:schemeClr val="accent3"/>
+                </a:solidFill>
+              </a:rPr>
               <a:t>Do not lock a mutex while calling </a:t>
             </a:r>
             <a:r>
@@ -4215,6 +4316,15 @@
                 <a:cs typeface="Courier New" panose="02070309020205020404" pitchFamily="49" charset="0"/>
               </a:rPr>
               <a:t>notify_all</a:t>
+            </a:r>
+            <a:r>
+              <a:rPr lang="en-US" dirty="0" smtClean="0">
+                <a:solidFill>
+                  <a:schemeClr val="accent3"/>
+                </a:solidFill>
+                <a:cs typeface="Courier New" panose="02070309020205020404" pitchFamily="49" charset="0"/>
+              </a:rPr>
+              <a:t>.</a:t>
             </a:r>
             <a:endParaRPr lang="en-US" dirty="0">
               <a:solidFill>
@@ -4259,6 +4369,13 @@
   <p:clrMapOvr>
     <a:masterClrMapping/>
   </p:clrMapOvr>
+  <p:timing>
+    <p:tnLst>
+      <p:par>
+        <p:cTn id="1" dur="indefinite" restart="never" nodeType="tmRoot"/>
+      </p:par>
+    </p:tnLst>
+  </p:timing>
 </p:sld>
 </file>
 
@@ -4383,40 +4500,37 @@
           <a:p>
             <a:pPr marL="342900" indent="-342900"/>
             <a:r>
+              <a:rPr lang="en-US" dirty="0" smtClean="0"/>
+              <a:t>A condition variable can be used to exit a thread.</a:t>
+            </a:r>
+            <a:endParaRPr lang="en-US" dirty="0"/>
+          </a:p>
+          <a:p>
+            <a:pPr marL="342900" indent="-342900"/>
+            <a:r>
+              <a:rPr lang="en-US" dirty="0" smtClean="0"/>
+              <a:t>Let’s see an example.</a:t>
+            </a:r>
+          </a:p>
+          <a:p>
+            <a:pPr marL="342900" indent="-342900"/>
+            <a:endParaRPr lang="en-US" dirty="0"/>
+          </a:p>
+          <a:p>
+            <a:pPr marL="342900" indent="-342900"/>
+            <a:r>
               <a:rPr lang="en-US" dirty="0" smtClean="0">
                 <a:solidFill>
-                  <a:schemeClr val="accent3"/>
+                  <a:schemeClr val="tx2"/>
                 </a:solidFill>
               </a:rPr>
-              <a:t>Guideline</a:t>
-            </a:r>
-          </a:p>
-          <a:p>
-            <a:pPr marL="800100" lvl="1" indent="-342900"/>
-            <a:r>
-              <a:rPr lang="en-US" dirty="0" smtClean="0">
-                <a:solidFill>
-                  <a:schemeClr val="accent3"/>
-                </a:solidFill>
-              </a:rPr>
-              <a:t>Prefer to exit a thread by signaling a condition variable</a:t>
-            </a:r>
-          </a:p>
-          <a:p>
-            <a:pPr marL="342900" indent="-342900"/>
+              <a:t>There is a better way to do this though – we’ll see that later.</a:t>
+            </a:r>
             <a:endParaRPr lang="en-US" dirty="0">
               <a:solidFill>
-                <a:schemeClr val="accent3"/>
+                <a:schemeClr val="tx2"/>
               </a:solidFill>
             </a:endParaRPr>
-          </a:p>
-          <a:p>
-            <a:pPr marL="342900" indent="-342900"/>
-            <a:r>
-              <a:rPr lang="en-US" dirty="0" smtClean="0"/>
-              <a:t>Let’s see an example.</a:t>
-            </a:r>
-            <a:endParaRPr lang="en-US" dirty="0"/>
           </a:p>
         </p:txBody>
       </p:sp>
@@ -4453,6 +4567,85 @@
   <p:clrMapOvr>
     <a:masterClrMapping/>
   </p:clrMapOvr>
+  <p:timing>
+    <p:tnLst>
+      <p:par>
+        <p:cTn id="1" dur="indefinite" restart="never" nodeType="tmRoot">
+          <p:childTnLst>
+            <p:seq concurrent="1" nextAc="seek">
+              <p:cTn id="2" dur="indefinite" nodeType="mainSeq">
+                <p:childTnLst>
+                  <p:par>
+                    <p:cTn id="3" fill="hold">
+                      <p:stCondLst>
+                        <p:cond delay="indefinite"/>
+                      </p:stCondLst>
+                      <p:childTnLst>
+                        <p:par>
+                          <p:cTn id="4" fill="hold">
+                            <p:stCondLst>
+                              <p:cond delay="0"/>
+                            </p:stCondLst>
+                            <p:childTnLst>
+                              <p:par>
+                                <p:cTn id="5" presetID="1" presetClass="entr" presetSubtype="0" fill="hold" nodeType="clickEffect">
+                                  <p:stCondLst>
+                                    <p:cond delay="0"/>
+                                  </p:stCondLst>
+                                  <p:childTnLst>
+                                    <p:set>
+                                      <p:cBhvr>
+                                        <p:cTn id="6" dur="1" fill="hold">
+                                          <p:stCondLst>
+                                            <p:cond delay="0"/>
+                                          </p:stCondLst>
+                                        </p:cTn>
+                                        <p:tgtEl>
+                                          <p:spTgt spid="3">
+                                            <p:txEl>
+                                              <p:pRg st="8" end="8"/>
+                                            </p:txEl>
+                                          </p:spTgt>
+                                        </p:tgtEl>
+                                        <p:attrNameLst>
+                                          <p:attrName>style.visibility</p:attrName>
+                                        </p:attrNameLst>
+                                      </p:cBhvr>
+                                      <p:to>
+                                        <p:strVal val="visible"/>
+                                      </p:to>
+                                    </p:set>
+                                  </p:childTnLst>
+                                </p:cTn>
+                              </p:par>
+                            </p:childTnLst>
+                          </p:cTn>
+                        </p:par>
+                      </p:childTnLst>
+                    </p:cTn>
+                  </p:par>
+                </p:childTnLst>
+              </p:cTn>
+              <p:prevCondLst>
+                <p:cond evt="onPrev" delay="0">
+                  <p:tgtEl>
+                    <p:sldTgt/>
+                  </p:tgtEl>
+                </p:cond>
+              </p:prevCondLst>
+              <p:nextCondLst>
+                <p:cond evt="onNext" delay="0">
+                  <p:tgtEl>
+                    <p:sldTgt/>
+                  </p:tgtEl>
+                </p:cond>
+              </p:nextCondLst>
+            </p:seq>
+          </p:childTnLst>
+        </p:cTn>
+      </p:par>
+    </p:tnLst>
+  </p:timing>
 </p:sld>
 </file>
 
@@ -4786,6 +4979,13 @@
   <p:clrMapOvr>
     <a:masterClrMapping/>
   </p:clrMapOvr>
+  <p:timing>
+    <p:tnLst>
+      <p:par>
+        <p:cTn id="1" dur="indefinite" restart="never" nodeType="tmRoot"/>
+      </p:par>
+    </p:tnLst>
+  </p:timing>
 </p:sld>
 </file>
 
@@ -5049,11 +5249,7 @@
             <a:pPr marL="800100" lvl="1" indent="-342900"/>
             <a:r>
               <a:rPr lang="en-US" sz="2400" dirty="0" smtClean="0"/>
-              <a:t>Allows a thread to know exactly when to do </a:t>
-            </a:r>
-            <a:r>
-              <a:rPr lang="en-US" sz="2400" dirty="0" smtClean="0"/>
-              <a:t>something</a:t>
+              <a:t>Allows a thread to know exactly when to do something</a:t>
             </a:r>
           </a:p>
           <a:p>
@@ -5062,7 +5258,6 @@
               <a:rPr lang="en-US" sz="2400" dirty="0" smtClean="0"/>
               <a:t>Used to synchronize two asynchronous operations</a:t>
             </a:r>
-            <a:endParaRPr lang="en-US" sz="2400" dirty="0" smtClean="0"/>
           </a:p>
           <a:p>
             <a:pPr marL="342900" indent="-342900"/>

</xml_diff>

<commit_message>
Add details about std::async.
</commit_message>
<xml_diff>
--- a/Lectures/Asynchronous Operations/Asynchronous Operations.pptx
+++ b/Lectures/Asynchronous Operations/Asynchronous Operations.pptx
@@ -5,7 +5,7 @@
     <p:sldMasterId id="2147483660" r:id="rId1"/>
   </p:sldMasterIdLst>
   <p:notesMasterIdLst>
-    <p:notesMasterId r:id="rId15"/>
+    <p:notesMasterId r:id="rId18"/>
   </p:notesMasterIdLst>
   <p:sldIdLst>
     <p:sldId id="256" r:id="rId2"/>
@@ -21,6 +21,9 @@
     <p:sldId id="265" r:id="rId12"/>
     <p:sldId id="266" r:id="rId13"/>
     <p:sldId id="268" r:id="rId14"/>
+    <p:sldId id="269" r:id="rId15"/>
+    <p:sldId id="270" r:id="rId16"/>
+    <p:sldId id="271" r:id="rId17"/>
   </p:sldIdLst>
   <p:sldSz cx="9144000" cy="6858000" type="screen4x3"/>
   <p:notesSz cx="6858000" cy="9144000"/>
@@ -204,7 +207,7 @@
           <a:p>
             <a:fld id="{DBE0ECA1-3FBF-48AE-AD2A-4439AE745E19}" type="datetimeFigureOut">
               <a:rPr lang="en-US" smtClean="0"/>
-              <a:t>11/18/2013</a:t>
+              <a:t>11/19/2013</a:t>
             </a:fld>
             <a:endParaRPr lang="en-US"/>
           </a:p>
@@ -665,7 +668,7 @@
           <a:p>
             <a:fld id="{9769DED8-28D4-45B9-A00F-7CFE9335FEA6}" type="datetime1">
               <a:rPr lang="en-US" smtClean="0"/>
-              <a:t>11/18/2013</a:t>
+              <a:t>11/19/2013</a:t>
             </a:fld>
             <a:endParaRPr lang="en-US"/>
           </a:p>
@@ -930,7 +933,7 @@
           <a:p>
             <a:fld id="{2DB3D439-1F88-44B4-B5F7-F9BCD4064257}" type="datetime1">
               <a:rPr lang="en-US" smtClean="0"/>
-              <a:t>11/18/2013</a:t>
+              <a:t>11/19/2013</a:t>
             </a:fld>
             <a:endParaRPr lang="en-US"/>
           </a:p>
@@ -1105,7 +1108,7 @@
           <a:p>
             <a:fld id="{99C5638F-6F55-4055-935C-67841BE78C36}" type="datetime1">
               <a:rPr lang="en-US" smtClean="0"/>
-              <a:t>11/18/2013</a:t>
+              <a:t>11/19/2013</a:t>
             </a:fld>
             <a:endParaRPr lang="en-US"/>
           </a:p>
@@ -1270,7 +1273,7 @@
           <a:p>
             <a:fld id="{E6987D90-0C92-4B22-A29D-FED15412CED2}" type="datetime1">
               <a:rPr lang="en-US" smtClean="0"/>
-              <a:t>11/18/2013</a:t>
+              <a:t>11/19/2013</a:t>
             </a:fld>
             <a:endParaRPr lang="en-US"/>
           </a:p>
@@ -1519,7 +1522,7 @@
           <a:p>
             <a:fld id="{DDB67BC4-9554-49E0-BCB3-D1EF965BA0B8}" type="datetime1">
               <a:rPr lang="en-US" smtClean="0"/>
-              <a:t>11/18/2013</a:t>
+              <a:t>11/19/2013</a:t>
             </a:fld>
             <a:endParaRPr lang="en-US"/>
           </a:p>
@@ -1802,7 +1805,7 @@
           <a:p>
             <a:fld id="{EC24D770-803D-4E01-921C-9C100DD8230C}" type="datetime1">
               <a:rPr lang="en-US" smtClean="0"/>
-              <a:t>11/18/2013</a:t>
+              <a:t>11/19/2013</a:t>
             </a:fld>
             <a:endParaRPr lang="en-US"/>
           </a:p>
@@ -2241,7 +2244,7 @@
           <a:p>
             <a:fld id="{356AD44B-78A4-4209-8070-7DCBE2DC4992}" type="datetime1">
               <a:rPr lang="en-US" smtClean="0"/>
-              <a:t>11/18/2013</a:t>
+              <a:t>11/19/2013</a:t>
             </a:fld>
             <a:endParaRPr lang="en-US"/>
           </a:p>
@@ -2354,7 +2357,7 @@
           <a:p>
             <a:fld id="{A993C59A-7CA2-467F-B7F1-9096881A01B8}" type="datetime1">
               <a:rPr lang="en-US" smtClean="0"/>
-              <a:t>11/18/2013</a:t>
+              <a:t>11/19/2013</a:t>
             </a:fld>
             <a:endParaRPr lang="en-US"/>
           </a:p>
@@ -2444,7 +2447,7 @@
           <a:p>
             <a:fld id="{2B6B58D0-2488-434A-8ED1-692E09B85CC5}" type="datetime1">
               <a:rPr lang="en-US" smtClean="0"/>
-              <a:t>11/18/2013</a:t>
+              <a:t>11/19/2013</a:t>
             </a:fld>
             <a:endParaRPr lang="en-US"/>
           </a:p>
@@ -2686,7 +2689,7 @@
           <a:p>
             <a:fld id="{FDB0AFC2-7D64-4F61-A7B7-9932D3305DDA}" type="datetime1">
               <a:rPr lang="en-US" smtClean="0"/>
-              <a:t>11/18/2013</a:t>
+              <a:t>11/19/2013</a:t>
             </a:fld>
             <a:endParaRPr lang="en-US"/>
           </a:p>
@@ -2980,7 +2983,7 @@
           <a:p>
             <a:fld id="{4983D17A-D7B2-4ECE-8A2C-93679B9D177B}" type="datetime1">
               <a:rPr lang="en-US" smtClean="0"/>
-              <a:t>11/18/2013</a:t>
+              <a:t>11/19/2013</a:t>
             </a:fld>
             <a:endParaRPr lang="en-US"/>
           </a:p>
@@ -3274,7 +3277,7 @@
           <a:p>
             <a:fld id="{2A5275F7-419E-4C23-8A3D-2EE5742B2EC9}" type="datetime1">
               <a:rPr lang="en-US" smtClean="0"/>
-              <a:t>11/18/2013</a:t>
+              <a:t>11/19/2013</a:t>
             </a:fld>
             <a:endParaRPr lang="en-US"/>
           </a:p>
@@ -4023,15 +4026,7 @@
             </a:r>
             <a:r>
               <a:rPr lang="en-US" dirty="0" smtClean="0"/>
-              <a:t> is like a gate that always </a:t>
-            </a:r>
-            <a:r>
-              <a:rPr lang="en-US" dirty="0" smtClean="0"/>
-              <a:t>allows one </a:t>
-            </a:r>
-            <a:r>
-              <a:rPr lang="en-US" dirty="0" smtClean="0"/>
-              <a:t>thread to continue</a:t>
+              <a:t> is like a gate that always allows one thread to continue</a:t>
             </a:r>
           </a:p>
           <a:p>
@@ -4070,6 +4065,29 @@
               <a:rPr lang="en-US" smtClean="0"/>
               <a:t>10</a:t>
             </a:fld>
+            <a:endParaRPr lang="en-US"/>
+          </a:p>
+        </p:txBody>
+      </p:sp>
+      <p:sp>
+        <p:nvSpPr>
+          <p:cNvPr id="5" name="Footer Placeholder 4"/>
+          <p:cNvSpPr>
+            <a:spLocks noGrp="1"/>
+          </p:cNvSpPr>
+          <p:nvPr>
+            <p:ph type="ftr" sz="quarter" idx="11"/>
+          </p:nvPr>
+        </p:nvSpPr>
+        <p:spPr/>
+        <p:txBody>
+          <a:bodyPr/>
+          <a:lstStyle/>
+          <a:p>
+            <a:r>
+              <a:rPr lang="en-US" smtClean="0"/>
+              <a:t>Source: Williams, Chapter 4</a:t>
+            </a:r>
             <a:endParaRPr lang="en-US"/>
           </a:p>
         </p:txBody>
@@ -4174,8 +4192,20 @@
             <a:pPr marL="800100" lvl="1" indent="-342900"/>
             <a:r>
               <a:rPr lang="en-US" dirty="0" smtClean="0"/>
-              <a:t>May happen at any time</a:t>
-            </a:r>
+              <a:t>May happen at any </a:t>
+            </a:r>
+            <a:r>
+              <a:rPr lang="en-US" dirty="0" smtClean="0"/>
+              <a:t>time</a:t>
+            </a:r>
+          </a:p>
+          <a:p>
+            <a:pPr marL="800100" lvl="1" indent="-342900"/>
+            <a:r>
+              <a:rPr lang="en-US" dirty="0" smtClean="0"/>
+              <a:t>Could happen when predicate returns true</a:t>
+            </a:r>
+            <a:endParaRPr lang="en-US" dirty="0" smtClean="0"/>
           </a:p>
           <a:p>
             <a:r>
@@ -4186,11 +4216,6 @@
               </a:rPr>
               <a:t>Guidelines</a:t>
             </a:r>
-            <a:endParaRPr lang="en-US" dirty="0" smtClean="0">
-              <a:solidFill>
-                <a:schemeClr val="accent3"/>
-              </a:solidFill>
-            </a:endParaRPr>
           </a:p>
           <a:p>
             <a:pPr marL="800100" lvl="1" indent="-342900"/>
@@ -4218,23 +4243,28 @@
                   <a:schemeClr val="accent3"/>
                 </a:solidFill>
               </a:rPr>
-              <a:t> </a:t>
-            </a:r>
+              <a:t> with a wake condition.</a:t>
+            </a:r>
+          </a:p>
+          <a:p>
+            <a:pPr marL="800100" lvl="1" indent="-342900"/>
             <a:r>
               <a:rPr lang="en-US" dirty="0" smtClean="0">
                 <a:solidFill>
                   <a:schemeClr val="accent3"/>
                 </a:solidFill>
               </a:rPr>
-              <a:t>with </a:t>
+              <a:t>Check wake condition again after </a:t>
             </a:r>
             <a:r>
               <a:rPr lang="en-US" dirty="0" smtClean="0">
                 <a:solidFill>
                   <a:schemeClr val="accent3"/>
                 </a:solidFill>
-              </a:rPr>
-              <a:t>a wake condition</a:t>
+                <a:latin typeface="Courier New" panose="02070309020205020404" pitchFamily="49" charset="0"/>
+                <a:cs typeface="Courier New" panose="02070309020205020404" pitchFamily="49" charset="0"/>
+              </a:rPr>
+              <a:t>wake</a:t>
             </a:r>
             <a:r>
               <a:rPr lang="en-US" dirty="0" smtClean="0">
@@ -4242,42 +4272,8 @@
                   <a:schemeClr val="accent3"/>
                 </a:solidFill>
               </a:rPr>
-              <a:t>.</a:t>
-            </a:r>
-          </a:p>
-          <a:p>
-            <a:pPr marL="800100" lvl="1" indent="-342900"/>
-            <a:r>
-              <a:rPr lang="en-US" dirty="0" smtClean="0">
-                <a:solidFill>
-                  <a:schemeClr val="accent3"/>
-                </a:solidFill>
-              </a:rPr>
-              <a:t>Check wake condition again after </a:t>
-            </a:r>
-            <a:r>
-              <a:rPr lang="en-US" dirty="0" smtClean="0">
-                <a:solidFill>
-                  <a:schemeClr val="accent3"/>
-                </a:solidFill>
-                <a:latin typeface="Courier New" panose="02070309020205020404" pitchFamily="49" charset="0"/>
-                <a:cs typeface="Courier New" panose="02070309020205020404" pitchFamily="49" charset="0"/>
-              </a:rPr>
-              <a:t>wake</a:t>
-            </a:r>
-            <a:r>
-              <a:rPr lang="en-US" dirty="0" smtClean="0">
-                <a:solidFill>
-                  <a:schemeClr val="accent3"/>
-                </a:solidFill>
-              </a:rPr>
               <a:t> returns.</a:t>
             </a:r>
-            <a:endParaRPr lang="en-US" dirty="0" smtClean="0">
-              <a:solidFill>
-                <a:schemeClr val="accent3"/>
-              </a:solidFill>
-            </a:endParaRPr>
           </a:p>
           <a:p>
             <a:pPr marL="800100" lvl="1" indent="-342900"/>
@@ -4856,7 +4852,31 @@
               <a:rPr lang="en-US" dirty="0" smtClean="0">
                 <a:cs typeface="Courier New" panose="02070309020205020404" pitchFamily="49" charset="0"/>
               </a:rPr>
-              <a:t> excepts a callable object list the </a:t>
+              <a:t> </a:t>
+            </a:r>
+            <a:r>
+              <a:rPr lang="en-US" dirty="0" smtClean="0">
+                <a:cs typeface="Courier New" panose="02070309020205020404" pitchFamily="49" charset="0"/>
+              </a:rPr>
+              <a:t>expects </a:t>
+            </a:r>
+            <a:r>
+              <a:rPr lang="en-US" dirty="0" smtClean="0">
+                <a:cs typeface="Courier New" panose="02070309020205020404" pitchFamily="49" charset="0"/>
+              </a:rPr>
+              <a:t>a callable object </a:t>
+            </a:r>
+            <a:r>
+              <a:rPr lang="en-US" dirty="0" smtClean="0">
+                <a:cs typeface="Courier New" panose="02070309020205020404" pitchFamily="49" charset="0"/>
+              </a:rPr>
+              <a:t>like </a:t>
+            </a:r>
+            <a:r>
+              <a:rPr lang="en-US" dirty="0" smtClean="0">
+                <a:cs typeface="Courier New" panose="02070309020205020404" pitchFamily="49" charset="0"/>
+              </a:rPr>
+              <a:t>the </a:t>
             </a:r>
             <a:r>
               <a:rPr lang="en-US" dirty="0" err="1" smtClean="0">
@@ -4920,13 +4940,26 @@
                 <a:latin typeface="Courier New" panose="02070309020205020404" pitchFamily="49" charset="0"/>
                 <a:cs typeface="Courier New" panose="02070309020205020404" pitchFamily="49" charset="0"/>
               </a:rPr>
-              <a:t>::future</a:t>
+              <a:t>::</a:t>
             </a:r>
             <a:r>
               <a:rPr lang="en-US" dirty="0" smtClean="0">
-                <a:cs typeface="Courier New" panose="02070309020205020404" pitchFamily="49" charset="0"/>
-              </a:rPr>
-              <a:t> which will have the return value of the callable object </a:t>
+                <a:latin typeface="Courier New" panose="02070309020205020404" pitchFamily="49" charset="0"/>
+                <a:cs typeface="Courier New" panose="02070309020205020404" pitchFamily="49" charset="0"/>
+              </a:rPr>
+              <a:t>future&lt;T&gt;</a:t>
+            </a:r>
+            <a:r>
+              <a:rPr lang="en-US" dirty="0" smtClean="0">
+                <a:cs typeface="Courier New" panose="02070309020205020404" pitchFamily="49" charset="0"/>
+              </a:rPr>
+              <a:t> </a:t>
+            </a:r>
+            <a:r>
+              <a:rPr lang="en-US" dirty="0" smtClean="0">
+                <a:cs typeface="Courier New" panose="02070309020205020404" pitchFamily="49" charset="0"/>
+              </a:rPr>
+              <a:t>which will have the return value of the callable object </a:t>
             </a:r>
             <a:r>
               <a:rPr lang="en-US" dirty="0" smtClean="0">
@@ -4969,10 +5002,1205 @@
           </a:p>
         </p:txBody>
       </p:sp>
+      <p:sp>
+        <p:nvSpPr>
+          <p:cNvPr id="5" name="Footer Placeholder 4"/>
+          <p:cNvSpPr>
+            <a:spLocks noGrp="1"/>
+          </p:cNvSpPr>
+          <p:nvPr>
+            <p:ph type="ftr" sz="quarter" idx="11"/>
+          </p:nvPr>
+        </p:nvSpPr>
+        <p:spPr/>
+        <p:txBody>
+          <a:bodyPr/>
+          <a:lstStyle/>
+          <a:p>
+            <a:r>
+              <a:rPr lang="en-US" smtClean="0"/>
+              <a:t>Source: Williams, Chapter 4</a:t>
+            </a:r>
+            <a:endParaRPr lang="en-US"/>
+          </a:p>
+        </p:txBody>
+      </p:sp>
     </p:spTree>
     <p:extLst>
       <p:ext uri="{BB962C8B-B14F-4D97-AF65-F5344CB8AC3E}">
         <p14:creationId xmlns:p14="http://schemas.microsoft.com/office/powerpoint/2010/main" val="1566791258"/>
+      </p:ext>
+    </p:extLst>
+  </p:cSld>
+  <p:clrMapOvr>
+    <a:masterClrMapping/>
+  </p:clrMapOvr>
+  <p:timing>
+    <p:tnLst>
+      <p:par>
+        <p:cTn id="1" dur="indefinite" restart="never" nodeType="tmRoot"/>
+      </p:par>
+    </p:tnLst>
+  </p:timing>
+</p:sld>
+</file>
+
+<file path=ppt/slides/slide14.xml><?xml version="1.0" encoding="utf-8"?>
+<p:sld xmlns:a="http://schemas.openxmlformats.org/drawingml/2006/main" xmlns:r="http://schemas.openxmlformats.org/officeDocument/2006/relationships" xmlns:p="http://schemas.openxmlformats.org/presentationml/2006/main">
+  <p:cSld>
+    <p:spTree>
+      <p:nvGrpSpPr>
+        <p:cNvPr id="1" name=""/>
+        <p:cNvGrpSpPr/>
+        <p:nvPr/>
+      </p:nvGrpSpPr>
+      <p:grpSpPr>
+        <a:xfrm>
+          <a:off x="0" y="0"/>
+          <a:ext cx="0" cy="0"/>
+          <a:chOff x="0" y="0"/>
+          <a:chExt cx="0" cy="0"/>
+        </a:xfrm>
+      </p:grpSpPr>
+      <p:sp>
+        <p:nvSpPr>
+          <p:cNvPr id="2" name="Title 1"/>
+          <p:cNvSpPr>
+            <a:spLocks noGrp="1"/>
+          </p:cNvSpPr>
+          <p:nvPr>
+            <p:ph type="title"/>
+          </p:nvPr>
+        </p:nvSpPr>
+        <p:spPr/>
+        <p:txBody>
+          <a:bodyPr/>
+          <a:lstStyle/>
+          <a:p>
+            <a:r>
+              <a:rPr lang="en-US" dirty="0" smtClean="0"/>
+              <a:t>Waiting on a future</a:t>
+            </a:r>
+            <a:endParaRPr lang="en-US" dirty="0"/>
+          </a:p>
+        </p:txBody>
+      </p:sp>
+      <p:sp>
+        <p:nvSpPr>
+          <p:cNvPr id="3" name="Content Placeholder 2"/>
+          <p:cNvSpPr>
+            <a:spLocks noGrp="1"/>
+          </p:cNvSpPr>
+          <p:nvPr>
+            <p:ph idx="1"/>
+          </p:nvPr>
+        </p:nvSpPr>
+        <p:spPr/>
+        <p:txBody>
+          <a:bodyPr>
+            <a:normAutofit/>
+          </a:bodyPr>
+          <a:lstStyle/>
+          <a:p>
+            <a:r>
+              <a:rPr lang="en-US" dirty="0" smtClean="0"/>
+              <a:t>A </a:t>
+            </a:r>
+            <a:r>
+              <a:rPr lang="en-US" dirty="0" err="1" smtClean="0">
+                <a:latin typeface="Courier New" panose="02070309020205020404" pitchFamily="49" charset="0"/>
+                <a:cs typeface="Courier New" panose="02070309020205020404" pitchFamily="49" charset="0"/>
+              </a:rPr>
+              <a:t>std</a:t>
+            </a:r>
+            <a:r>
+              <a:rPr lang="en-US" dirty="0" smtClean="0">
+                <a:latin typeface="Courier New" panose="02070309020205020404" pitchFamily="49" charset="0"/>
+                <a:cs typeface="Courier New" panose="02070309020205020404" pitchFamily="49" charset="0"/>
+              </a:rPr>
+              <a:t>::future&lt;T&gt;</a:t>
+            </a:r>
+            <a:r>
+              <a:rPr lang="en-US" dirty="0" smtClean="0"/>
+              <a:t> provides two ways to wait</a:t>
+            </a:r>
+          </a:p>
+          <a:p>
+            <a:pPr marL="800100" lvl="1" indent="-342900"/>
+            <a:r>
+              <a:rPr lang="en-US" dirty="0" smtClean="0"/>
+              <a:t>A call to </a:t>
+            </a:r>
+            <a:r>
+              <a:rPr lang="en-US" dirty="0" smtClean="0">
+                <a:latin typeface="Courier New" panose="02070309020205020404" pitchFamily="49" charset="0"/>
+                <a:cs typeface="Courier New" panose="02070309020205020404" pitchFamily="49" charset="0"/>
+              </a:rPr>
+              <a:t>get</a:t>
+            </a:r>
+            <a:r>
+              <a:rPr lang="en-US" dirty="0" smtClean="0"/>
+              <a:t> waits until the future is ready, then returns the value of type T</a:t>
+            </a:r>
+          </a:p>
+          <a:p>
+            <a:pPr marL="800100" lvl="1" indent="-342900"/>
+            <a:r>
+              <a:rPr lang="en-US" dirty="0" smtClean="0"/>
+              <a:t>A call to </a:t>
+            </a:r>
+            <a:r>
+              <a:rPr lang="en-US" dirty="0" smtClean="0">
+                <a:latin typeface="Courier New" panose="02070309020205020404" pitchFamily="49" charset="0"/>
+                <a:cs typeface="Courier New" panose="02070309020205020404" pitchFamily="49" charset="0"/>
+              </a:rPr>
+              <a:t>wait</a:t>
+            </a:r>
+            <a:r>
+              <a:rPr lang="en-US" dirty="0" smtClean="0"/>
+              <a:t> waits until the future is ready, then returns.</a:t>
+            </a:r>
+          </a:p>
+          <a:p>
+            <a:pPr marL="1485900" lvl="2" indent="-342900"/>
+            <a:r>
+              <a:rPr lang="en-US" dirty="0" smtClean="0">
+                <a:latin typeface="Courier New" panose="02070309020205020404" pitchFamily="49" charset="0"/>
+                <a:cs typeface="Courier New" panose="02070309020205020404" pitchFamily="49" charset="0"/>
+              </a:rPr>
+              <a:t>wait</a:t>
+            </a:r>
+            <a:r>
+              <a:rPr lang="en-US" dirty="0" smtClean="0"/>
+              <a:t> – wait indefinitely</a:t>
+            </a:r>
+          </a:p>
+          <a:p>
+            <a:pPr marL="1485900" lvl="2" indent="-342900"/>
+            <a:r>
+              <a:rPr lang="en-US" dirty="0" err="1" smtClean="0">
+                <a:latin typeface="Courier New" panose="02070309020205020404" pitchFamily="49" charset="0"/>
+                <a:cs typeface="Courier New" panose="02070309020205020404" pitchFamily="49" charset="0"/>
+              </a:rPr>
+              <a:t>wait_for</a:t>
+            </a:r>
+            <a:r>
+              <a:rPr lang="en-US" dirty="0" smtClean="0"/>
+              <a:t> – wait for </a:t>
+            </a:r>
+            <a:r>
+              <a:rPr lang="en-US" i="1" dirty="0" smtClean="0"/>
+              <a:t>at least </a:t>
+            </a:r>
+            <a:r>
+              <a:rPr lang="en-US" dirty="0" smtClean="0"/>
+              <a:t>a given length of time</a:t>
+            </a:r>
+          </a:p>
+          <a:p>
+            <a:pPr marL="1485900" lvl="2" indent="-342900"/>
+            <a:r>
+              <a:rPr lang="en-US" dirty="0" err="1" smtClean="0">
+                <a:latin typeface="Courier New" panose="02070309020205020404" pitchFamily="49" charset="0"/>
+                <a:cs typeface="Courier New" panose="02070309020205020404" pitchFamily="49" charset="0"/>
+              </a:rPr>
+              <a:t>wait_until</a:t>
+            </a:r>
+            <a:r>
+              <a:rPr lang="en-US" dirty="0" smtClean="0"/>
+              <a:t> – wait until </a:t>
+            </a:r>
+            <a:r>
+              <a:rPr lang="en-US" i="1" dirty="0" smtClean="0"/>
+              <a:t>at least </a:t>
+            </a:r>
+            <a:r>
+              <a:rPr lang="en-US" dirty="0" smtClean="0"/>
+              <a:t>a given time has been reached</a:t>
+            </a:r>
+          </a:p>
+          <a:p>
+            <a:pPr marL="342900" indent="-342900"/>
+            <a:r>
+              <a:rPr lang="en-US" dirty="0" smtClean="0"/>
+              <a:t>Notes</a:t>
+            </a:r>
+          </a:p>
+          <a:p>
+            <a:pPr marL="800100" lvl="1" indent="-342900"/>
+            <a:r>
+              <a:rPr lang="en-US" dirty="0" smtClean="0"/>
+              <a:t>Not subject to a spurious wake</a:t>
+            </a:r>
+          </a:p>
+          <a:p>
+            <a:pPr marL="800100" lvl="1" indent="-342900"/>
+            <a:r>
+              <a:rPr lang="en-US" dirty="0" smtClean="0"/>
+              <a:t>The </a:t>
+            </a:r>
+            <a:r>
+              <a:rPr lang="en-US" dirty="0" smtClean="0">
+                <a:latin typeface="Courier New" panose="02070309020205020404" pitchFamily="49" charset="0"/>
+                <a:cs typeface="Courier New" panose="02070309020205020404" pitchFamily="49" charset="0"/>
+              </a:rPr>
+              <a:t>get</a:t>
+            </a:r>
+            <a:r>
+              <a:rPr lang="en-US" dirty="0" smtClean="0"/>
+              <a:t> method may be called after any wait method</a:t>
+            </a:r>
+          </a:p>
+          <a:p>
+            <a:pPr marL="800100" lvl="1" indent="-342900"/>
+            <a:r>
+              <a:rPr lang="en-US" dirty="0" smtClean="0"/>
+              <a:t>The </a:t>
+            </a:r>
+            <a:r>
+              <a:rPr lang="en-US" dirty="0" smtClean="0">
+                <a:latin typeface="Courier New" panose="02070309020205020404" pitchFamily="49" charset="0"/>
+                <a:cs typeface="Courier New" panose="02070309020205020404" pitchFamily="49" charset="0"/>
+              </a:rPr>
+              <a:t>get</a:t>
+            </a:r>
+            <a:r>
+              <a:rPr lang="en-US" dirty="0" smtClean="0"/>
+              <a:t> method may be called only once</a:t>
+            </a:r>
+          </a:p>
+        </p:txBody>
+      </p:sp>
+      <p:sp>
+        <p:nvSpPr>
+          <p:cNvPr id="4" name="Slide Number Placeholder 3"/>
+          <p:cNvSpPr>
+            <a:spLocks noGrp="1"/>
+          </p:cNvSpPr>
+          <p:nvPr>
+            <p:ph type="sldNum" sz="quarter" idx="12"/>
+          </p:nvPr>
+        </p:nvSpPr>
+        <p:spPr/>
+        <p:txBody>
+          <a:bodyPr/>
+          <a:lstStyle/>
+          <a:p>
+            <a:fld id="{6DA12B36-9664-4CB0-8B2E-F4A2F44AE97E}" type="slidenum">
+              <a:rPr lang="en-US" smtClean="0"/>
+              <a:t>14</a:t>
+            </a:fld>
+            <a:endParaRPr lang="en-US"/>
+          </a:p>
+        </p:txBody>
+      </p:sp>
+      <p:sp>
+        <p:nvSpPr>
+          <p:cNvPr id="6" name="Footer Placeholder 5"/>
+          <p:cNvSpPr>
+            <a:spLocks noGrp="1"/>
+          </p:cNvSpPr>
+          <p:nvPr>
+            <p:ph type="ftr" sz="quarter" idx="11"/>
+          </p:nvPr>
+        </p:nvSpPr>
+        <p:spPr/>
+        <p:txBody>
+          <a:bodyPr/>
+          <a:lstStyle/>
+          <a:p>
+            <a:pPr marL="0" lvl="1"/>
+            <a:r>
+              <a:rPr lang="en-US" sz="1000" dirty="0"/>
+              <a:t>Source: </a:t>
+            </a:r>
+            <a:r>
+              <a:rPr lang="en-US" sz="1000" dirty="0" smtClean="0">
+                <a:hlinkClick r:id="rId2"/>
+              </a:rPr>
+              <a:t>cppeference.com</a:t>
+            </a:r>
+            <a:endParaRPr lang="en-US" sz="1000" dirty="0"/>
+          </a:p>
+        </p:txBody>
+      </p:sp>
+    </p:spTree>
+    <p:extLst>
+      <p:ext uri="{BB962C8B-B14F-4D97-AF65-F5344CB8AC3E}">
+        <p14:creationId xmlns:p14="http://schemas.microsoft.com/office/powerpoint/2010/main" val="463568090"/>
+      </p:ext>
+    </p:extLst>
+  </p:cSld>
+  <p:clrMapOvr>
+    <a:masterClrMapping/>
+  </p:clrMapOvr>
+  <p:timing>
+    <p:tnLst>
+      <p:par>
+        <p:cTn id="1" dur="indefinite" restart="never" nodeType="tmRoot"/>
+      </p:par>
+    </p:tnLst>
+  </p:timing>
+</p:sld>
+</file>
+
+<file path=ppt/slides/slide15.xml><?xml version="1.0" encoding="utf-8"?>
+<p:sld xmlns:a="http://schemas.openxmlformats.org/drawingml/2006/main" xmlns:r="http://schemas.openxmlformats.org/officeDocument/2006/relationships" xmlns:p="http://schemas.openxmlformats.org/presentationml/2006/main">
+  <p:cSld>
+    <p:spTree>
+      <p:nvGrpSpPr>
+        <p:cNvPr id="1" name=""/>
+        <p:cNvGrpSpPr/>
+        <p:nvPr/>
+      </p:nvGrpSpPr>
+      <p:grpSpPr>
+        <a:xfrm>
+          <a:off x="0" y="0"/>
+          <a:ext cx="0" cy="0"/>
+          <a:chOff x="0" y="0"/>
+          <a:chExt cx="0" cy="0"/>
+        </a:xfrm>
+      </p:grpSpPr>
+      <p:sp>
+        <p:nvSpPr>
+          <p:cNvPr id="2" name="Title 1"/>
+          <p:cNvSpPr>
+            <a:spLocks noGrp="1"/>
+          </p:cNvSpPr>
+          <p:nvPr>
+            <p:ph type="title"/>
+          </p:nvPr>
+        </p:nvSpPr>
+        <p:spPr/>
+        <p:txBody>
+          <a:bodyPr/>
+          <a:lstStyle/>
+          <a:p>
+            <a:r>
+              <a:rPr lang="en-US" dirty="0" smtClean="0"/>
+              <a:t>How to get a future</a:t>
+            </a:r>
+            <a:endParaRPr lang="en-US" dirty="0"/>
+          </a:p>
+        </p:txBody>
+      </p:sp>
+      <p:sp>
+        <p:nvSpPr>
+          <p:cNvPr id="3" name="Content Placeholder 2"/>
+          <p:cNvSpPr>
+            <a:spLocks noGrp="1"/>
+          </p:cNvSpPr>
+          <p:nvPr>
+            <p:ph idx="1"/>
+          </p:nvPr>
+        </p:nvSpPr>
+        <p:spPr>
+          <a:xfrm>
+            <a:off x="457200" y="1752600"/>
+            <a:ext cx="6172200" cy="4373563"/>
+          </a:xfrm>
+        </p:spPr>
+        <p:txBody>
+          <a:bodyPr/>
+          <a:lstStyle/>
+          <a:p>
+            <a:r>
+              <a:rPr lang="en-US" dirty="0" smtClean="0"/>
+              <a:t>A </a:t>
+            </a:r>
+            <a:r>
+              <a:rPr lang="en-US" dirty="0" err="1" smtClean="0">
+                <a:latin typeface="Courier New" panose="02070309020205020404" pitchFamily="49" charset="0"/>
+                <a:cs typeface="Courier New" panose="02070309020205020404" pitchFamily="49" charset="0"/>
+              </a:rPr>
+              <a:t>std</a:t>
+            </a:r>
+            <a:r>
+              <a:rPr lang="en-US" dirty="0" smtClean="0">
+                <a:latin typeface="Courier New" panose="02070309020205020404" pitchFamily="49" charset="0"/>
+                <a:cs typeface="Courier New" panose="02070309020205020404" pitchFamily="49" charset="0"/>
+              </a:rPr>
+              <a:t>::future&lt;T&gt;</a:t>
+            </a:r>
+            <a:r>
+              <a:rPr lang="en-US" dirty="0" smtClean="0"/>
+              <a:t> can be obtained in three ways.</a:t>
+            </a:r>
+          </a:p>
+          <a:p>
+            <a:pPr marL="800100" lvl="1" indent="-342900"/>
+            <a:r>
+              <a:rPr lang="en-US" dirty="0" smtClean="0"/>
+              <a:t>Return value of the </a:t>
+            </a:r>
+            <a:r>
+              <a:rPr lang="en-US" dirty="0" err="1" smtClean="0">
+                <a:latin typeface="Courier New" panose="02070309020205020404" pitchFamily="49" charset="0"/>
+                <a:cs typeface="Courier New" panose="02070309020205020404" pitchFamily="49" charset="0"/>
+              </a:rPr>
+              <a:t>std</a:t>
+            </a:r>
+            <a:r>
+              <a:rPr lang="en-US" dirty="0" smtClean="0">
+                <a:latin typeface="Courier New" panose="02070309020205020404" pitchFamily="49" charset="0"/>
+                <a:cs typeface="Courier New" panose="02070309020205020404" pitchFamily="49" charset="0"/>
+              </a:rPr>
+              <a:t>::</a:t>
+            </a:r>
+            <a:r>
+              <a:rPr lang="en-US" dirty="0" err="1" smtClean="0">
+                <a:latin typeface="Courier New" panose="02070309020205020404" pitchFamily="49" charset="0"/>
+                <a:cs typeface="Courier New" panose="02070309020205020404" pitchFamily="49" charset="0"/>
+              </a:rPr>
+              <a:t>async</a:t>
+            </a:r>
+            <a:r>
+              <a:rPr lang="en-US" dirty="0" smtClean="0">
+                <a:cs typeface="Courier New" panose="02070309020205020404" pitchFamily="49" charset="0"/>
+              </a:rPr>
+              <a:t> method.</a:t>
+            </a:r>
+          </a:p>
+          <a:p>
+            <a:pPr marL="800100" lvl="1" indent="-342900"/>
+            <a:r>
+              <a:rPr lang="en-US" dirty="0" smtClean="0"/>
+              <a:t>From the </a:t>
+            </a:r>
+            <a:r>
+              <a:rPr lang="en-US" dirty="0" err="1" smtClean="0">
+                <a:latin typeface="Courier New" panose="02070309020205020404" pitchFamily="49" charset="0"/>
+                <a:cs typeface="Courier New" panose="02070309020205020404" pitchFamily="49" charset="0"/>
+              </a:rPr>
+              <a:t>packaged_task</a:t>
+            </a:r>
+            <a:r>
+              <a:rPr lang="en-US" dirty="0" smtClean="0">
+                <a:latin typeface="Courier New" panose="02070309020205020404" pitchFamily="49" charset="0"/>
+                <a:cs typeface="Courier New" panose="02070309020205020404" pitchFamily="49" charset="0"/>
+              </a:rPr>
+              <a:t>&lt;T&gt; </a:t>
+            </a:r>
+            <a:r>
+              <a:rPr lang="en-US" dirty="0" err="1" smtClean="0">
+                <a:latin typeface="Courier New" panose="02070309020205020404" pitchFamily="49" charset="0"/>
+                <a:cs typeface="Courier New" panose="02070309020205020404" pitchFamily="49" charset="0"/>
+              </a:rPr>
+              <a:t>get_future</a:t>
+            </a:r>
+            <a:r>
+              <a:rPr lang="en-US" dirty="0" smtClean="0">
+                <a:latin typeface="Courier New" panose="02070309020205020404" pitchFamily="49" charset="0"/>
+                <a:cs typeface="Courier New" panose="02070309020205020404" pitchFamily="49" charset="0"/>
+              </a:rPr>
+              <a:t> </a:t>
+            </a:r>
+            <a:r>
+              <a:rPr lang="en-US" dirty="0" smtClean="0"/>
+              <a:t>method.</a:t>
+            </a:r>
+          </a:p>
+          <a:p>
+            <a:pPr marL="800100" lvl="1" indent="-342900"/>
+            <a:r>
+              <a:rPr lang="en-US" dirty="0" smtClean="0"/>
+              <a:t>From the </a:t>
+            </a:r>
+            <a:r>
+              <a:rPr lang="en-US" dirty="0" err="1" smtClean="0">
+                <a:latin typeface="Courier New" panose="02070309020205020404" pitchFamily="49" charset="0"/>
+                <a:cs typeface="Courier New" panose="02070309020205020404" pitchFamily="49" charset="0"/>
+              </a:rPr>
+              <a:t>std</a:t>
+            </a:r>
+            <a:r>
+              <a:rPr lang="en-US" dirty="0" smtClean="0">
+                <a:latin typeface="Courier New" panose="02070309020205020404" pitchFamily="49" charset="0"/>
+                <a:cs typeface="Courier New" panose="02070309020205020404" pitchFamily="49" charset="0"/>
+              </a:rPr>
+              <a:t>::promise&lt;T&gt; </a:t>
+            </a:r>
+            <a:r>
+              <a:rPr lang="en-US" dirty="0" err="1" smtClean="0">
+                <a:latin typeface="Courier New" panose="02070309020205020404" pitchFamily="49" charset="0"/>
+                <a:cs typeface="Courier New" panose="02070309020205020404" pitchFamily="49" charset="0"/>
+              </a:rPr>
+              <a:t>get_future</a:t>
+            </a:r>
+            <a:r>
+              <a:rPr lang="en-US" dirty="0" smtClean="0">
+                <a:latin typeface="Courier New" panose="02070309020205020404" pitchFamily="49" charset="0"/>
+                <a:cs typeface="Courier New" panose="02070309020205020404" pitchFamily="49" charset="0"/>
+              </a:rPr>
+              <a:t> </a:t>
+            </a:r>
+            <a:r>
+              <a:rPr lang="en-US" dirty="0" smtClean="0"/>
+              <a:t>method.</a:t>
+            </a:r>
+          </a:p>
+          <a:p>
+            <a:pPr marL="342900" indent="-342900"/>
+            <a:endParaRPr lang="en-US" dirty="0"/>
+          </a:p>
+          <a:p>
+            <a:pPr marL="342900" indent="-342900"/>
+            <a:r>
+              <a:rPr lang="en-US" dirty="0" smtClean="0"/>
+              <a:t>A </a:t>
+            </a:r>
+            <a:r>
+              <a:rPr lang="en-US" dirty="0" err="1" smtClean="0">
+                <a:latin typeface="Courier New" panose="02070309020205020404" pitchFamily="49" charset="0"/>
+                <a:cs typeface="Courier New" panose="02070309020205020404" pitchFamily="49" charset="0"/>
+              </a:rPr>
+              <a:t>std</a:t>
+            </a:r>
+            <a:r>
+              <a:rPr lang="en-US" dirty="0" smtClean="0">
+                <a:latin typeface="Courier New" panose="02070309020205020404" pitchFamily="49" charset="0"/>
+                <a:cs typeface="Courier New" panose="02070309020205020404" pitchFamily="49" charset="0"/>
+              </a:rPr>
+              <a:t>::promise&lt;T&gt;</a:t>
+            </a:r>
+            <a:r>
+              <a:rPr lang="en-US" dirty="0" smtClean="0"/>
+              <a:t> may be used to implement</a:t>
+            </a:r>
+          </a:p>
+          <a:p>
+            <a:pPr marL="800100" lvl="1" indent="-342900"/>
+            <a:r>
+              <a:rPr lang="en-US" dirty="0" smtClean="0"/>
+              <a:t>The </a:t>
+            </a:r>
+            <a:r>
+              <a:rPr lang="en-US" dirty="0" err="1" smtClean="0">
+                <a:latin typeface="Courier New" panose="02070309020205020404" pitchFamily="49" charset="0"/>
+                <a:cs typeface="Courier New" panose="02070309020205020404" pitchFamily="49" charset="0"/>
+              </a:rPr>
+              <a:t>std</a:t>
+            </a:r>
+            <a:r>
+              <a:rPr lang="en-US" dirty="0" smtClean="0">
+                <a:latin typeface="Courier New" panose="02070309020205020404" pitchFamily="49" charset="0"/>
+                <a:cs typeface="Courier New" panose="02070309020205020404" pitchFamily="49" charset="0"/>
+              </a:rPr>
+              <a:t>::</a:t>
+            </a:r>
+            <a:r>
+              <a:rPr lang="en-US" dirty="0" err="1" smtClean="0">
+                <a:latin typeface="Courier New" panose="02070309020205020404" pitchFamily="49" charset="0"/>
+                <a:cs typeface="Courier New" panose="02070309020205020404" pitchFamily="49" charset="0"/>
+              </a:rPr>
+              <a:t>async</a:t>
+            </a:r>
+            <a:r>
+              <a:rPr lang="en-US" dirty="0" smtClean="0"/>
+              <a:t> method</a:t>
+            </a:r>
+          </a:p>
+          <a:p>
+            <a:pPr marL="800100" lvl="1" indent="-342900"/>
+            <a:r>
+              <a:rPr lang="en-US" dirty="0" smtClean="0"/>
+              <a:t>A </a:t>
+            </a:r>
+            <a:r>
+              <a:rPr lang="en-US" dirty="0" err="1" smtClean="0">
+                <a:latin typeface="Courier New" panose="02070309020205020404" pitchFamily="49" charset="0"/>
+                <a:cs typeface="Courier New" panose="02070309020205020404" pitchFamily="49" charset="0"/>
+              </a:rPr>
+              <a:t>std</a:t>
+            </a:r>
+            <a:r>
+              <a:rPr lang="en-US" dirty="0" smtClean="0">
+                <a:latin typeface="Courier New" panose="02070309020205020404" pitchFamily="49" charset="0"/>
+                <a:cs typeface="Courier New" panose="02070309020205020404" pitchFamily="49" charset="0"/>
+              </a:rPr>
+              <a:t>::</a:t>
+            </a:r>
+            <a:r>
+              <a:rPr lang="en-US" dirty="0" err="1" smtClean="0">
+                <a:latin typeface="Courier New" panose="02070309020205020404" pitchFamily="49" charset="0"/>
+                <a:cs typeface="Courier New" panose="02070309020205020404" pitchFamily="49" charset="0"/>
+              </a:rPr>
+              <a:t>packaged_task</a:t>
+            </a:r>
+            <a:r>
+              <a:rPr lang="en-US" dirty="0" smtClean="0">
+                <a:latin typeface="Courier New" panose="02070309020205020404" pitchFamily="49" charset="0"/>
+                <a:cs typeface="Courier New" panose="02070309020205020404" pitchFamily="49" charset="0"/>
+              </a:rPr>
+              <a:t>&lt;T&gt;</a:t>
+            </a:r>
+            <a:r>
+              <a:rPr lang="en-US" dirty="0" smtClean="0"/>
+              <a:t> class</a:t>
+            </a:r>
+          </a:p>
+        </p:txBody>
+      </p:sp>
+      <p:sp>
+        <p:nvSpPr>
+          <p:cNvPr id="4" name="Slide Number Placeholder 3"/>
+          <p:cNvSpPr>
+            <a:spLocks noGrp="1"/>
+          </p:cNvSpPr>
+          <p:nvPr>
+            <p:ph type="sldNum" sz="quarter" idx="12"/>
+          </p:nvPr>
+        </p:nvSpPr>
+        <p:spPr/>
+        <p:txBody>
+          <a:bodyPr/>
+          <a:lstStyle/>
+          <a:p>
+            <a:fld id="{6DA12B36-9664-4CB0-8B2E-F4A2F44AE97E}" type="slidenum">
+              <a:rPr lang="en-US" smtClean="0"/>
+              <a:t>15</a:t>
+            </a:fld>
+            <a:endParaRPr lang="en-US"/>
+          </a:p>
+        </p:txBody>
+      </p:sp>
+      <p:sp>
+        <p:nvSpPr>
+          <p:cNvPr id="5" name="Down Arrow 4"/>
+          <p:cNvSpPr/>
+          <p:nvPr/>
+        </p:nvSpPr>
+        <p:spPr>
+          <a:xfrm>
+            <a:off x="6629400" y="2362200"/>
+            <a:ext cx="685800" cy="1600200"/>
+          </a:xfrm>
+          <a:prstGeom prst="downArrow">
+            <a:avLst/>
+          </a:prstGeom>
+        </p:spPr>
+        <p:style>
+          <a:lnRef idx="2">
+            <a:schemeClr val="accent1">
+              <a:shade val="50000"/>
+            </a:schemeClr>
+          </a:lnRef>
+          <a:fillRef idx="1">
+            <a:schemeClr val="accent1"/>
+          </a:fillRef>
+          <a:effectRef idx="0">
+            <a:schemeClr val="accent1"/>
+          </a:effectRef>
+          <a:fontRef idx="minor">
+            <a:schemeClr val="lt1"/>
+          </a:fontRef>
+        </p:style>
+        <p:txBody>
+          <a:bodyPr rtlCol="0" anchor="ctr"/>
+          <a:lstStyle/>
+          <a:p>
+            <a:pPr algn="ctr"/>
+            <a:endParaRPr lang="en-US"/>
+          </a:p>
+        </p:txBody>
+      </p:sp>
+      <p:sp>
+        <p:nvSpPr>
+          <p:cNvPr id="6" name="TextBox 5"/>
+          <p:cNvSpPr txBox="1"/>
+          <p:nvPr/>
+        </p:nvSpPr>
+        <p:spPr>
+          <a:xfrm>
+            <a:off x="6400800" y="1828800"/>
+            <a:ext cx="1066800" cy="381000"/>
+          </a:xfrm>
+          <a:prstGeom prst="rect">
+            <a:avLst/>
+          </a:prstGeom>
+          <a:noFill/>
+        </p:spPr>
+        <p:txBody>
+          <a:bodyPr wrap="square" rtlCol="0">
+            <a:spAutoFit/>
+          </a:bodyPr>
+          <a:lstStyle/>
+          <a:p>
+            <a:pPr algn="ctr"/>
+            <a:r>
+              <a:rPr lang="en-US" dirty="0" smtClean="0"/>
+              <a:t>Higher</a:t>
+            </a:r>
+            <a:endParaRPr lang="en-US" dirty="0"/>
+          </a:p>
+        </p:txBody>
+      </p:sp>
+      <p:sp>
+        <p:nvSpPr>
+          <p:cNvPr id="8" name="TextBox 7"/>
+          <p:cNvSpPr txBox="1"/>
+          <p:nvPr/>
+        </p:nvSpPr>
+        <p:spPr>
+          <a:xfrm>
+            <a:off x="6477000" y="4114800"/>
+            <a:ext cx="1066800" cy="381000"/>
+          </a:xfrm>
+          <a:prstGeom prst="rect">
+            <a:avLst/>
+          </a:prstGeom>
+          <a:noFill/>
+        </p:spPr>
+        <p:txBody>
+          <a:bodyPr wrap="square" rtlCol="0">
+            <a:spAutoFit/>
+          </a:bodyPr>
+          <a:lstStyle/>
+          <a:p>
+            <a:pPr algn="ctr"/>
+            <a:r>
+              <a:rPr lang="en-US" dirty="0" smtClean="0"/>
+              <a:t>Lower</a:t>
+            </a:r>
+            <a:endParaRPr lang="en-US" dirty="0"/>
+          </a:p>
+        </p:txBody>
+      </p:sp>
+      <p:sp>
+        <p:nvSpPr>
+          <p:cNvPr id="9" name="TextBox 8"/>
+          <p:cNvSpPr txBox="1"/>
+          <p:nvPr/>
+        </p:nvSpPr>
+        <p:spPr>
+          <a:xfrm>
+            <a:off x="7315200" y="2706469"/>
+            <a:ext cx="1447800" cy="646331"/>
+          </a:xfrm>
+          <a:prstGeom prst="rect">
+            <a:avLst/>
+          </a:prstGeom>
+          <a:noFill/>
+        </p:spPr>
+        <p:txBody>
+          <a:bodyPr wrap="square" rtlCol="0">
+            <a:spAutoFit/>
+          </a:bodyPr>
+          <a:lstStyle/>
+          <a:p>
+            <a:pPr algn="ctr"/>
+            <a:r>
+              <a:rPr lang="en-US" dirty="0" smtClean="0"/>
+              <a:t>Level of abstraction</a:t>
+            </a:r>
+            <a:endParaRPr lang="en-US" dirty="0"/>
+          </a:p>
+        </p:txBody>
+      </p:sp>
+      <p:sp>
+        <p:nvSpPr>
+          <p:cNvPr id="10" name="Footer Placeholder 9"/>
+          <p:cNvSpPr>
+            <a:spLocks noGrp="1"/>
+          </p:cNvSpPr>
+          <p:nvPr>
+            <p:ph type="ftr" sz="quarter" idx="11"/>
+          </p:nvPr>
+        </p:nvSpPr>
+        <p:spPr/>
+        <p:txBody>
+          <a:bodyPr/>
+          <a:lstStyle/>
+          <a:p>
+            <a:r>
+              <a:rPr lang="en-US" smtClean="0"/>
+              <a:t>Source: </a:t>
+            </a:r>
+            <a:r>
+              <a:rPr lang="en-US" smtClean="0">
+                <a:hlinkClick r:id="rId2"/>
+              </a:rPr>
+              <a:t>Stack Overflow</a:t>
+            </a:r>
+            <a:endParaRPr lang="en-US" smtClean="0"/>
+          </a:p>
+          <a:p>
+            <a:endParaRPr lang="en-US" dirty="0"/>
+          </a:p>
+        </p:txBody>
+      </p:sp>
+    </p:spTree>
+    <p:extLst>
+      <p:ext uri="{BB962C8B-B14F-4D97-AF65-F5344CB8AC3E}">
+        <p14:creationId xmlns:p14="http://schemas.microsoft.com/office/powerpoint/2010/main" val="2529041614"/>
+      </p:ext>
+    </p:extLst>
+  </p:cSld>
+  <p:clrMapOvr>
+    <a:masterClrMapping/>
+  </p:clrMapOvr>
+  <p:timing>
+    <p:tnLst>
+      <p:par>
+        <p:cTn id="1" dur="indefinite" restart="never" nodeType="tmRoot">
+          <p:childTnLst>
+            <p:seq concurrent="1" nextAc="seek">
+              <p:cTn id="2" dur="indefinite" nodeType="mainSeq">
+                <p:childTnLst>
+                  <p:par>
+                    <p:cTn id="3" fill="hold">
+                      <p:stCondLst>
+                        <p:cond delay="indefinite"/>
+                      </p:stCondLst>
+                      <p:childTnLst>
+                        <p:par>
+                          <p:cTn id="4" fill="hold">
+                            <p:stCondLst>
+                              <p:cond delay="0"/>
+                            </p:stCondLst>
+                            <p:childTnLst>
+                              <p:par>
+                                <p:cTn id="5" presetID="1" presetClass="entr" presetSubtype="0" fill="hold" grpId="0" nodeType="clickEffect">
+                                  <p:stCondLst>
+                                    <p:cond delay="0"/>
+                                  </p:stCondLst>
+                                  <p:childTnLst>
+                                    <p:set>
+                                      <p:cBhvr>
+                                        <p:cTn id="6" dur="1" fill="hold">
+                                          <p:stCondLst>
+                                            <p:cond delay="0"/>
+                                          </p:stCondLst>
+                                        </p:cTn>
+                                        <p:tgtEl>
+                                          <p:spTgt spid="6"/>
+                                        </p:tgtEl>
+                                        <p:attrNameLst>
+                                          <p:attrName>style.visibility</p:attrName>
+                                        </p:attrNameLst>
+                                      </p:cBhvr>
+                                      <p:to>
+                                        <p:strVal val="visible"/>
+                                      </p:to>
+                                    </p:set>
+                                  </p:childTnLst>
+                                </p:cTn>
+                              </p:par>
+                              <p:par>
+                                <p:cTn id="7" presetID="1" presetClass="entr" presetSubtype="0" fill="hold" grpId="0" nodeType="withEffect">
+                                  <p:stCondLst>
+                                    <p:cond delay="0"/>
+                                  </p:stCondLst>
+                                  <p:childTnLst>
+                                    <p:set>
+                                      <p:cBhvr>
+                                        <p:cTn id="8" dur="1" fill="hold">
+                                          <p:stCondLst>
+                                            <p:cond delay="0"/>
+                                          </p:stCondLst>
+                                        </p:cTn>
+                                        <p:tgtEl>
+                                          <p:spTgt spid="5"/>
+                                        </p:tgtEl>
+                                        <p:attrNameLst>
+                                          <p:attrName>style.visibility</p:attrName>
+                                        </p:attrNameLst>
+                                      </p:cBhvr>
+                                      <p:to>
+                                        <p:strVal val="visible"/>
+                                      </p:to>
+                                    </p:set>
+                                  </p:childTnLst>
+                                </p:cTn>
+                              </p:par>
+                              <p:par>
+                                <p:cTn id="9" presetID="1" presetClass="entr" presetSubtype="0" fill="hold" grpId="0" nodeType="withEffect">
+                                  <p:stCondLst>
+                                    <p:cond delay="0"/>
+                                  </p:stCondLst>
+                                  <p:childTnLst>
+                                    <p:set>
+                                      <p:cBhvr>
+                                        <p:cTn id="10" dur="1" fill="hold">
+                                          <p:stCondLst>
+                                            <p:cond delay="0"/>
+                                          </p:stCondLst>
+                                        </p:cTn>
+                                        <p:tgtEl>
+                                          <p:spTgt spid="8"/>
+                                        </p:tgtEl>
+                                        <p:attrNameLst>
+                                          <p:attrName>style.visibility</p:attrName>
+                                        </p:attrNameLst>
+                                      </p:cBhvr>
+                                      <p:to>
+                                        <p:strVal val="visible"/>
+                                      </p:to>
+                                    </p:set>
+                                  </p:childTnLst>
+                                </p:cTn>
+                              </p:par>
+                              <p:par>
+                                <p:cTn id="11" presetID="1" presetClass="entr" presetSubtype="0" fill="hold" grpId="0" nodeType="withEffect">
+                                  <p:stCondLst>
+                                    <p:cond delay="0"/>
+                                  </p:stCondLst>
+                                  <p:childTnLst>
+                                    <p:set>
+                                      <p:cBhvr>
+                                        <p:cTn id="12" dur="1" fill="hold">
+                                          <p:stCondLst>
+                                            <p:cond delay="0"/>
+                                          </p:stCondLst>
+                                        </p:cTn>
+                                        <p:tgtEl>
+                                          <p:spTgt spid="9"/>
+                                        </p:tgtEl>
+                                        <p:attrNameLst>
+                                          <p:attrName>style.visibility</p:attrName>
+                                        </p:attrNameLst>
+                                      </p:cBhvr>
+                                      <p:to>
+                                        <p:strVal val="visible"/>
+                                      </p:to>
+                                    </p:set>
+                                  </p:childTnLst>
+                                </p:cTn>
+                              </p:par>
+                            </p:childTnLst>
+                          </p:cTn>
+                        </p:par>
+                      </p:childTnLst>
+                    </p:cTn>
+                  </p:par>
+                  <p:par>
+                    <p:cTn id="13" fill="hold">
+                      <p:stCondLst>
+                        <p:cond delay="indefinite"/>
+                      </p:stCondLst>
+                      <p:childTnLst>
+                        <p:par>
+                          <p:cTn id="14" fill="hold">
+                            <p:stCondLst>
+                              <p:cond delay="0"/>
+                            </p:stCondLst>
+                            <p:childTnLst>
+                              <p:par>
+                                <p:cTn id="15" presetID="1" presetClass="entr" presetSubtype="0" fill="hold" nodeType="clickEffect">
+                                  <p:stCondLst>
+                                    <p:cond delay="0"/>
+                                  </p:stCondLst>
+                                  <p:childTnLst>
+                                    <p:set>
+                                      <p:cBhvr>
+                                        <p:cTn id="16" dur="1" fill="hold">
+                                          <p:stCondLst>
+                                            <p:cond delay="0"/>
+                                          </p:stCondLst>
+                                        </p:cTn>
+                                        <p:tgtEl>
+                                          <p:spTgt spid="3">
+                                            <p:txEl>
+                                              <p:pRg st="5" end="5"/>
+                                            </p:txEl>
+                                          </p:spTgt>
+                                        </p:tgtEl>
+                                        <p:attrNameLst>
+                                          <p:attrName>style.visibility</p:attrName>
+                                        </p:attrNameLst>
+                                      </p:cBhvr>
+                                      <p:to>
+                                        <p:strVal val="visible"/>
+                                      </p:to>
+                                    </p:set>
+                                  </p:childTnLst>
+                                </p:cTn>
+                              </p:par>
+                              <p:par>
+                                <p:cTn id="17" presetID="1" presetClass="entr" presetSubtype="0" fill="hold" nodeType="withEffect">
+                                  <p:stCondLst>
+                                    <p:cond delay="0"/>
+                                  </p:stCondLst>
+                                  <p:childTnLst>
+                                    <p:set>
+                                      <p:cBhvr>
+                                        <p:cTn id="18" dur="1" fill="hold">
+                                          <p:stCondLst>
+                                            <p:cond delay="0"/>
+                                          </p:stCondLst>
+                                        </p:cTn>
+                                        <p:tgtEl>
+                                          <p:spTgt spid="3">
+                                            <p:txEl>
+                                              <p:pRg st="6" end="6"/>
+                                            </p:txEl>
+                                          </p:spTgt>
+                                        </p:tgtEl>
+                                        <p:attrNameLst>
+                                          <p:attrName>style.visibility</p:attrName>
+                                        </p:attrNameLst>
+                                      </p:cBhvr>
+                                      <p:to>
+                                        <p:strVal val="visible"/>
+                                      </p:to>
+                                    </p:set>
+                                  </p:childTnLst>
+                                </p:cTn>
+                              </p:par>
+                              <p:par>
+                                <p:cTn id="19" presetID="1" presetClass="entr" presetSubtype="0" fill="hold" nodeType="withEffect">
+                                  <p:stCondLst>
+                                    <p:cond delay="0"/>
+                                  </p:stCondLst>
+                                  <p:childTnLst>
+                                    <p:set>
+                                      <p:cBhvr>
+                                        <p:cTn id="20" dur="1" fill="hold">
+                                          <p:stCondLst>
+                                            <p:cond delay="0"/>
+                                          </p:stCondLst>
+                                        </p:cTn>
+                                        <p:tgtEl>
+                                          <p:spTgt spid="3">
+                                            <p:txEl>
+                                              <p:pRg st="7" end="7"/>
+                                            </p:txEl>
+                                          </p:spTgt>
+                                        </p:tgtEl>
+                                        <p:attrNameLst>
+                                          <p:attrName>style.visibility</p:attrName>
+                                        </p:attrNameLst>
+                                      </p:cBhvr>
+                                      <p:to>
+                                        <p:strVal val="visible"/>
+                                      </p:to>
+                                    </p:set>
+                                  </p:childTnLst>
+                                </p:cTn>
+                              </p:par>
+                            </p:childTnLst>
+                          </p:cTn>
+                        </p:par>
+                      </p:childTnLst>
+                    </p:cTn>
+                  </p:par>
+                </p:childTnLst>
+              </p:cTn>
+              <p:prevCondLst>
+                <p:cond evt="onPrev" delay="0">
+                  <p:tgtEl>
+                    <p:sldTgt/>
+                  </p:tgtEl>
+                </p:cond>
+              </p:prevCondLst>
+              <p:nextCondLst>
+                <p:cond evt="onNext" delay="0">
+                  <p:tgtEl>
+                    <p:sldTgt/>
+                  </p:tgtEl>
+                </p:cond>
+              </p:nextCondLst>
+            </p:seq>
+          </p:childTnLst>
+        </p:cTn>
+      </p:par>
+    </p:tnLst>
+    <p:bldLst>
+      <p:bldP spid="5" grpId="0" animBg="1"/>
+      <p:bldP spid="6" grpId="0"/>
+      <p:bldP spid="8" grpId="0"/>
+      <p:bldP spid="9" grpId="0"/>
+    </p:bldLst>
+  </p:timing>
+</p:sld>
+</file>
+
+<file path=ppt/slides/slide16.xml><?xml version="1.0" encoding="utf-8"?>
+<p:sld xmlns:a="http://schemas.openxmlformats.org/drawingml/2006/main" xmlns:r="http://schemas.openxmlformats.org/officeDocument/2006/relationships" xmlns:p="http://schemas.openxmlformats.org/presentationml/2006/main">
+  <p:cSld>
+    <p:spTree>
+      <p:nvGrpSpPr>
+        <p:cNvPr id="1" name=""/>
+        <p:cNvGrpSpPr/>
+        <p:nvPr/>
+      </p:nvGrpSpPr>
+      <p:grpSpPr>
+        <a:xfrm>
+          <a:off x="0" y="0"/>
+          <a:ext cx="0" cy="0"/>
+          <a:chOff x="0" y="0"/>
+          <a:chExt cx="0" cy="0"/>
+        </a:xfrm>
+      </p:grpSpPr>
+      <p:sp>
+        <p:nvSpPr>
+          <p:cNvPr id="2" name="Title 1"/>
+          <p:cNvSpPr>
+            <a:spLocks noGrp="1"/>
+          </p:cNvSpPr>
+          <p:nvPr>
+            <p:ph type="title"/>
+          </p:nvPr>
+        </p:nvSpPr>
+        <p:spPr/>
+        <p:txBody>
+          <a:bodyPr/>
+          <a:lstStyle/>
+          <a:p>
+            <a:r>
+              <a:rPr lang="en-US" dirty="0" smtClean="0"/>
+              <a:t>Exceptions with futures</a:t>
+            </a:r>
+            <a:endParaRPr lang="en-US" dirty="0"/>
+          </a:p>
+        </p:txBody>
+      </p:sp>
+      <p:sp>
+        <p:nvSpPr>
+          <p:cNvPr id="3" name="Content Placeholder 2"/>
+          <p:cNvSpPr>
+            <a:spLocks noGrp="1"/>
+          </p:cNvSpPr>
+          <p:nvPr>
+            <p:ph idx="1"/>
+          </p:nvPr>
+        </p:nvSpPr>
+        <p:spPr/>
+        <p:txBody>
+          <a:bodyPr/>
+          <a:lstStyle/>
+          <a:p>
+            <a:endParaRPr lang="en-US"/>
+          </a:p>
+        </p:txBody>
+      </p:sp>
+      <p:sp>
+        <p:nvSpPr>
+          <p:cNvPr id="4" name="Slide Number Placeholder 3"/>
+          <p:cNvSpPr>
+            <a:spLocks noGrp="1"/>
+          </p:cNvSpPr>
+          <p:nvPr>
+            <p:ph type="sldNum" sz="quarter" idx="12"/>
+          </p:nvPr>
+        </p:nvSpPr>
+        <p:spPr/>
+        <p:txBody>
+          <a:bodyPr/>
+          <a:lstStyle/>
+          <a:p>
+            <a:fld id="{6DA12B36-9664-4CB0-8B2E-F4A2F44AE97E}" type="slidenum">
+              <a:rPr lang="en-US" smtClean="0"/>
+              <a:t>16</a:t>
+            </a:fld>
+            <a:endParaRPr lang="en-US"/>
+          </a:p>
+        </p:txBody>
+      </p:sp>
+    </p:spTree>
+    <p:extLst>
+      <p:ext uri="{BB962C8B-B14F-4D97-AF65-F5344CB8AC3E}">
+        <p14:creationId xmlns:p14="http://schemas.microsoft.com/office/powerpoint/2010/main" val="1775450155"/>
       </p:ext>
     </p:extLst>
   </p:cSld>
@@ -5141,6 +6369,13 @@
   <p:clrMapOvr>
     <a:masterClrMapping/>
   </p:clrMapOvr>
+  <p:timing>
+    <p:tnLst>
+      <p:par>
+        <p:cTn id="1" dur="indefinite" restart="never" nodeType="tmRoot"/>
+      </p:par>
+    </p:tnLst>
+  </p:timing>
 </p:sld>
 </file>
 
@@ -5291,6 +6526,29 @@
               <a:rPr lang="en-US" smtClean="0"/>
               <a:t>3</a:t>
             </a:fld>
+            <a:endParaRPr lang="en-US"/>
+          </a:p>
+        </p:txBody>
+      </p:sp>
+      <p:sp>
+        <p:nvSpPr>
+          <p:cNvPr id="5" name="Footer Placeholder 4"/>
+          <p:cNvSpPr>
+            <a:spLocks noGrp="1"/>
+          </p:cNvSpPr>
+          <p:nvPr>
+            <p:ph type="ftr" sz="quarter" idx="11"/>
+          </p:nvPr>
+        </p:nvSpPr>
+        <p:spPr/>
+        <p:txBody>
+          <a:bodyPr/>
+          <a:lstStyle/>
+          <a:p>
+            <a:r>
+              <a:rPr lang="en-US" smtClean="0"/>
+              <a:t>Source: Williams, Chapter 4</a:t>
+            </a:r>
             <a:endParaRPr lang="en-US"/>
           </a:p>
         </p:txBody>
@@ -7468,6 +8726,29 @@
           </a:p>
         </p:txBody>
       </p:sp>
+      <p:sp>
+        <p:nvSpPr>
+          <p:cNvPr id="5" name="Footer Placeholder 4"/>
+          <p:cNvSpPr>
+            <a:spLocks noGrp="1"/>
+          </p:cNvSpPr>
+          <p:nvPr>
+            <p:ph type="ftr" sz="quarter" idx="11"/>
+          </p:nvPr>
+        </p:nvSpPr>
+        <p:spPr/>
+        <p:txBody>
+          <a:bodyPr/>
+          <a:lstStyle/>
+          <a:p>
+            <a:r>
+              <a:rPr lang="en-US" smtClean="0"/>
+              <a:t>Source: Williams, Chapter 4</a:t>
+            </a:r>
+            <a:endParaRPr lang="en-US"/>
+          </a:p>
+        </p:txBody>
+      </p:sp>
     </p:spTree>
     <p:extLst>
       <p:ext uri="{BB962C8B-B14F-4D97-AF65-F5344CB8AC3E}">
@@ -8592,7 +9873,7 @@
             <p:ph idx="1"/>
             <p:extLst>
               <p:ext uri="{D42A27DB-BD31-4B8C-83A1-F6EECF244321}">
-                <p14:modId xmlns:p14="http://schemas.microsoft.com/office/powerpoint/2010/main" val="3339236033"/>
+                <p14:modId xmlns:p14="http://schemas.microsoft.com/office/powerpoint/2010/main" val="2954555268"/>
               </p:ext>
             </p:extLst>
           </p:nvPr>
@@ -8768,7 +10049,11 @@
                     <a:p>
                       <a:r>
                         <a:rPr lang="en-US" dirty="0" smtClean="0"/>
-                        <a:t>No</a:t>
+                        <a:t>Did</a:t>
+                      </a:r>
+                      <a:r>
+                        <a:rPr lang="en-US" baseline="0" dirty="0" smtClean="0"/>
+                        <a:t> not exit</a:t>
                       </a:r>
                       <a:endParaRPr lang="en-US" dirty="0"/>
                     </a:p>

</xml_diff>

<commit_message>
Correct a few typos.
</commit_message>
<xml_diff>
--- a/Lectures/Asynchronous Operations/Asynchronous Operations.pptx
+++ b/Lectures/Asynchronous Operations/Asynchronous Operations.pptx
@@ -207,7 +207,7 @@
           <a:p>
             <a:fld id="{DBE0ECA1-3FBF-48AE-AD2A-4439AE745E19}" type="datetimeFigureOut">
               <a:rPr lang="en-US" smtClean="0"/>
-              <a:t>11/19/2013</a:t>
+              <a:t>11/20/2013</a:t>
             </a:fld>
             <a:endParaRPr lang="en-US"/>
           </a:p>
@@ -668,7 +668,7 @@
           <a:p>
             <a:fld id="{9769DED8-28D4-45B9-A00F-7CFE9335FEA6}" type="datetime1">
               <a:rPr lang="en-US" smtClean="0"/>
-              <a:t>11/19/2013</a:t>
+              <a:t>11/20/2013</a:t>
             </a:fld>
             <a:endParaRPr lang="en-US"/>
           </a:p>
@@ -933,7 +933,7 @@
           <a:p>
             <a:fld id="{2DB3D439-1F88-44B4-B5F7-F9BCD4064257}" type="datetime1">
               <a:rPr lang="en-US" smtClean="0"/>
-              <a:t>11/19/2013</a:t>
+              <a:t>11/20/2013</a:t>
             </a:fld>
             <a:endParaRPr lang="en-US"/>
           </a:p>
@@ -1108,7 +1108,7 @@
           <a:p>
             <a:fld id="{99C5638F-6F55-4055-935C-67841BE78C36}" type="datetime1">
               <a:rPr lang="en-US" smtClean="0"/>
-              <a:t>11/19/2013</a:t>
+              <a:t>11/20/2013</a:t>
             </a:fld>
             <a:endParaRPr lang="en-US"/>
           </a:p>
@@ -1273,7 +1273,7 @@
           <a:p>
             <a:fld id="{E6987D90-0C92-4B22-A29D-FED15412CED2}" type="datetime1">
               <a:rPr lang="en-US" smtClean="0"/>
-              <a:t>11/19/2013</a:t>
+              <a:t>11/20/2013</a:t>
             </a:fld>
             <a:endParaRPr lang="en-US"/>
           </a:p>
@@ -1522,7 +1522,7 @@
           <a:p>
             <a:fld id="{DDB67BC4-9554-49E0-BCB3-D1EF965BA0B8}" type="datetime1">
               <a:rPr lang="en-US" smtClean="0"/>
-              <a:t>11/19/2013</a:t>
+              <a:t>11/20/2013</a:t>
             </a:fld>
             <a:endParaRPr lang="en-US"/>
           </a:p>
@@ -1805,7 +1805,7 @@
           <a:p>
             <a:fld id="{EC24D770-803D-4E01-921C-9C100DD8230C}" type="datetime1">
               <a:rPr lang="en-US" smtClean="0"/>
-              <a:t>11/19/2013</a:t>
+              <a:t>11/20/2013</a:t>
             </a:fld>
             <a:endParaRPr lang="en-US"/>
           </a:p>
@@ -2244,7 +2244,7 @@
           <a:p>
             <a:fld id="{356AD44B-78A4-4209-8070-7DCBE2DC4992}" type="datetime1">
               <a:rPr lang="en-US" smtClean="0"/>
-              <a:t>11/19/2013</a:t>
+              <a:t>11/20/2013</a:t>
             </a:fld>
             <a:endParaRPr lang="en-US"/>
           </a:p>
@@ -2357,7 +2357,7 @@
           <a:p>
             <a:fld id="{A993C59A-7CA2-467F-B7F1-9096881A01B8}" type="datetime1">
               <a:rPr lang="en-US" smtClean="0"/>
-              <a:t>11/19/2013</a:t>
+              <a:t>11/20/2013</a:t>
             </a:fld>
             <a:endParaRPr lang="en-US"/>
           </a:p>
@@ -2447,7 +2447,7 @@
           <a:p>
             <a:fld id="{2B6B58D0-2488-434A-8ED1-692E09B85CC5}" type="datetime1">
               <a:rPr lang="en-US" smtClean="0"/>
-              <a:t>11/19/2013</a:t>
+              <a:t>11/20/2013</a:t>
             </a:fld>
             <a:endParaRPr lang="en-US"/>
           </a:p>
@@ -2689,7 +2689,7 @@
           <a:p>
             <a:fld id="{FDB0AFC2-7D64-4F61-A7B7-9932D3305DDA}" type="datetime1">
               <a:rPr lang="en-US" smtClean="0"/>
-              <a:t>11/19/2013</a:t>
+              <a:t>11/20/2013</a:t>
             </a:fld>
             <a:endParaRPr lang="en-US"/>
           </a:p>
@@ -2983,7 +2983,7 @@
           <a:p>
             <a:fld id="{4983D17A-D7B2-4ECE-8A2C-93679B9D177B}" type="datetime1">
               <a:rPr lang="en-US" smtClean="0"/>
-              <a:t>11/19/2013</a:t>
+              <a:t>11/20/2013</a:t>
             </a:fld>
             <a:endParaRPr lang="en-US"/>
           </a:p>
@@ -3277,7 +3277,7 @@
           <a:p>
             <a:fld id="{2A5275F7-419E-4C23-8A3D-2EE5742B2EC9}" type="datetime1">
               <a:rPr lang="en-US" smtClean="0"/>
-              <a:t>11/19/2013</a:t>
+              <a:t>11/20/2013</a:t>
             </a:fld>
             <a:endParaRPr lang="en-US"/>
           </a:p>
@@ -4192,11 +4192,7 @@
             <a:pPr marL="800100" lvl="1" indent="-342900"/>
             <a:r>
               <a:rPr lang="en-US" dirty="0" smtClean="0"/>
-              <a:t>May happen at any </a:t>
-            </a:r>
-            <a:r>
-              <a:rPr lang="en-US" dirty="0" smtClean="0"/>
-              <a:t>time</a:t>
+              <a:t>May happen at any time</a:t>
             </a:r>
           </a:p>
           <a:p>
@@ -4205,7 +4201,6 @@
               <a:rPr lang="en-US" dirty="0" smtClean="0"/>
               <a:t>Could happen when predicate returns true</a:t>
             </a:r>
-            <a:endParaRPr lang="en-US" dirty="0" smtClean="0"/>
           </a:p>
           <a:p>
             <a:r>
@@ -4852,31 +4847,57 @@
               <a:rPr lang="en-US" dirty="0" smtClean="0">
                 <a:cs typeface="Courier New" panose="02070309020205020404" pitchFamily="49" charset="0"/>
               </a:rPr>
-              <a:t> </a:t>
+              <a:t> expects a callable object like the </a:t>
+            </a:r>
+            <a:r>
+              <a:rPr lang="en-US" dirty="0" err="1" smtClean="0">
+                <a:latin typeface="Courier New" panose="02070309020205020404" pitchFamily="49" charset="0"/>
+                <a:cs typeface="Courier New" panose="02070309020205020404" pitchFamily="49" charset="0"/>
+              </a:rPr>
+              <a:t>std</a:t>
             </a:r>
             <a:r>
               <a:rPr lang="en-US" dirty="0" smtClean="0">
-                <a:cs typeface="Courier New" panose="02070309020205020404" pitchFamily="49" charset="0"/>
-              </a:rPr>
-              <a:t>expects </a:t>
+                <a:latin typeface="Courier New" panose="02070309020205020404" pitchFamily="49" charset="0"/>
+                <a:cs typeface="Courier New" panose="02070309020205020404" pitchFamily="49" charset="0"/>
+              </a:rPr>
+              <a:t>::thread</a:t>
             </a:r>
             <a:r>
               <a:rPr lang="en-US" dirty="0" smtClean="0">
                 <a:cs typeface="Courier New" panose="02070309020205020404" pitchFamily="49" charset="0"/>
               </a:rPr>
-              <a:t>a callable object </a:t>
+              <a:t> constructor</a:t>
+            </a:r>
+          </a:p>
+          <a:p>
+            <a:pPr marL="800100" lvl="1" indent="-342900"/>
+            <a:r>
+              <a:rPr lang="en-US" dirty="0" err="1" smtClean="0">
+                <a:latin typeface="Courier New" panose="02070309020205020404" pitchFamily="49" charset="0"/>
+                <a:cs typeface="Courier New" panose="02070309020205020404" pitchFamily="49" charset="0"/>
+              </a:rPr>
+              <a:t>std</a:t>
             </a:r>
             <a:r>
               <a:rPr lang="en-US" dirty="0" smtClean="0">
-                <a:cs typeface="Courier New" panose="02070309020205020404" pitchFamily="49" charset="0"/>
-              </a:rPr>
-              <a:t>like </a:t>
+                <a:latin typeface="Courier New" panose="02070309020205020404" pitchFamily="49" charset="0"/>
+                <a:cs typeface="Courier New" panose="02070309020205020404" pitchFamily="49" charset="0"/>
+              </a:rPr>
+              <a:t>::</a:t>
+            </a:r>
+            <a:r>
+              <a:rPr lang="en-US" dirty="0" err="1" smtClean="0">
+                <a:latin typeface="Courier New" panose="02070309020205020404" pitchFamily="49" charset="0"/>
+                <a:cs typeface="Courier New" panose="02070309020205020404" pitchFamily="49" charset="0"/>
+              </a:rPr>
+              <a:t>async</a:t>
             </a:r>
             <a:r>
               <a:rPr lang="en-US" dirty="0" smtClean="0">
                 <a:cs typeface="Courier New" panose="02070309020205020404" pitchFamily="49" charset="0"/>
               </a:rPr>
-              <a:t>the </a:t>
+              <a:t> returns a </a:t>
             </a:r>
             <a:r>
               <a:rPr lang="en-US" dirty="0" err="1" smtClean="0">
@@ -4890,76 +4911,13 @@
                 <a:latin typeface="Courier New" panose="02070309020205020404" pitchFamily="49" charset="0"/>
                 <a:cs typeface="Courier New" panose="02070309020205020404" pitchFamily="49" charset="0"/>
               </a:rPr>
-              <a:t>::thread</a:t>
+              <a:t>::future&lt;T&gt;</a:t>
             </a:r>
             <a:r>
               <a:rPr lang="en-US" dirty="0" smtClean="0">
                 <a:cs typeface="Courier New" panose="02070309020205020404" pitchFamily="49" charset="0"/>
               </a:rPr>
-              <a:t> constructor</a:t>
-            </a:r>
-          </a:p>
-          <a:p>
-            <a:pPr marL="800100" lvl="1" indent="-342900"/>
-            <a:r>
-              <a:rPr lang="en-US" dirty="0" err="1" smtClean="0">
-                <a:latin typeface="Courier New" panose="02070309020205020404" pitchFamily="49" charset="0"/>
-                <a:cs typeface="Courier New" panose="02070309020205020404" pitchFamily="49" charset="0"/>
-              </a:rPr>
-              <a:t>std</a:t>
-            </a:r>
-            <a:r>
-              <a:rPr lang="en-US" dirty="0" smtClean="0">
-                <a:latin typeface="Courier New" panose="02070309020205020404" pitchFamily="49" charset="0"/>
-                <a:cs typeface="Courier New" panose="02070309020205020404" pitchFamily="49" charset="0"/>
-              </a:rPr>
-              <a:t>::</a:t>
-            </a:r>
-            <a:r>
-              <a:rPr lang="en-US" dirty="0" err="1" smtClean="0">
-                <a:latin typeface="Courier New" panose="02070309020205020404" pitchFamily="49" charset="0"/>
-                <a:cs typeface="Courier New" panose="02070309020205020404" pitchFamily="49" charset="0"/>
-              </a:rPr>
-              <a:t>async</a:t>
-            </a:r>
-            <a:r>
-              <a:rPr lang="en-US" dirty="0" smtClean="0">
-                <a:cs typeface="Courier New" panose="02070309020205020404" pitchFamily="49" charset="0"/>
-              </a:rPr>
-              <a:t> returns a </a:t>
-            </a:r>
-            <a:r>
-              <a:rPr lang="en-US" dirty="0" err="1" smtClean="0">
-                <a:latin typeface="Courier New" panose="02070309020205020404" pitchFamily="49" charset="0"/>
-                <a:cs typeface="Courier New" panose="02070309020205020404" pitchFamily="49" charset="0"/>
-              </a:rPr>
-              <a:t>std</a:t>
-            </a:r>
-            <a:r>
-              <a:rPr lang="en-US" dirty="0" smtClean="0">
-                <a:latin typeface="Courier New" panose="02070309020205020404" pitchFamily="49" charset="0"/>
-                <a:cs typeface="Courier New" panose="02070309020205020404" pitchFamily="49" charset="0"/>
-              </a:rPr>
-              <a:t>::</a:t>
-            </a:r>
-            <a:r>
-              <a:rPr lang="en-US" dirty="0" smtClean="0">
-                <a:latin typeface="Courier New" panose="02070309020205020404" pitchFamily="49" charset="0"/>
-                <a:cs typeface="Courier New" panose="02070309020205020404" pitchFamily="49" charset="0"/>
-              </a:rPr>
-              <a:t>future&lt;T&gt;</a:t>
-            </a:r>
-            <a:r>
-              <a:rPr lang="en-US" dirty="0" smtClean="0">
-                <a:cs typeface="Courier New" panose="02070309020205020404" pitchFamily="49" charset="0"/>
-              </a:rPr>
-              <a:t> </a:t>
-            </a:r>
-            <a:r>
-              <a:rPr lang="en-US" dirty="0" smtClean="0">
-                <a:cs typeface="Courier New" panose="02070309020205020404" pitchFamily="49" charset="0"/>
-              </a:rPr>
-              <a:t>which will have the return value of the callable object </a:t>
+              <a:t> which will have the return value of the callable object </a:t>
             </a:r>
             <a:r>
               <a:rPr lang="en-US" dirty="0" smtClean="0">
@@ -5018,10 +4976,10 @@
           <a:lstStyle/>
           <a:p>
             <a:r>
-              <a:rPr lang="en-US" smtClean="0"/>
+              <a:rPr lang="en-US" dirty="0" smtClean="0"/>
               <a:t>Source: Williams, Chapter 4</a:t>
             </a:r>
-            <a:endParaRPr lang="en-US"/>
+            <a:endParaRPr lang="en-US" dirty="0"/>
           </a:p>
         </p:txBody>
       </p:sp>
@@ -6170,7 +6128,76 @@
           <a:bodyPr/>
           <a:lstStyle/>
           <a:p>
-            <a:endParaRPr lang="en-US"/>
+            <a:r>
+              <a:rPr lang="en-US" dirty="0" smtClean="0"/>
+              <a:t>What happens if an exception is thrown by the callable object which is part of an asynchronous operation?</a:t>
+            </a:r>
+          </a:p>
+          <a:p>
+            <a:pPr lvl="1"/>
+            <a:r>
+              <a:rPr lang="en-US" dirty="0" smtClean="0"/>
+              <a:t>The callable object stops executing.</a:t>
+            </a:r>
+          </a:p>
+          <a:p>
+            <a:pPr lvl="1"/>
+            <a:r>
+              <a:rPr lang="en-US" dirty="0" smtClean="0"/>
+              <a:t>The exception is caught by </a:t>
+            </a:r>
+            <a:r>
+              <a:rPr lang="en-US" dirty="0" err="1" smtClean="0">
+                <a:latin typeface="Courier New" panose="02070309020205020404" pitchFamily="49" charset="0"/>
+                <a:cs typeface="Courier New" panose="02070309020205020404" pitchFamily="49" charset="0"/>
+              </a:rPr>
+              <a:t>std</a:t>
+            </a:r>
+            <a:r>
+              <a:rPr lang="en-US" dirty="0" smtClean="0">
+                <a:latin typeface="Courier New" panose="02070309020205020404" pitchFamily="49" charset="0"/>
+                <a:cs typeface="Courier New" panose="02070309020205020404" pitchFamily="49" charset="0"/>
+              </a:rPr>
+              <a:t>::</a:t>
+            </a:r>
+            <a:r>
+              <a:rPr lang="en-US" dirty="0" err="1" smtClean="0">
+                <a:latin typeface="Courier New" panose="02070309020205020404" pitchFamily="49" charset="0"/>
+                <a:cs typeface="Courier New" panose="02070309020205020404" pitchFamily="49" charset="0"/>
+              </a:rPr>
+              <a:t>async</a:t>
+            </a:r>
+            <a:r>
+              <a:rPr lang="en-US" dirty="0" smtClean="0">
+                <a:cs typeface="Courier New" panose="02070309020205020404" pitchFamily="49" charset="0"/>
+              </a:rPr>
+              <a:t>.</a:t>
+            </a:r>
+          </a:p>
+          <a:p>
+            <a:pPr lvl="1"/>
+            <a:r>
+              <a:rPr lang="en-US" dirty="0" smtClean="0">
+                <a:cs typeface="Courier New" panose="02070309020205020404" pitchFamily="49" charset="0"/>
+              </a:rPr>
+              <a:t>The exception is thrown when </a:t>
+            </a:r>
+            <a:r>
+              <a:rPr lang="en-US" dirty="0" smtClean="0">
+                <a:latin typeface="Courier New" panose="02070309020205020404" pitchFamily="49" charset="0"/>
+                <a:cs typeface="Courier New" panose="02070309020205020404" pitchFamily="49" charset="0"/>
+              </a:rPr>
+              <a:t>get</a:t>
+            </a:r>
+            <a:r>
+              <a:rPr lang="en-US" dirty="0" smtClean="0">
+                <a:cs typeface="Courier New" panose="02070309020205020404" pitchFamily="49" charset="0"/>
+              </a:rPr>
+              <a:t> is called.</a:t>
+            </a:r>
+            <a:endParaRPr lang="en-US" dirty="0">
+              <a:cs typeface="Courier New" panose="02070309020205020404" pitchFamily="49" charset="0"/>
+            </a:endParaRPr>
           </a:p>
         </p:txBody>
       </p:sp>
@@ -6193,6 +6220,29 @@
               <a:rPr lang="en-US" smtClean="0"/>
               <a:t>16</a:t>
             </a:fld>
+            <a:endParaRPr lang="en-US"/>
+          </a:p>
+        </p:txBody>
+      </p:sp>
+      <p:sp>
+        <p:nvSpPr>
+          <p:cNvPr id="5" name="Footer Placeholder 4"/>
+          <p:cNvSpPr>
+            <a:spLocks noGrp="1"/>
+          </p:cNvSpPr>
+          <p:nvPr>
+            <p:ph type="ftr" sz="quarter" idx="11"/>
+          </p:nvPr>
+        </p:nvSpPr>
+        <p:spPr/>
+        <p:txBody>
+          <a:bodyPr/>
+          <a:lstStyle/>
+          <a:p>
+            <a:r>
+              <a:rPr lang="en-US" smtClean="0"/>
+              <a:t>Source: Williams, Chapter 4</a:t>
+            </a:r>
             <a:endParaRPr lang="en-US"/>
           </a:p>
         </p:txBody>

</xml_diff>

<commit_message>
Start the asynchronous GUI example.
</commit_message>
<xml_diff>
--- a/Lectures/Asynchronous Operations/Asynchronous Operations.pptx
+++ b/Lectures/Asynchronous Operations/Asynchronous Operations.pptx
@@ -5,7 +5,7 @@
     <p:sldMasterId id="2147483660" r:id="rId1"/>
   </p:sldMasterIdLst>
   <p:notesMasterIdLst>
-    <p:notesMasterId r:id="rId18"/>
+    <p:notesMasterId r:id="rId19"/>
   </p:notesMasterIdLst>
   <p:sldIdLst>
     <p:sldId id="256" r:id="rId2"/>
@@ -24,6 +24,7 @@
     <p:sldId id="269" r:id="rId15"/>
     <p:sldId id="270" r:id="rId16"/>
     <p:sldId id="271" r:id="rId17"/>
+    <p:sldId id="272" r:id="rId18"/>
   </p:sldIdLst>
   <p:sldSz cx="9144000" cy="6858000" type="screen4x3"/>
   <p:notesSz cx="6858000" cy="9144000"/>
@@ -207,7 +208,7 @@
           <a:p>
             <a:fld id="{DBE0ECA1-3FBF-48AE-AD2A-4439AE745E19}" type="datetimeFigureOut">
               <a:rPr lang="en-US" smtClean="0"/>
-              <a:t>11/20/2013</a:t>
+              <a:t>11/21/2013</a:t>
             </a:fld>
             <a:endParaRPr lang="en-US"/>
           </a:p>
@@ -668,7 +669,7 @@
           <a:p>
             <a:fld id="{9769DED8-28D4-45B9-A00F-7CFE9335FEA6}" type="datetime1">
               <a:rPr lang="en-US" smtClean="0"/>
-              <a:t>11/20/2013</a:t>
+              <a:t>11/21/2013</a:t>
             </a:fld>
             <a:endParaRPr lang="en-US"/>
           </a:p>
@@ -933,7 +934,7 @@
           <a:p>
             <a:fld id="{2DB3D439-1F88-44B4-B5F7-F9BCD4064257}" type="datetime1">
               <a:rPr lang="en-US" smtClean="0"/>
-              <a:t>11/20/2013</a:t>
+              <a:t>11/21/2013</a:t>
             </a:fld>
             <a:endParaRPr lang="en-US"/>
           </a:p>
@@ -1108,7 +1109,7 @@
           <a:p>
             <a:fld id="{99C5638F-6F55-4055-935C-67841BE78C36}" type="datetime1">
               <a:rPr lang="en-US" smtClean="0"/>
-              <a:t>11/20/2013</a:t>
+              <a:t>11/21/2013</a:t>
             </a:fld>
             <a:endParaRPr lang="en-US"/>
           </a:p>
@@ -1273,7 +1274,7 @@
           <a:p>
             <a:fld id="{E6987D90-0C92-4B22-A29D-FED15412CED2}" type="datetime1">
               <a:rPr lang="en-US" smtClean="0"/>
-              <a:t>11/20/2013</a:t>
+              <a:t>11/21/2013</a:t>
             </a:fld>
             <a:endParaRPr lang="en-US"/>
           </a:p>
@@ -1522,7 +1523,7 @@
           <a:p>
             <a:fld id="{DDB67BC4-9554-49E0-BCB3-D1EF965BA0B8}" type="datetime1">
               <a:rPr lang="en-US" smtClean="0"/>
-              <a:t>11/20/2013</a:t>
+              <a:t>11/21/2013</a:t>
             </a:fld>
             <a:endParaRPr lang="en-US"/>
           </a:p>
@@ -1805,7 +1806,7 @@
           <a:p>
             <a:fld id="{EC24D770-803D-4E01-921C-9C100DD8230C}" type="datetime1">
               <a:rPr lang="en-US" smtClean="0"/>
-              <a:t>11/20/2013</a:t>
+              <a:t>11/21/2013</a:t>
             </a:fld>
             <a:endParaRPr lang="en-US"/>
           </a:p>
@@ -2244,7 +2245,7 @@
           <a:p>
             <a:fld id="{356AD44B-78A4-4209-8070-7DCBE2DC4992}" type="datetime1">
               <a:rPr lang="en-US" smtClean="0"/>
-              <a:t>11/20/2013</a:t>
+              <a:t>11/21/2013</a:t>
             </a:fld>
             <a:endParaRPr lang="en-US"/>
           </a:p>
@@ -2357,7 +2358,7 @@
           <a:p>
             <a:fld id="{A993C59A-7CA2-467F-B7F1-9096881A01B8}" type="datetime1">
               <a:rPr lang="en-US" smtClean="0"/>
-              <a:t>11/20/2013</a:t>
+              <a:t>11/21/2013</a:t>
             </a:fld>
             <a:endParaRPr lang="en-US"/>
           </a:p>
@@ -2447,7 +2448,7 @@
           <a:p>
             <a:fld id="{2B6B58D0-2488-434A-8ED1-692E09B85CC5}" type="datetime1">
               <a:rPr lang="en-US" smtClean="0"/>
-              <a:t>11/20/2013</a:t>
+              <a:t>11/21/2013</a:t>
             </a:fld>
             <a:endParaRPr lang="en-US"/>
           </a:p>
@@ -2689,7 +2690,7 @@
           <a:p>
             <a:fld id="{FDB0AFC2-7D64-4F61-A7B7-9932D3305DDA}" type="datetime1">
               <a:rPr lang="en-US" smtClean="0"/>
-              <a:t>11/20/2013</a:t>
+              <a:t>11/21/2013</a:t>
             </a:fld>
             <a:endParaRPr lang="en-US"/>
           </a:p>
@@ -2983,7 +2984,7 @@
           <a:p>
             <a:fld id="{4983D17A-D7B2-4ECE-8A2C-93679B9D177B}" type="datetime1">
               <a:rPr lang="en-US" smtClean="0"/>
-              <a:t>11/20/2013</a:t>
+              <a:t>11/21/2013</a:t>
             </a:fld>
             <a:endParaRPr lang="en-US"/>
           </a:p>
@@ -3277,7 +3278,7 @@
           <a:p>
             <a:fld id="{2A5275F7-419E-4C23-8A3D-2EE5742B2EC9}" type="datetime1">
               <a:rPr lang="en-US" smtClean="0"/>
-              <a:t>11/20/2013</a:t>
+              <a:t>11/21/2013</a:t>
             </a:fld>
             <a:endParaRPr lang="en-US"/>
           </a:p>
@@ -6264,6 +6265,224 @@
       </p:par>
     </p:tnLst>
   </p:timing>
+</p:sld>
+</file>
+
+<file path=ppt/slides/slide17.xml><?xml version="1.0" encoding="utf-8"?>
+<p:sld xmlns:a="http://schemas.openxmlformats.org/drawingml/2006/main" xmlns:r="http://schemas.openxmlformats.org/officeDocument/2006/relationships" xmlns:p="http://schemas.openxmlformats.org/presentationml/2006/main">
+  <p:cSld>
+    <p:spTree>
+      <p:nvGrpSpPr>
+        <p:cNvPr id="1" name=""/>
+        <p:cNvGrpSpPr/>
+        <p:nvPr/>
+      </p:nvGrpSpPr>
+      <p:grpSpPr>
+        <a:xfrm>
+          <a:off x="0" y="0"/>
+          <a:ext cx="0" cy="0"/>
+          <a:chOff x="0" y="0"/>
+          <a:chExt cx="0" cy="0"/>
+        </a:xfrm>
+      </p:grpSpPr>
+      <p:sp>
+        <p:nvSpPr>
+          <p:cNvPr id="2" name="Title 1"/>
+          <p:cNvSpPr>
+            <a:spLocks noGrp="1"/>
+          </p:cNvSpPr>
+          <p:nvPr>
+            <p:ph type="title"/>
+          </p:nvPr>
+        </p:nvSpPr>
+        <p:spPr/>
+        <p:txBody>
+          <a:bodyPr/>
+          <a:lstStyle/>
+          <a:p>
+            <a:r>
+              <a:rPr lang="en-US" dirty="0" smtClean="0"/>
+              <a:t>Example: Asynchronous GUI</a:t>
+            </a:r>
+            <a:endParaRPr lang="en-US" dirty="0"/>
+          </a:p>
+        </p:txBody>
+      </p:sp>
+      <p:sp>
+        <p:nvSpPr>
+          <p:cNvPr id="3" name="Content Placeholder 2"/>
+          <p:cNvSpPr>
+            <a:spLocks noGrp="1"/>
+          </p:cNvSpPr>
+          <p:nvPr>
+            <p:ph idx="1"/>
+          </p:nvPr>
+        </p:nvSpPr>
+        <p:spPr/>
+        <p:txBody>
+          <a:bodyPr/>
+          <a:lstStyle/>
+          <a:p>
+            <a:r>
+              <a:rPr lang="en-US" dirty="0" smtClean="0"/>
+              <a:t>Let’s explore a GUI application that computes the value of pi.</a:t>
+            </a:r>
+          </a:p>
+          <a:p>
+            <a:pPr marL="800100" lvl="1" indent="-342900"/>
+            <a:r>
+              <a:rPr lang="en-US" dirty="0" smtClean="0"/>
+              <a:t>We will start with the computation on the </a:t>
+            </a:r>
+            <a:r>
+              <a:rPr lang="en-US" smtClean="0"/>
+              <a:t>GUI thread.</a:t>
+            </a:r>
+            <a:endParaRPr lang="en-US" dirty="0" smtClean="0"/>
+          </a:p>
+          <a:p>
+            <a:pPr marL="800100" lvl="1" indent="-342900"/>
+            <a:r>
+              <a:rPr lang="en-US" dirty="0" smtClean="0"/>
+              <a:t>We will move the computation to a background thread using an asynchronous task and a condition variable.</a:t>
+            </a:r>
+          </a:p>
+          <a:p>
+            <a:pPr marL="800100" lvl="1" indent="-342900"/>
+            <a:endParaRPr lang="en-US" dirty="0"/>
+          </a:p>
+          <a:p>
+            <a:pPr marL="342900" indent="-342900"/>
+            <a:endParaRPr lang="en-US" dirty="0"/>
+          </a:p>
+        </p:txBody>
+      </p:sp>
+      <p:sp>
+        <p:nvSpPr>
+          <p:cNvPr id="4" name="Slide Number Placeholder 3"/>
+          <p:cNvSpPr>
+            <a:spLocks noGrp="1"/>
+          </p:cNvSpPr>
+          <p:nvPr>
+            <p:ph type="sldNum" sz="quarter" idx="12"/>
+          </p:nvPr>
+        </p:nvSpPr>
+        <p:spPr/>
+        <p:txBody>
+          <a:bodyPr/>
+          <a:lstStyle/>
+          <a:p>
+            <a:fld id="{6DA12B36-9664-4CB0-8B2E-F4A2F44AE97E}" type="slidenum">
+              <a:rPr lang="en-US" smtClean="0"/>
+              <a:t>17</a:t>
+            </a:fld>
+            <a:endParaRPr lang="en-US"/>
+          </a:p>
+        </p:txBody>
+      </p:sp>
+      <p:pic>
+        <p:nvPicPr>
+          <p:cNvPr id="1026" name="Picture 2"/>
+          <p:cNvPicPr>
+            <a:picLocks noChangeAspect="1" noChangeArrowheads="1"/>
+          </p:cNvPicPr>
+          <p:nvPr/>
+        </p:nvPicPr>
+        <p:blipFill>
+          <a:blip r:embed="rId2">
+            <a:extLst>
+              <a:ext uri="{28A0092B-C50C-407E-A947-70E740481C1C}">
+                <a14:useLocalDpi xmlns:a14="http://schemas.microsoft.com/office/drawing/2010/main" val="0"/>
+              </a:ext>
+            </a:extLst>
+          </a:blip>
+          <a:srcRect/>
+          <a:stretch>
+            <a:fillRect/>
+          </a:stretch>
+        </p:blipFill>
+        <p:spPr bwMode="auto">
+          <a:xfrm>
+            <a:off x="2362200" y="3733800"/>
+            <a:ext cx="3143250" cy="2400300"/>
+          </a:xfrm>
+          <a:prstGeom prst="rect">
+            <a:avLst/>
+          </a:prstGeom>
+          <a:noFill/>
+          <a:ln>
+            <a:noFill/>
+          </a:ln>
+          <a:extLst>
+            <a:ext uri="{909E8E84-426E-40DD-AFC4-6F175D3DCCD1}">
+              <a14:hiddenFill xmlns:a14="http://schemas.microsoft.com/office/drawing/2010/main">
+                <a:solidFill>
+                  <a:schemeClr val="accent1"/>
+                </a:solidFill>
+              </a14:hiddenFill>
+            </a:ext>
+            <a:ext uri="{91240B29-F687-4F45-9708-019B960494DF}">
+              <a14:hiddenLine xmlns:a14="http://schemas.microsoft.com/office/drawing/2010/main" w="9525">
+                <a:solidFill>
+                  <a:schemeClr val="tx1"/>
+                </a:solidFill>
+                <a:miter lim="800000"/>
+                <a:headEnd/>
+                <a:tailEnd/>
+              </a14:hiddenLine>
+            </a:ext>
+          </a:extLst>
+        </p:spPr>
+      </p:pic>
+      <p:sp>
+        <p:nvSpPr>
+          <p:cNvPr id="5" name="Footer Placeholder 4"/>
+          <p:cNvSpPr>
+            <a:spLocks noGrp="1"/>
+          </p:cNvSpPr>
+          <p:nvPr>
+            <p:ph type="ftr" sz="quarter" idx="11"/>
+          </p:nvPr>
+        </p:nvSpPr>
+        <p:spPr/>
+        <p:txBody>
+          <a:bodyPr/>
+          <a:lstStyle/>
+          <a:p>
+            <a:pPr marL="0" lvl="1"/>
+            <a:r>
+              <a:rPr lang="en-US" sz="1000" dirty="0" smtClean="0"/>
+              <a:t>Source: </a:t>
+            </a:r>
+            <a:r>
+              <a:rPr lang="en-US" sz="1000" dirty="0">
+                <a:hlinkClick r:id="rId3"/>
+              </a:rPr>
+              <a:t>Jeff </a:t>
+            </a:r>
+            <a:r>
+              <a:rPr lang="en-US" sz="1000" dirty="0" err="1">
+                <a:hlinkClick r:id="rId3"/>
+              </a:rPr>
+              <a:t>Coswell</a:t>
+            </a:r>
+            <a:endParaRPr lang="en-US" sz="1000" dirty="0"/>
+          </a:p>
+          <a:p>
+            <a:endParaRPr lang="en-US" dirty="0"/>
+          </a:p>
+        </p:txBody>
+      </p:sp>
+    </p:spTree>
+    <p:extLst>
+      <p:ext uri="{BB962C8B-B14F-4D97-AF65-F5344CB8AC3E}">
+        <p14:creationId xmlns:p14="http://schemas.microsoft.com/office/powerpoint/2010/main" val="1817045340"/>
+      </p:ext>
+    </p:extLst>
+  </p:cSld>
+  <p:clrMapOvr>
+    <a:masterClrMapping/>
+  </p:clrMapOvr>
 </p:sld>
 </file>
 

</xml_diff>

<commit_message>
Complete asynchonrous operations lecture and examples.
</commit_message>
<xml_diff>
--- a/Lectures/Asynchronous Operations/Asynchronous Operations.pptx
+++ b/Lectures/Asynchronous Operations/Asynchronous Operations.pptx
@@ -5,7 +5,7 @@
     <p:sldMasterId id="2147483660" r:id="rId1"/>
   </p:sldMasterIdLst>
   <p:notesMasterIdLst>
-    <p:notesMasterId r:id="rId19"/>
+    <p:notesMasterId r:id="rId20"/>
   </p:notesMasterIdLst>
   <p:sldIdLst>
     <p:sldId id="256" r:id="rId2"/>
@@ -25,6 +25,7 @@
     <p:sldId id="270" r:id="rId16"/>
     <p:sldId id="271" r:id="rId17"/>
     <p:sldId id="272" r:id="rId18"/>
+    <p:sldId id="273" r:id="rId19"/>
   </p:sldIdLst>
   <p:sldSz cx="9144000" cy="6858000" type="screen4x3"/>
   <p:notesSz cx="6858000" cy="9144000"/>
@@ -208,7 +209,7 @@
           <a:p>
             <a:fld id="{DBE0ECA1-3FBF-48AE-AD2A-4439AE745E19}" type="datetimeFigureOut">
               <a:rPr lang="en-US" smtClean="0"/>
-              <a:t>11/21/2013</a:t>
+              <a:t>11/25/2013</a:t>
             </a:fld>
             <a:endParaRPr lang="en-US"/>
           </a:p>
@@ -669,7 +670,7 @@
           <a:p>
             <a:fld id="{9769DED8-28D4-45B9-A00F-7CFE9335FEA6}" type="datetime1">
               <a:rPr lang="en-US" smtClean="0"/>
-              <a:t>11/21/2013</a:t>
+              <a:t>11/25/2013</a:t>
             </a:fld>
             <a:endParaRPr lang="en-US"/>
           </a:p>
@@ -934,7 +935,7 @@
           <a:p>
             <a:fld id="{2DB3D439-1F88-44B4-B5F7-F9BCD4064257}" type="datetime1">
               <a:rPr lang="en-US" smtClean="0"/>
-              <a:t>11/21/2013</a:t>
+              <a:t>11/25/2013</a:t>
             </a:fld>
             <a:endParaRPr lang="en-US"/>
           </a:p>
@@ -1109,7 +1110,7 @@
           <a:p>
             <a:fld id="{99C5638F-6F55-4055-935C-67841BE78C36}" type="datetime1">
               <a:rPr lang="en-US" smtClean="0"/>
-              <a:t>11/21/2013</a:t>
+              <a:t>11/25/2013</a:t>
             </a:fld>
             <a:endParaRPr lang="en-US"/>
           </a:p>
@@ -1274,7 +1275,7 @@
           <a:p>
             <a:fld id="{E6987D90-0C92-4B22-A29D-FED15412CED2}" type="datetime1">
               <a:rPr lang="en-US" smtClean="0"/>
-              <a:t>11/21/2013</a:t>
+              <a:t>11/25/2013</a:t>
             </a:fld>
             <a:endParaRPr lang="en-US"/>
           </a:p>
@@ -1523,7 +1524,7 @@
           <a:p>
             <a:fld id="{DDB67BC4-9554-49E0-BCB3-D1EF965BA0B8}" type="datetime1">
               <a:rPr lang="en-US" smtClean="0"/>
-              <a:t>11/21/2013</a:t>
+              <a:t>11/25/2013</a:t>
             </a:fld>
             <a:endParaRPr lang="en-US"/>
           </a:p>
@@ -1806,7 +1807,7 @@
           <a:p>
             <a:fld id="{EC24D770-803D-4E01-921C-9C100DD8230C}" type="datetime1">
               <a:rPr lang="en-US" smtClean="0"/>
-              <a:t>11/21/2013</a:t>
+              <a:t>11/25/2013</a:t>
             </a:fld>
             <a:endParaRPr lang="en-US"/>
           </a:p>
@@ -2245,7 +2246,7 @@
           <a:p>
             <a:fld id="{356AD44B-78A4-4209-8070-7DCBE2DC4992}" type="datetime1">
               <a:rPr lang="en-US" smtClean="0"/>
-              <a:t>11/21/2013</a:t>
+              <a:t>11/25/2013</a:t>
             </a:fld>
             <a:endParaRPr lang="en-US"/>
           </a:p>
@@ -2358,7 +2359,7 @@
           <a:p>
             <a:fld id="{A993C59A-7CA2-467F-B7F1-9096881A01B8}" type="datetime1">
               <a:rPr lang="en-US" smtClean="0"/>
-              <a:t>11/21/2013</a:t>
+              <a:t>11/25/2013</a:t>
             </a:fld>
             <a:endParaRPr lang="en-US"/>
           </a:p>
@@ -2448,7 +2449,7 @@
           <a:p>
             <a:fld id="{2B6B58D0-2488-434A-8ED1-692E09B85CC5}" type="datetime1">
               <a:rPr lang="en-US" smtClean="0"/>
-              <a:t>11/21/2013</a:t>
+              <a:t>11/25/2013</a:t>
             </a:fld>
             <a:endParaRPr lang="en-US"/>
           </a:p>
@@ -2690,7 +2691,7 @@
           <a:p>
             <a:fld id="{FDB0AFC2-7D64-4F61-A7B7-9932D3305DDA}" type="datetime1">
               <a:rPr lang="en-US" smtClean="0"/>
-              <a:t>11/21/2013</a:t>
+              <a:t>11/25/2013</a:t>
             </a:fld>
             <a:endParaRPr lang="en-US"/>
           </a:p>
@@ -2984,7 +2985,7 @@
           <a:p>
             <a:fld id="{4983D17A-D7B2-4ECE-8A2C-93679B9D177B}" type="datetime1">
               <a:rPr lang="en-US" smtClean="0"/>
-              <a:t>11/21/2013</a:t>
+              <a:t>11/25/2013</a:t>
             </a:fld>
             <a:endParaRPr lang="en-US"/>
           </a:p>
@@ -3278,7 +3279,7 @@
           <a:p>
             <a:fld id="{2A5275F7-419E-4C23-8A3D-2EE5742B2EC9}" type="datetime1">
               <a:rPr lang="en-US" smtClean="0"/>
-              <a:t>11/21/2013</a:t>
+              <a:t>11/25/2013</a:t>
             </a:fld>
             <a:endParaRPr lang="en-US"/>
           </a:p>
@@ -6477,6 +6478,224 @@
     <p:extLst>
       <p:ext uri="{BB962C8B-B14F-4D97-AF65-F5344CB8AC3E}">
         <p14:creationId xmlns:p14="http://schemas.microsoft.com/office/powerpoint/2010/main" val="1817045340"/>
+      </p:ext>
+    </p:extLst>
+  </p:cSld>
+  <p:clrMapOvr>
+    <a:masterClrMapping/>
+  </p:clrMapOvr>
+</p:sld>
+</file>
+
+<file path=ppt/slides/slide18.xml><?xml version="1.0" encoding="utf-8"?>
+<p:sld xmlns:a="http://schemas.openxmlformats.org/drawingml/2006/main" xmlns:r="http://schemas.openxmlformats.org/officeDocument/2006/relationships" xmlns:p="http://schemas.openxmlformats.org/presentationml/2006/main">
+  <p:cSld>
+    <p:spTree>
+      <p:nvGrpSpPr>
+        <p:cNvPr id="1" name=""/>
+        <p:cNvGrpSpPr/>
+        <p:nvPr/>
+      </p:nvGrpSpPr>
+      <p:grpSpPr>
+        <a:xfrm>
+          <a:off x="0" y="0"/>
+          <a:ext cx="0" cy="0"/>
+          <a:chOff x="0" y="0"/>
+          <a:chExt cx="0" cy="0"/>
+        </a:xfrm>
+      </p:grpSpPr>
+      <p:sp>
+        <p:nvSpPr>
+          <p:cNvPr id="2" name="Title 1"/>
+          <p:cNvSpPr>
+            <a:spLocks noGrp="1"/>
+          </p:cNvSpPr>
+          <p:nvPr>
+            <p:ph type="title"/>
+          </p:nvPr>
+        </p:nvSpPr>
+        <p:spPr/>
+        <p:txBody>
+          <a:bodyPr/>
+          <a:lstStyle/>
+          <a:p>
+            <a:r>
+              <a:rPr lang="en-US" dirty="0" smtClean="0"/>
+              <a:t>Summary of guidelines</a:t>
+            </a:r>
+            <a:endParaRPr lang="en-US" dirty="0"/>
+          </a:p>
+        </p:txBody>
+      </p:sp>
+      <p:sp>
+        <p:nvSpPr>
+          <p:cNvPr id="3" name="Content Placeholder 2"/>
+          <p:cNvSpPr>
+            <a:spLocks noGrp="1"/>
+          </p:cNvSpPr>
+          <p:nvPr>
+            <p:ph idx="1"/>
+          </p:nvPr>
+        </p:nvSpPr>
+        <p:spPr/>
+        <p:txBody>
+          <a:bodyPr/>
+          <a:lstStyle/>
+          <a:p>
+            <a:r>
+              <a:rPr lang="en-US" dirty="0">
+                <a:solidFill>
+                  <a:schemeClr val="accent3"/>
+                </a:solidFill>
+              </a:rPr>
+              <a:t>Guidelines</a:t>
+            </a:r>
+          </a:p>
+          <a:p>
+            <a:pPr marL="800100" lvl="1" indent="-342900"/>
+            <a:r>
+              <a:rPr lang="en-US" dirty="0">
+                <a:solidFill>
+                  <a:schemeClr val="accent3"/>
+                </a:solidFill>
+              </a:rPr>
+              <a:t>Prefer to use </a:t>
+            </a:r>
+            <a:r>
+              <a:rPr lang="en-US" dirty="0">
+                <a:solidFill>
+                  <a:schemeClr val="accent3"/>
+                </a:solidFill>
+                <a:latin typeface="Courier New" panose="02070309020205020404" pitchFamily="49" charset="0"/>
+                <a:cs typeface="Courier New" panose="02070309020205020404" pitchFamily="49" charset="0"/>
+              </a:rPr>
+              <a:t>wait</a:t>
+            </a:r>
+            <a:r>
+              <a:rPr lang="en-US" dirty="0">
+                <a:solidFill>
+                  <a:schemeClr val="accent3"/>
+                </a:solidFill>
+              </a:rPr>
+              <a:t> with a wake condition.</a:t>
+            </a:r>
+          </a:p>
+          <a:p>
+            <a:pPr marL="800100" lvl="1" indent="-342900"/>
+            <a:r>
+              <a:rPr lang="en-US" dirty="0">
+                <a:solidFill>
+                  <a:schemeClr val="accent3"/>
+                </a:solidFill>
+              </a:rPr>
+              <a:t>Check wake condition again after </a:t>
+            </a:r>
+            <a:r>
+              <a:rPr lang="en-US" dirty="0">
+                <a:solidFill>
+                  <a:schemeClr val="accent3"/>
+                </a:solidFill>
+                <a:latin typeface="Courier New" panose="02070309020205020404" pitchFamily="49" charset="0"/>
+                <a:cs typeface="Courier New" panose="02070309020205020404" pitchFamily="49" charset="0"/>
+              </a:rPr>
+              <a:t>wake</a:t>
+            </a:r>
+            <a:r>
+              <a:rPr lang="en-US" dirty="0">
+                <a:solidFill>
+                  <a:schemeClr val="accent3"/>
+                </a:solidFill>
+              </a:rPr>
+              <a:t> returns.</a:t>
+            </a:r>
+          </a:p>
+          <a:p>
+            <a:pPr marL="800100" lvl="1" indent="-342900"/>
+            <a:r>
+              <a:rPr lang="en-US" dirty="0">
+                <a:solidFill>
+                  <a:schemeClr val="accent3"/>
+                </a:solidFill>
+              </a:rPr>
+              <a:t>Do not lock a mutex while calling </a:t>
+            </a:r>
+            <a:r>
+              <a:rPr lang="en-US" dirty="0" err="1">
+                <a:solidFill>
+                  <a:schemeClr val="accent3"/>
+                </a:solidFill>
+                <a:latin typeface="Courier New" panose="02070309020205020404" pitchFamily="49" charset="0"/>
+                <a:cs typeface="Courier New" panose="02070309020205020404" pitchFamily="49" charset="0"/>
+              </a:rPr>
+              <a:t>notify_one</a:t>
+            </a:r>
+            <a:r>
+              <a:rPr lang="en-US" dirty="0">
+                <a:solidFill>
+                  <a:schemeClr val="accent3"/>
+                </a:solidFill>
+              </a:rPr>
+              <a:t> or </a:t>
+            </a:r>
+            <a:r>
+              <a:rPr lang="en-US" dirty="0" err="1">
+                <a:solidFill>
+                  <a:schemeClr val="accent3"/>
+                </a:solidFill>
+                <a:latin typeface="Courier New" panose="02070309020205020404" pitchFamily="49" charset="0"/>
+                <a:cs typeface="Courier New" panose="02070309020205020404" pitchFamily="49" charset="0"/>
+              </a:rPr>
+              <a:t>notify_all</a:t>
+            </a:r>
+            <a:r>
+              <a:rPr lang="en-US" dirty="0">
+                <a:solidFill>
+                  <a:schemeClr val="accent3"/>
+                </a:solidFill>
+                <a:cs typeface="Courier New" panose="02070309020205020404" pitchFamily="49" charset="0"/>
+              </a:rPr>
+              <a:t>.</a:t>
+            </a:r>
+            <a:endParaRPr lang="en-US" dirty="0">
+              <a:solidFill>
+                <a:schemeClr val="accent3"/>
+              </a:solidFill>
+              <a:latin typeface="Courier New" panose="02070309020205020404" pitchFamily="49" charset="0"/>
+              <a:cs typeface="Courier New" panose="02070309020205020404" pitchFamily="49" charset="0"/>
+            </a:endParaRPr>
+          </a:p>
+          <a:p>
+            <a:endParaRPr lang="en-US" dirty="0"/>
+          </a:p>
+        </p:txBody>
+      </p:sp>
+      <p:sp>
+        <p:nvSpPr>
+          <p:cNvPr id="4" name="Slide Number Placeholder 3"/>
+          <p:cNvSpPr>
+            <a:spLocks noGrp="1"/>
+          </p:cNvSpPr>
+          <p:nvPr>
+            <p:ph type="sldNum" sz="quarter" idx="12"/>
+          </p:nvPr>
+        </p:nvSpPr>
+        <p:spPr/>
+        <p:txBody>
+          <a:bodyPr/>
+          <a:lstStyle/>
+          <a:p>
+            <a:fld id="{6DA12B36-9664-4CB0-8B2E-F4A2F44AE97E}" type="slidenum">
+              <a:rPr lang="en-US" smtClean="0"/>
+              <a:t>18</a:t>
+            </a:fld>
+            <a:endParaRPr lang="en-US"/>
+          </a:p>
+        </p:txBody>
+      </p:sp>
+    </p:spTree>
+    <p:extLst>
+      <p:ext uri="{BB962C8B-B14F-4D97-AF65-F5344CB8AC3E}">
+        <p14:creationId xmlns:p14="http://schemas.microsoft.com/office/powerpoint/2010/main" val="1863018019"/>
       </p:ext>
     </p:extLst>
   </p:cSld>

</xml_diff>

<commit_message>
Update the asynchronous operations lecture and add lecture notes.
</commit_message>
<xml_diff>
--- a/Lectures/Asynchronous Operations/Asynchronous Operations.pptx
+++ b/Lectures/Asynchronous Operations/Asynchronous Operations.pptx
@@ -209,7 +209,7 @@
           <a:p>
             <a:fld id="{DBE0ECA1-3FBF-48AE-AD2A-4439AE745E19}" type="datetimeFigureOut">
               <a:rPr lang="en-US" smtClean="0"/>
-              <a:t>11/25/2013</a:t>
+              <a:t>1/23/2014</a:t>
             </a:fld>
             <a:endParaRPr lang="en-US"/>
           </a:p>
@@ -670,7 +670,7 @@
           <a:p>
             <a:fld id="{9769DED8-28D4-45B9-A00F-7CFE9335FEA6}" type="datetime1">
               <a:rPr lang="en-US" smtClean="0"/>
-              <a:t>11/25/2013</a:t>
+              <a:t>1/23/2014</a:t>
             </a:fld>
             <a:endParaRPr lang="en-US"/>
           </a:p>
@@ -935,7 +935,7 @@
           <a:p>
             <a:fld id="{2DB3D439-1F88-44B4-B5F7-F9BCD4064257}" type="datetime1">
               <a:rPr lang="en-US" smtClean="0"/>
-              <a:t>11/25/2013</a:t>
+              <a:t>1/23/2014</a:t>
             </a:fld>
             <a:endParaRPr lang="en-US"/>
           </a:p>
@@ -1110,7 +1110,7 @@
           <a:p>
             <a:fld id="{99C5638F-6F55-4055-935C-67841BE78C36}" type="datetime1">
               <a:rPr lang="en-US" smtClean="0"/>
-              <a:t>11/25/2013</a:t>
+              <a:t>1/23/2014</a:t>
             </a:fld>
             <a:endParaRPr lang="en-US"/>
           </a:p>
@@ -1275,7 +1275,7 @@
           <a:p>
             <a:fld id="{E6987D90-0C92-4B22-A29D-FED15412CED2}" type="datetime1">
               <a:rPr lang="en-US" smtClean="0"/>
-              <a:t>11/25/2013</a:t>
+              <a:t>1/23/2014</a:t>
             </a:fld>
             <a:endParaRPr lang="en-US"/>
           </a:p>
@@ -1524,7 +1524,7 @@
           <a:p>
             <a:fld id="{DDB67BC4-9554-49E0-BCB3-D1EF965BA0B8}" type="datetime1">
               <a:rPr lang="en-US" smtClean="0"/>
-              <a:t>11/25/2013</a:t>
+              <a:t>1/23/2014</a:t>
             </a:fld>
             <a:endParaRPr lang="en-US"/>
           </a:p>
@@ -1807,7 +1807,7 @@
           <a:p>
             <a:fld id="{EC24D770-803D-4E01-921C-9C100DD8230C}" type="datetime1">
               <a:rPr lang="en-US" smtClean="0"/>
-              <a:t>11/25/2013</a:t>
+              <a:t>1/23/2014</a:t>
             </a:fld>
             <a:endParaRPr lang="en-US"/>
           </a:p>
@@ -2246,7 +2246,7 @@
           <a:p>
             <a:fld id="{356AD44B-78A4-4209-8070-7DCBE2DC4992}" type="datetime1">
               <a:rPr lang="en-US" smtClean="0"/>
-              <a:t>11/25/2013</a:t>
+              <a:t>1/23/2014</a:t>
             </a:fld>
             <a:endParaRPr lang="en-US"/>
           </a:p>
@@ -2359,7 +2359,7 @@
           <a:p>
             <a:fld id="{A993C59A-7CA2-467F-B7F1-9096881A01B8}" type="datetime1">
               <a:rPr lang="en-US" smtClean="0"/>
-              <a:t>11/25/2013</a:t>
+              <a:t>1/23/2014</a:t>
             </a:fld>
             <a:endParaRPr lang="en-US"/>
           </a:p>
@@ -2449,7 +2449,7 @@
           <a:p>
             <a:fld id="{2B6B58D0-2488-434A-8ED1-692E09B85CC5}" type="datetime1">
               <a:rPr lang="en-US" smtClean="0"/>
-              <a:t>11/25/2013</a:t>
+              <a:t>1/23/2014</a:t>
             </a:fld>
             <a:endParaRPr lang="en-US"/>
           </a:p>
@@ -2691,7 +2691,7 @@
           <a:p>
             <a:fld id="{FDB0AFC2-7D64-4F61-A7B7-9932D3305DDA}" type="datetime1">
               <a:rPr lang="en-US" smtClean="0"/>
-              <a:t>11/25/2013</a:t>
+              <a:t>1/23/2014</a:t>
             </a:fld>
             <a:endParaRPr lang="en-US"/>
           </a:p>
@@ -2985,7 +2985,7 @@
           <a:p>
             <a:fld id="{4983D17A-D7B2-4ECE-8A2C-93679B9D177B}" type="datetime1">
               <a:rPr lang="en-US" smtClean="0"/>
-              <a:t>11/25/2013</a:t>
+              <a:t>1/23/2014</a:t>
             </a:fld>
             <a:endParaRPr lang="en-US"/>
           </a:p>
@@ -3279,7 +3279,7 @@
           <a:p>
             <a:fld id="{2A5275F7-419E-4C23-8A3D-2EE5742B2EC9}" type="datetime1">
               <a:rPr lang="en-US" smtClean="0"/>
-              <a:t>11/25/2013</a:t>
+              <a:t>1/23/2014</a:t>
             </a:fld>
             <a:endParaRPr lang="en-US"/>
           </a:p>
@@ -4710,7 +4710,15 @@
             </a:r>
             <a:r>
               <a:rPr lang="en-US" dirty="0" smtClean="0"/>
-              <a:t> method a fix number of values to sum, and let it run.</a:t>
+              <a:t> method a </a:t>
+            </a:r>
+            <a:r>
+              <a:rPr lang="en-US" dirty="0" smtClean="0"/>
+              <a:t>fixed </a:t>
+            </a:r>
+            <a:r>
+              <a:rPr lang="en-US" dirty="0" smtClean="0"/>
+              <a:t>number of values to sum, and let it run.</a:t>
             </a:r>
           </a:p>
           <a:p>
@@ -6333,13 +6341,8 @@
             <a:pPr marL="800100" lvl="1" indent="-342900"/>
             <a:r>
               <a:rPr lang="en-US" dirty="0" smtClean="0"/>
-              <a:t>We will start with the computation on the </a:t>
-            </a:r>
-            <a:r>
-              <a:rPr lang="en-US" smtClean="0"/>
-              <a:t>GUI thread.</a:t>
-            </a:r>
-            <a:endParaRPr lang="en-US" dirty="0" smtClean="0"/>
+              <a:t>We will start with the computation on the GUI thread.</a:t>
+            </a:r>
           </a:p>
           <a:p>
             <a:pPr marL="800100" lvl="1" indent="-342900"/>
@@ -6462,10 +6465,10 @@
               <a:t>Jeff </a:t>
             </a:r>
             <a:r>
-              <a:rPr lang="en-US" sz="1000" dirty="0" err="1">
+              <a:rPr lang="en-US" sz="1000" dirty="0" err="1" smtClean="0">
                 <a:hlinkClick r:id="rId3"/>
               </a:rPr>
-              <a:t>Coswell</a:t>
+              <a:t>Cogswell</a:t>
             </a:r>
             <a:endParaRPr lang="en-US" sz="1000" dirty="0"/>
           </a:p>
@@ -6777,7 +6780,15 @@
             <a:pPr marL="800100" lvl="1" indent="-342900"/>
             <a:r>
               <a:rPr lang="en-US" dirty="0" smtClean="0"/>
-              <a:t>Preemptive multitasking operating systems use time slices to execute instructions (Windows and Linus are examples).</a:t>
+              <a:t>Preemptive multitasking operating systems use time slices to execute instructions (Windows and </a:t>
+            </a:r>
+            <a:r>
+              <a:rPr lang="en-US" dirty="0" smtClean="0"/>
+              <a:t>Linux </a:t>
+            </a:r>
+            <a:r>
+              <a:rPr lang="en-US" dirty="0" smtClean="0"/>
+              <a:t>are examples).</a:t>
             </a:r>
           </a:p>
           <a:p>
@@ -6812,7 +6823,15 @@
             <a:pPr marL="800100" lvl="1" indent="-342900"/>
             <a:r>
               <a:rPr lang="en-US" dirty="0" smtClean="0"/>
-              <a:t>The instructions way be from a different processes or different threads in the same process</a:t>
+              <a:t>The instructions </a:t>
+            </a:r>
+            <a:r>
+              <a:rPr lang="en-US" dirty="0" smtClean="0"/>
+              <a:t>may </a:t>
+            </a:r>
+            <a:r>
+              <a:rPr lang="en-US" dirty="0" smtClean="0"/>
+              <a:t>be from a different processes or different threads in the same process</a:t>
             </a:r>
           </a:p>
           <a:p>
@@ -9474,16 +9493,14 @@
               <a:t>queue</a:t>
             </a:r>
             <a:r>
-              <a:rPr lang="en-US" sz="2300" dirty="0">
+              <a:rPr lang="en-US" sz="2300" dirty="0" smtClean="0">
                 <a:latin typeface="Courier New" panose="02070309020205020404" pitchFamily="49" charset="0"/>
                 <a:cs typeface="Courier New" panose="02070309020205020404" pitchFamily="49" charset="0"/>
               </a:rPr>
               <a:t>;</a:t>
             </a:r>
-          </a:p>
-          <a:p>
-            <a:r>
-              <a:rPr lang="en-US" sz="2300" dirty="0">
+            <a:r>
+              <a:rPr lang="en-US" sz="2300" dirty="0" smtClean="0">
                 <a:solidFill>
                   <a:srgbClr val="7F0055"/>
                 </a:solidFill>
@@ -9563,7 +9580,7 @@
               <a:t>t.detach</a:t>
             </a:r>
             <a:r>
-              <a:rPr lang="en-US" sz="2300" dirty="0">
+              <a:rPr lang="en-US" sz="2300" dirty="0" smtClean="0">
                 <a:latin typeface="Courier New" panose="02070309020205020404" pitchFamily="49" charset="0"/>
                 <a:cs typeface="Courier New" panose="02070309020205020404" pitchFamily="49" charset="0"/>
               </a:rPr>
@@ -9571,114 +9588,6 @@
             </a:r>
           </a:p>
           <a:p>
-            <a:r>
-              <a:rPr lang="en-US" sz="2300" dirty="0">
-                <a:latin typeface="Courier New" panose="02070309020205020404" pitchFamily="49" charset="0"/>
-                <a:cs typeface="Courier New" panose="02070309020205020404" pitchFamily="49" charset="0"/>
-              </a:rPr>
-              <a:t>  {</a:t>
-            </a:r>
-          </a:p>
-          <a:p>
-            <a:r>
-              <a:rPr lang="en-US" sz="2300" dirty="0">
-                <a:latin typeface="Courier New" panose="02070309020205020404" pitchFamily="49" charset="0"/>
-                <a:cs typeface="Courier New" panose="02070309020205020404" pitchFamily="49" charset="0"/>
-              </a:rPr>
-              <a:t>    </a:t>
-            </a:r>
-            <a:r>
-              <a:rPr lang="en-US" sz="2300" dirty="0" err="1">
-                <a:latin typeface="Courier New" panose="02070309020205020404" pitchFamily="49" charset="0"/>
-                <a:cs typeface="Courier New" panose="02070309020205020404" pitchFamily="49" charset="0"/>
-              </a:rPr>
-              <a:t>std</a:t>
-            </a:r>
-            <a:r>
-              <a:rPr lang="en-US" sz="2300" dirty="0">
-                <a:latin typeface="Courier New" panose="02070309020205020404" pitchFamily="49" charset="0"/>
-                <a:cs typeface="Courier New" panose="02070309020205020404" pitchFamily="49" charset="0"/>
-              </a:rPr>
-              <a:t>::</a:t>
-            </a:r>
-            <a:r>
-              <a:rPr lang="en-US" sz="2300" dirty="0" err="1">
-                <a:latin typeface="Courier New" panose="02070309020205020404" pitchFamily="49" charset="0"/>
-                <a:cs typeface="Courier New" panose="02070309020205020404" pitchFamily="49" charset="0"/>
-              </a:rPr>
-              <a:t>lock_guard</a:t>
-            </a:r>
-            <a:r>
-              <a:rPr lang="en-US" sz="2300" dirty="0">
-                <a:latin typeface="Courier New" panose="02070309020205020404" pitchFamily="49" charset="0"/>
-                <a:cs typeface="Courier New" panose="02070309020205020404" pitchFamily="49" charset="0"/>
-              </a:rPr>
-              <a:t>&lt;</a:t>
-            </a:r>
-            <a:r>
-              <a:rPr lang="en-US" sz="2300" dirty="0" err="1">
-                <a:latin typeface="Courier New" panose="02070309020205020404" pitchFamily="49" charset="0"/>
-                <a:cs typeface="Courier New" panose="02070309020205020404" pitchFamily="49" charset="0"/>
-              </a:rPr>
-              <a:t>std</a:t>
-            </a:r>
-            <a:r>
-              <a:rPr lang="en-US" sz="2300" dirty="0">
-                <a:latin typeface="Courier New" panose="02070309020205020404" pitchFamily="49" charset="0"/>
-                <a:cs typeface="Courier New" panose="02070309020205020404" pitchFamily="49" charset="0"/>
-              </a:rPr>
-              <a:t>::mutex&gt; </a:t>
-            </a:r>
-            <a:r>
-              <a:rPr lang="en-US" sz="2300" dirty="0" err="1">
-                <a:latin typeface="Courier New" panose="02070309020205020404" pitchFamily="49" charset="0"/>
-                <a:cs typeface="Courier New" panose="02070309020205020404" pitchFamily="49" charset="0"/>
-              </a:rPr>
-              <a:t>lk</a:t>
-            </a:r>
-            <a:r>
-              <a:rPr lang="en-US" sz="2300" dirty="0">
-                <a:latin typeface="Courier New" panose="02070309020205020404" pitchFamily="49" charset="0"/>
-                <a:cs typeface="Courier New" panose="02070309020205020404" pitchFamily="49" charset="0"/>
-              </a:rPr>
-              <a:t>(m);</a:t>
-            </a:r>
-          </a:p>
-          <a:p>
-            <a:r>
-              <a:rPr lang="en-US" sz="2300" dirty="0">
-                <a:solidFill>
-                  <a:srgbClr val="7F0055"/>
-                </a:solidFill>
-                <a:latin typeface="Courier New" panose="02070309020205020404" pitchFamily="49" charset="0"/>
-                <a:cs typeface="Courier New" panose="02070309020205020404" pitchFamily="49" charset="0"/>
-              </a:rPr>
-              <a:t>    </a:t>
-            </a:r>
-            <a:r>
-              <a:rPr lang="nn-NO" sz="2300" dirty="0">
-                <a:solidFill>
-                  <a:srgbClr val="7F0055"/>
-                </a:solidFill>
-                <a:latin typeface="Courier New" panose="02070309020205020404" pitchFamily="49" charset="0"/>
-                <a:cs typeface="Courier New" panose="02070309020205020404" pitchFamily="49" charset="0"/>
-              </a:rPr>
-              <a:t>for</a:t>
-            </a:r>
-            <a:r>
-              <a:rPr lang="nn-NO" sz="2300" dirty="0">
-                <a:latin typeface="Courier New" panose="02070309020205020404" pitchFamily="49" charset="0"/>
-                <a:cs typeface="Courier New" panose="02070309020205020404" pitchFamily="49" charset="0"/>
-              </a:rPr>
-              <a:t> (i=1; i &lt;= 10000; ++</a:t>
-            </a:r>
-            <a:r>
-              <a:rPr lang="nn-NO" sz="2300" dirty="0" smtClean="0">
-                <a:latin typeface="Courier New" panose="02070309020205020404" pitchFamily="49" charset="0"/>
-                <a:cs typeface="Courier New" panose="02070309020205020404" pitchFamily="49" charset="0"/>
-              </a:rPr>
-              <a:t>i) </a:t>
-            </a:r>
             <a:r>
               <a:rPr lang="nn-NO" sz="2300" dirty="0" smtClean="0">
                 <a:solidFill>
@@ -9687,14 +9596,125 @@
                 <a:latin typeface="Courier New" panose="02070309020205020404" pitchFamily="49" charset="0"/>
                 <a:cs typeface="Courier New" panose="02070309020205020404" pitchFamily="49" charset="0"/>
               </a:rPr>
-              <a:t>queue</a:t>
+              <a:t>  for</a:t>
             </a:r>
             <a:r>
               <a:rPr lang="nn-NO" sz="2300" dirty="0" smtClean="0">
                 <a:latin typeface="Courier New" panose="02070309020205020404" pitchFamily="49" charset="0"/>
                 <a:cs typeface="Courier New" panose="02070309020205020404" pitchFamily="49" charset="0"/>
               </a:rPr>
-              <a:t>.push(i);</a:t>
+              <a:t> </a:t>
+            </a:r>
+            <a:r>
+              <a:rPr lang="nn-NO" sz="2300" dirty="0">
+                <a:latin typeface="Courier New" panose="02070309020205020404" pitchFamily="49" charset="0"/>
+                <a:cs typeface="Courier New" panose="02070309020205020404" pitchFamily="49" charset="0"/>
+              </a:rPr>
+              <a:t>(i=1; i &lt;= 10000; ++i)</a:t>
+            </a:r>
+            <a:endParaRPr lang="en-US" sz="2300" dirty="0">
+              <a:latin typeface="Courier New" panose="02070309020205020404" pitchFamily="49" charset="0"/>
+              <a:cs typeface="Courier New" panose="02070309020205020404" pitchFamily="49" charset="0"/>
+            </a:endParaRPr>
+          </a:p>
+          <a:p>
+            <a:r>
+              <a:rPr lang="en-US" sz="2300" dirty="0">
+                <a:latin typeface="Courier New" panose="02070309020205020404" pitchFamily="49" charset="0"/>
+                <a:cs typeface="Courier New" panose="02070309020205020404" pitchFamily="49" charset="0"/>
+              </a:rPr>
+              <a:t>  {</a:t>
+            </a:r>
+          </a:p>
+          <a:p>
+            <a:r>
+              <a:rPr lang="en-US" sz="2300" dirty="0">
+                <a:latin typeface="Courier New" panose="02070309020205020404" pitchFamily="49" charset="0"/>
+                <a:cs typeface="Courier New" panose="02070309020205020404" pitchFamily="49" charset="0"/>
+              </a:rPr>
+              <a:t>    </a:t>
+            </a:r>
+            <a:r>
+              <a:rPr lang="en-US" sz="2300" dirty="0" err="1">
+                <a:latin typeface="Courier New" panose="02070309020205020404" pitchFamily="49" charset="0"/>
+                <a:cs typeface="Courier New" panose="02070309020205020404" pitchFamily="49" charset="0"/>
+              </a:rPr>
+              <a:t>std</a:t>
+            </a:r>
+            <a:r>
+              <a:rPr lang="en-US" sz="2300" dirty="0">
+                <a:latin typeface="Courier New" panose="02070309020205020404" pitchFamily="49" charset="0"/>
+                <a:cs typeface="Courier New" panose="02070309020205020404" pitchFamily="49" charset="0"/>
+              </a:rPr>
+              <a:t>::</a:t>
+            </a:r>
+            <a:r>
+              <a:rPr lang="en-US" sz="2300" dirty="0" err="1">
+                <a:latin typeface="Courier New" panose="02070309020205020404" pitchFamily="49" charset="0"/>
+                <a:cs typeface="Courier New" panose="02070309020205020404" pitchFamily="49" charset="0"/>
+              </a:rPr>
+              <a:t>lock_guard</a:t>
+            </a:r>
+            <a:r>
+              <a:rPr lang="en-US" sz="2300" dirty="0">
+                <a:latin typeface="Courier New" panose="02070309020205020404" pitchFamily="49" charset="0"/>
+                <a:cs typeface="Courier New" panose="02070309020205020404" pitchFamily="49" charset="0"/>
+              </a:rPr>
+              <a:t>&lt;</a:t>
+            </a:r>
+            <a:r>
+              <a:rPr lang="en-US" sz="2300" dirty="0" err="1">
+                <a:latin typeface="Courier New" panose="02070309020205020404" pitchFamily="49" charset="0"/>
+                <a:cs typeface="Courier New" panose="02070309020205020404" pitchFamily="49" charset="0"/>
+              </a:rPr>
+              <a:t>std</a:t>
+            </a:r>
+            <a:r>
+              <a:rPr lang="en-US" sz="2300" dirty="0">
+                <a:latin typeface="Courier New" panose="02070309020205020404" pitchFamily="49" charset="0"/>
+                <a:cs typeface="Courier New" panose="02070309020205020404" pitchFamily="49" charset="0"/>
+              </a:rPr>
+              <a:t>::mutex&gt; </a:t>
+            </a:r>
+            <a:r>
+              <a:rPr lang="en-US" sz="2300" dirty="0" err="1">
+                <a:latin typeface="Courier New" panose="02070309020205020404" pitchFamily="49" charset="0"/>
+                <a:cs typeface="Courier New" panose="02070309020205020404" pitchFamily="49" charset="0"/>
+              </a:rPr>
+              <a:t>lk</a:t>
+            </a:r>
+            <a:r>
+              <a:rPr lang="en-US" sz="2300" dirty="0">
+                <a:latin typeface="Courier New" panose="02070309020205020404" pitchFamily="49" charset="0"/>
+                <a:cs typeface="Courier New" panose="02070309020205020404" pitchFamily="49" charset="0"/>
+              </a:rPr>
+              <a:t>(m);</a:t>
+            </a:r>
+          </a:p>
+          <a:p>
+            <a:r>
+              <a:rPr lang="nn-NO" sz="2300" dirty="0" smtClean="0">
+                <a:solidFill>
+                  <a:srgbClr val="7F0055"/>
+                </a:solidFill>
+                <a:latin typeface="Courier New" panose="02070309020205020404" pitchFamily="49" charset="0"/>
+                <a:cs typeface="Courier New" panose="02070309020205020404" pitchFamily="49" charset="0"/>
+              </a:rPr>
+              <a:t>    queue</a:t>
+            </a:r>
+            <a:r>
+              <a:rPr lang="nn-NO" sz="2300" dirty="0" smtClean="0">
+                <a:latin typeface="Courier New" panose="02070309020205020404" pitchFamily="49" charset="0"/>
+                <a:cs typeface="Courier New" panose="02070309020205020404" pitchFamily="49" charset="0"/>
+              </a:rPr>
+              <a:t>.push(i</a:t>
+            </a:r>
+            <a:r>
+              <a:rPr lang="nn-NO" sz="2300" dirty="0" smtClean="0">
+                <a:latin typeface="Courier New" panose="02070309020205020404" pitchFamily="49" charset="0"/>
+                <a:cs typeface="Courier New" panose="02070309020205020404" pitchFamily="49" charset="0"/>
+              </a:rPr>
+              <a:t>);</a:t>
             </a:r>
           </a:p>
           <a:p>
@@ -9784,6 +9804,13 @@
   <p:clrMapOvr>
     <a:masterClrMapping/>
   </p:clrMapOvr>
+  <p:timing>
+    <p:tnLst>
+      <p:par>
+        <p:cTn id="1" dur="indefinite" restart="never" nodeType="tmRoot"/>
+      </p:par>
+    </p:tnLst>
+  </p:timing>
 </p:sld>
 </file>
 

</xml_diff>

<commit_message>
Update a few lectures.
</commit_message>
<xml_diff>
--- a/Lectures/Asynchronous Operations/Asynchronous Operations.pptx
+++ b/Lectures/Asynchronous Operations/Asynchronous Operations.pptx
@@ -209,7 +209,7 @@
           <a:p>
             <a:fld id="{DBE0ECA1-3FBF-48AE-AD2A-4439AE745E19}" type="datetimeFigureOut">
               <a:rPr lang="en-US" smtClean="0"/>
-              <a:t>1/23/2014</a:t>
+              <a:t>2/6/2014</a:t>
             </a:fld>
             <a:endParaRPr lang="en-US"/>
           </a:p>
@@ -670,7 +670,7 @@
           <a:p>
             <a:fld id="{9769DED8-28D4-45B9-A00F-7CFE9335FEA6}" type="datetime1">
               <a:rPr lang="en-US" smtClean="0"/>
-              <a:t>1/23/2014</a:t>
+              <a:t>2/6/2014</a:t>
             </a:fld>
             <a:endParaRPr lang="en-US"/>
           </a:p>
@@ -935,7 +935,7 @@
           <a:p>
             <a:fld id="{2DB3D439-1F88-44B4-B5F7-F9BCD4064257}" type="datetime1">
               <a:rPr lang="en-US" smtClean="0"/>
-              <a:t>1/23/2014</a:t>
+              <a:t>2/6/2014</a:t>
             </a:fld>
             <a:endParaRPr lang="en-US"/>
           </a:p>
@@ -1110,7 +1110,7 @@
           <a:p>
             <a:fld id="{99C5638F-6F55-4055-935C-67841BE78C36}" type="datetime1">
               <a:rPr lang="en-US" smtClean="0"/>
-              <a:t>1/23/2014</a:t>
+              <a:t>2/6/2014</a:t>
             </a:fld>
             <a:endParaRPr lang="en-US"/>
           </a:p>
@@ -1275,7 +1275,7 @@
           <a:p>
             <a:fld id="{E6987D90-0C92-4B22-A29D-FED15412CED2}" type="datetime1">
               <a:rPr lang="en-US" smtClean="0"/>
-              <a:t>1/23/2014</a:t>
+              <a:t>2/6/2014</a:t>
             </a:fld>
             <a:endParaRPr lang="en-US"/>
           </a:p>
@@ -1524,7 +1524,7 @@
           <a:p>
             <a:fld id="{DDB67BC4-9554-49E0-BCB3-D1EF965BA0B8}" type="datetime1">
               <a:rPr lang="en-US" smtClean="0"/>
-              <a:t>1/23/2014</a:t>
+              <a:t>2/6/2014</a:t>
             </a:fld>
             <a:endParaRPr lang="en-US"/>
           </a:p>
@@ -1807,7 +1807,7 @@
           <a:p>
             <a:fld id="{EC24D770-803D-4E01-921C-9C100DD8230C}" type="datetime1">
               <a:rPr lang="en-US" smtClean="0"/>
-              <a:t>1/23/2014</a:t>
+              <a:t>2/6/2014</a:t>
             </a:fld>
             <a:endParaRPr lang="en-US"/>
           </a:p>
@@ -2246,7 +2246,7 @@
           <a:p>
             <a:fld id="{356AD44B-78A4-4209-8070-7DCBE2DC4992}" type="datetime1">
               <a:rPr lang="en-US" smtClean="0"/>
-              <a:t>1/23/2014</a:t>
+              <a:t>2/6/2014</a:t>
             </a:fld>
             <a:endParaRPr lang="en-US"/>
           </a:p>
@@ -2359,7 +2359,7 @@
           <a:p>
             <a:fld id="{A993C59A-7CA2-467F-B7F1-9096881A01B8}" type="datetime1">
               <a:rPr lang="en-US" smtClean="0"/>
-              <a:t>1/23/2014</a:t>
+              <a:t>2/6/2014</a:t>
             </a:fld>
             <a:endParaRPr lang="en-US"/>
           </a:p>
@@ -2449,7 +2449,7 @@
           <a:p>
             <a:fld id="{2B6B58D0-2488-434A-8ED1-692E09B85CC5}" type="datetime1">
               <a:rPr lang="en-US" smtClean="0"/>
-              <a:t>1/23/2014</a:t>
+              <a:t>2/6/2014</a:t>
             </a:fld>
             <a:endParaRPr lang="en-US"/>
           </a:p>
@@ -2691,7 +2691,7 @@
           <a:p>
             <a:fld id="{FDB0AFC2-7D64-4F61-A7B7-9932D3305DDA}" type="datetime1">
               <a:rPr lang="en-US" smtClean="0"/>
-              <a:t>1/23/2014</a:t>
+              <a:t>2/6/2014</a:t>
             </a:fld>
             <a:endParaRPr lang="en-US"/>
           </a:p>
@@ -2985,7 +2985,7 @@
           <a:p>
             <a:fld id="{4983D17A-D7B2-4ECE-8A2C-93679B9D177B}" type="datetime1">
               <a:rPr lang="en-US" smtClean="0"/>
-              <a:t>1/23/2014</a:t>
+              <a:t>2/6/2014</a:t>
             </a:fld>
             <a:endParaRPr lang="en-US"/>
           </a:p>
@@ -3279,7 +3279,7 @@
           <a:p>
             <a:fld id="{2A5275F7-419E-4C23-8A3D-2EE5742B2EC9}" type="datetime1">
               <a:rPr lang="en-US" smtClean="0"/>
-              <a:t>1/23/2014</a:t>
+              <a:t>2/6/2014</a:t>
             </a:fld>
             <a:endParaRPr lang="en-US"/>
           </a:p>
@@ -3782,7 +3782,11 @@
           <a:p>
             <a:r>
               <a:rPr lang="en-US" sz="4800" dirty="0" smtClean="0"/>
-              <a:t>Asynchronous Operations</a:t>
+              <a:t>Asynchronous </a:t>
+            </a:r>
+            <a:r>
+              <a:rPr lang="en-US" sz="4800" dirty="0" smtClean="0"/>
+              <a:t>Operations</a:t>
             </a:r>
             <a:endParaRPr lang="en-US" sz="4800" dirty="0"/>
           </a:p>
@@ -4710,15 +4714,7 @@
             </a:r>
             <a:r>
               <a:rPr lang="en-US" dirty="0" smtClean="0"/>
-              <a:t> method a </a:t>
-            </a:r>
-            <a:r>
-              <a:rPr lang="en-US" dirty="0" smtClean="0"/>
-              <a:t>fixed </a:t>
-            </a:r>
-            <a:r>
-              <a:rPr lang="en-US" dirty="0" smtClean="0"/>
-              <a:t>number of values to sum, and let it run.</a:t>
+              <a:t> method a fixed number of values to sum, and let it run.</a:t>
             </a:r>
           </a:p>
           <a:p>
@@ -6780,15 +6776,7 @@
             <a:pPr marL="800100" lvl="1" indent="-342900"/>
             <a:r>
               <a:rPr lang="en-US" dirty="0" smtClean="0"/>
-              <a:t>Preemptive multitasking operating systems use time slices to execute instructions (Windows and </a:t>
-            </a:r>
-            <a:r>
-              <a:rPr lang="en-US" dirty="0" smtClean="0"/>
-              <a:t>Linux </a:t>
-            </a:r>
-            <a:r>
-              <a:rPr lang="en-US" dirty="0" smtClean="0"/>
-              <a:t>are examples).</a:t>
+              <a:t>Preemptive multitasking operating systems use time slices to execute instructions (Windows and Linux are examples).</a:t>
             </a:r>
           </a:p>
           <a:p>
@@ -6823,15 +6811,7 @@
             <a:pPr marL="800100" lvl="1" indent="-342900"/>
             <a:r>
               <a:rPr lang="en-US" dirty="0" smtClean="0"/>
-              <a:t>The instructions </a:t>
-            </a:r>
-            <a:r>
-              <a:rPr lang="en-US" dirty="0" smtClean="0"/>
-              <a:t>may </a:t>
-            </a:r>
-            <a:r>
-              <a:rPr lang="en-US" dirty="0" smtClean="0"/>
-              <a:t>be from a different processes or different threads in the same process</a:t>
+              <a:t>The instructions may be from a different processes or different threads in the same process</a:t>
             </a:r>
           </a:p>
           <a:p>
@@ -8537,7 +8517,7 @@
         <p:spPr/>
         <p:txBody>
           <a:bodyPr>
-            <a:normAutofit fontScale="92500" lnSpcReduction="20000"/>
+            <a:normAutofit fontScale="85000" lnSpcReduction="10000"/>
           </a:bodyPr>
           <a:lstStyle/>
           <a:p>
@@ -8798,7 +8778,21 @@
               <a:t>::thread t(gauss, </a:t>
             </a:r>
             <a:r>
-              <a:rPr lang="en-US" dirty="0" err="1">
+              <a:rPr lang="en-US" dirty="0" err="1" smtClean="0">
+                <a:latin typeface="Courier New" panose="02070309020205020404" pitchFamily="49" charset="0"/>
+                <a:cs typeface="Courier New" panose="02070309020205020404" pitchFamily="49" charset="0"/>
+              </a:rPr>
+              <a:t>std</a:t>
+            </a:r>
+            <a:r>
+              <a:rPr lang="en-US" dirty="0" smtClean="0">
+                <a:latin typeface="Courier New" panose="02070309020205020404" pitchFamily="49" charset="0"/>
+                <a:cs typeface="Courier New" panose="02070309020205020404" pitchFamily="49" charset="0"/>
+              </a:rPr>
+              <a:t>::ref(queue), </a:t>
+            </a:r>
+            <a:r>
+              <a:rPr lang="en-US" dirty="0" err="1" smtClean="0">
                 <a:latin typeface="Courier New" panose="02070309020205020404" pitchFamily="49" charset="0"/>
                 <a:cs typeface="Courier New" panose="02070309020205020404" pitchFamily="49" charset="0"/>
               </a:rPr>
@@ -9547,10 +9541,31 @@
                 <a:latin typeface="Courier New" panose="02070309020205020404" pitchFamily="49" charset="0"/>
                 <a:cs typeface="Courier New" panose="02070309020205020404" pitchFamily="49" charset="0"/>
               </a:rPr>
-              <a:t>::thread t(gauss, </a:t>
-            </a:r>
-            <a:r>
-              <a:rPr lang="en-US" sz="2300" dirty="0" err="1">
+              <a:t>::thread </a:t>
+            </a:r>
+            <a:r>
+              <a:rPr lang="en-US" sz="2300" dirty="0" smtClean="0">
+                <a:latin typeface="Courier New" panose="02070309020205020404" pitchFamily="49" charset="0"/>
+                <a:cs typeface="Courier New" panose="02070309020205020404" pitchFamily="49" charset="0"/>
+              </a:rPr>
+              <a:t>t(</a:t>
+            </a:r>
+            <a:r>
+              <a:rPr lang="en-US" sz="2300" dirty="0" err="1" smtClean="0">
+                <a:latin typeface="Courier New" panose="02070309020205020404" pitchFamily="49" charset="0"/>
+                <a:cs typeface="Courier New" panose="02070309020205020404" pitchFamily="49" charset="0"/>
+              </a:rPr>
+              <a:t>gauss,std</a:t>
+            </a:r>
+            <a:r>
+              <a:rPr lang="en-US" sz="2300" dirty="0" smtClean="0">
+                <a:latin typeface="Courier New" panose="02070309020205020404" pitchFamily="49" charset="0"/>
+                <a:cs typeface="Courier New" panose="02070309020205020404" pitchFamily="49" charset="0"/>
+              </a:rPr>
+              <a:t>::ref(queue),</a:t>
+            </a:r>
+            <a:r>
+              <a:rPr lang="en-US" sz="2300" dirty="0" err="1" smtClean="0">
                 <a:latin typeface="Courier New" panose="02070309020205020404" pitchFamily="49" charset="0"/>
                 <a:cs typeface="Courier New" panose="02070309020205020404" pitchFamily="49" charset="0"/>
               </a:rPr>
@@ -9707,14 +9722,7 @@
                 <a:latin typeface="Courier New" panose="02070309020205020404" pitchFamily="49" charset="0"/>
                 <a:cs typeface="Courier New" panose="02070309020205020404" pitchFamily="49" charset="0"/>
               </a:rPr>
-              <a:t>.push(i</a:t>
-            </a:r>
-            <a:r>
-              <a:rPr lang="nn-NO" sz="2300" dirty="0" smtClean="0">
-                <a:latin typeface="Courier New" panose="02070309020205020404" pitchFamily="49" charset="0"/>
-                <a:cs typeface="Courier New" panose="02070309020205020404" pitchFamily="49" charset="0"/>
-              </a:rPr>
-              <a:t>);</a:t>
+              <a:t>.push(i);</a:t>
             </a:r>
           </a:p>
           <a:p>

</xml_diff>